<commit_message>
upate html and css for aesthetics. rough draft of ppt slides. TRS
</commit_message>
<xml_diff>
--- a/Presentation.pptx
+++ b/Presentation.pptx
@@ -206,7 +206,7 @@
           <a:p>
             <a:fld id="{218C8F45-0D35-4F06-9AC8-C547C595EDF0}" type="datetimeFigureOut">
               <a:rPr lang="en-US" smtClean="0"/>
-              <a:t>7/27/2023</a:t>
+              <a:t>7/29/2023</a:t>
             </a:fld>
             <a:endParaRPr lang="en-US"/>
           </a:p>
@@ -517,36 +517,6 @@
           <a:bodyPr/>
           <a:lstStyle/>
           <a:p>
-            <a:pPr marL="0" marR="0" lvl="0" indent="0" algn="l" defTabSz="914400" rtl="0" eaLnBrk="1" fontAlgn="auto" latinLnBrk="0" hangingPunct="1">
-              <a:lnSpc>
-                <a:spcPct val="100000"/>
-              </a:lnSpc>
-              <a:spcBef>
-                <a:spcPts val="0"/>
-              </a:spcBef>
-              <a:spcAft>
-                <a:spcPts val="0"/>
-              </a:spcAft>
-              <a:buClrTx/>
-              <a:buSzTx/>
-              <a:buFontTx/>
-              <a:buNone/>
-              <a:tabLst/>
-              <a:defRPr/>
-            </a:pPr>
-            <a:r>
-              <a:rPr lang="en-US" dirty="0">
-                <a:solidFill>
-                  <a:schemeClr val="tx1">
-                    <a:lumMod val="85000"/>
-                    <a:lumOff val="15000"/>
-                  </a:schemeClr>
-                </a:solidFill>
-              </a:rPr>
-              <a:t>ARPA was not passed until March 2021 and the interim rule on how funds should be spent was not in place until May 2021. Many people may have received their initial dose of vaccine or even complete series before projects funded by this program were planned and launched.</a:t>
-            </a:r>
-          </a:p>
-          <a:p>
             <a:endParaRPr lang="en-US" dirty="0"/>
           </a:p>
         </p:txBody>
@@ -758,7 +728,7 @@
           <a:p>
             <a:fld id="{EDD99DFF-4D7C-4671-8EF0-23A72D1484EC}" type="datetimeFigureOut">
               <a:rPr lang="en-US" smtClean="0"/>
-              <a:t>7/27/2023</a:t>
+              <a:t>7/29/2023</a:t>
             </a:fld>
             <a:endParaRPr lang="en-US"/>
           </a:p>
@@ -1070,7 +1040,7 @@
           <a:p>
             <a:fld id="{EDD99DFF-4D7C-4671-8EF0-23A72D1484EC}" type="datetimeFigureOut">
               <a:rPr lang="en-US" smtClean="0"/>
-              <a:t>7/27/2023</a:t>
+              <a:t>7/29/2023</a:t>
             </a:fld>
             <a:endParaRPr lang="en-US"/>
           </a:p>
@@ -1292,7 +1262,7 @@
           <a:p>
             <a:fld id="{EDD99DFF-4D7C-4671-8EF0-23A72D1484EC}" type="datetimeFigureOut">
               <a:rPr lang="en-US" smtClean="0"/>
-              <a:t>7/27/2023</a:t>
+              <a:t>7/29/2023</a:t>
             </a:fld>
             <a:endParaRPr lang="en-US"/>
           </a:p>
@@ -1583,7 +1553,7 @@
           <a:p>
             <a:fld id="{EDD99DFF-4D7C-4671-8EF0-23A72D1484EC}" type="datetimeFigureOut">
               <a:rPr lang="en-US" smtClean="0"/>
-              <a:t>7/27/2023</a:t>
+              <a:t>7/29/2023</a:t>
             </a:fld>
             <a:endParaRPr lang="en-US"/>
           </a:p>
@@ -2037,7 +2007,7 @@
           <a:p>
             <a:fld id="{EDD99DFF-4D7C-4671-8EF0-23A72D1484EC}" type="datetimeFigureOut">
               <a:rPr lang="en-US" smtClean="0"/>
-              <a:t>7/27/2023</a:t>
+              <a:t>7/29/2023</a:t>
             </a:fld>
             <a:endParaRPr lang="en-US"/>
           </a:p>
@@ -2613,7 +2583,7 @@
           <a:p>
             <a:fld id="{EDD99DFF-4D7C-4671-8EF0-23A72D1484EC}" type="datetimeFigureOut">
               <a:rPr lang="en-US" smtClean="0"/>
-              <a:t>7/27/2023</a:t>
+              <a:t>7/29/2023</a:t>
             </a:fld>
             <a:endParaRPr lang="en-US"/>
           </a:p>
@@ -3465,7 +3435,7 @@
           <a:p>
             <a:fld id="{EDD99DFF-4D7C-4671-8EF0-23A72D1484EC}" type="datetimeFigureOut">
               <a:rPr lang="en-US" smtClean="0"/>
-              <a:t>7/27/2023</a:t>
+              <a:t>7/29/2023</a:t>
             </a:fld>
             <a:endParaRPr lang="en-US"/>
           </a:p>
@@ -3670,7 +3640,7 @@
           <a:p>
             <a:fld id="{EDD99DFF-4D7C-4671-8EF0-23A72D1484EC}" type="datetimeFigureOut">
               <a:rPr lang="en-US" smtClean="0"/>
-              <a:t>7/27/2023</a:t>
+              <a:t>7/29/2023</a:t>
             </a:fld>
             <a:endParaRPr lang="en-US"/>
           </a:p>
@@ -3884,7 +3854,7 @@
           <a:p>
             <a:fld id="{EDD99DFF-4D7C-4671-8EF0-23A72D1484EC}" type="datetimeFigureOut">
               <a:rPr lang="en-US" smtClean="0"/>
-              <a:t>7/27/2023</a:t>
+              <a:t>7/29/2023</a:t>
             </a:fld>
             <a:endParaRPr lang="en-US"/>
           </a:p>
@@ -4078,7 +4048,7 @@
             <a:fld id="{EDD99DFF-4D7C-4671-8EF0-23A72D1484EC}" type="datetimeFigureOut">
               <a:rPr lang="en-US" smtClean="0"/>
               <a:pPr/>
-              <a:t>7/27/2023</a:t>
+              <a:t>7/29/2023</a:t>
             </a:fld>
             <a:endParaRPr lang="en-US"/>
           </a:p>
@@ -4324,7 +4294,7 @@
           <a:p>
             <a:fld id="{925EA6E8-F76E-44A9-9BED-4361634B60BD}" type="datetimeFigureOut">
               <a:rPr lang="en-US" smtClean="0"/>
-              <a:t>7/27/2023</a:t>
+              <a:t>7/29/2023</a:t>
             </a:fld>
             <a:endParaRPr lang="en-US"/>
           </a:p>
@@ -4529,7 +4499,7 @@
           <a:p>
             <a:fld id="{EDD99DFF-4D7C-4671-8EF0-23A72D1484EC}" type="datetimeFigureOut">
               <a:rPr lang="en-US" smtClean="0"/>
-              <a:t>7/27/2023</a:t>
+              <a:t>7/29/2023</a:t>
             </a:fld>
             <a:endParaRPr lang="en-US"/>
           </a:p>
@@ -4809,7 +4779,7 @@
           <a:p>
             <a:fld id="{EDD99DFF-4D7C-4671-8EF0-23A72D1484EC}" type="datetimeFigureOut">
               <a:rPr lang="en-US" smtClean="0"/>
-              <a:t>7/27/2023</a:t>
+              <a:t>7/29/2023</a:t>
             </a:fld>
             <a:endParaRPr lang="en-US"/>
           </a:p>
@@ -5076,7 +5046,7 @@
           <a:p>
             <a:fld id="{EDD99DFF-4D7C-4671-8EF0-23A72D1484EC}" type="datetimeFigureOut">
               <a:rPr lang="en-US" smtClean="0"/>
-              <a:t>7/27/2023</a:t>
+              <a:t>7/29/2023</a:t>
             </a:fld>
             <a:endParaRPr lang="en-US"/>
           </a:p>
@@ -5491,7 +5461,7 @@
           <a:p>
             <a:fld id="{EDD99DFF-4D7C-4671-8EF0-23A72D1484EC}" type="datetimeFigureOut">
               <a:rPr lang="en-US" smtClean="0"/>
-              <a:t>7/27/2023</a:t>
+              <a:t>7/29/2023</a:t>
             </a:fld>
             <a:endParaRPr lang="en-US"/>
           </a:p>
@@ -5639,7 +5609,7 @@
           <a:p>
             <a:fld id="{EDD99DFF-4D7C-4671-8EF0-23A72D1484EC}" type="datetimeFigureOut">
               <a:rPr lang="en-US" smtClean="0"/>
-              <a:t>7/27/2023</a:t>
+              <a:t>7/29/2023</a:t>
             </a:fld>
             <a:endParaRPr lang="en-US"/>
           </a:p>
@@ -5764,7 +5734,7 @@
           <a:p>
             <a:fld id="{EDD99DFF-4D7C-4671-8EF0-23A72D1484EC}" type="datetimeFigureOut">
               <a:rPr lang="en-US" smtClean="0"/>
-              <a:t>7/27/2023</a:t>
+              <a:t>7/29/2023</a:t>
             </a:fld>
             <a:endParaRPr lang="en-US"/>
           </a:p>
@@ -6043,7 +6013,7 @@
           <a:p>
             <a:fld id="{EDD99DFF-4D7C-4671-8EF0-23A72D1484EC}" type="datetimeFigureOut">
               <a:rPr lang="en-US" smtClean="0"/>
-              <a:t>7/27/2023</a:t>
+              <a:t>7/29/2023</a:t>
             </a:fld>
             <a:endParaRPr lang="en-US"/>
           </a:p>
@@ -6355,7 +6325,7 @@
           <a:p>
             <a:fld id="{EDD99DFF-4D7C-4671-8EF0-23A72D1484EC}" type="datetimeFigureOut">
               <a:rPr lang="en-US" smtClean="0"/>
-              <a:t>7/27/2023</a:t>
+              <a:t>7/29/2023</a:t>
             </a:fld>
             <a:endParaRPr lang="en-US"/>
           </a:p>
@@ -6608,7 +6578,7 @@
           <a:p>
             <a:fld id="{EDD99DFF-4D7C-4671-8EF0-23A72D1484EC}" type="datetimeFigureOut">
               <a:rPr lang="en-US" smtClean="0"/>
-              <a:t>7/27/2023</a:t>
+              <a:t>7/29/2023</a:t>
             </a:fld>
             <a:endParaRPr lang="en-US"/>
           </a:p>
@@ -8660,7 +8630,7 @@
           <a:p>
             <a:r>
               <a:rPr lang="en-US" dirty="0"/>
-              <a:t>Conclusions</a:t>
+              <a:t>Conclusions/Further Directions</a:t>
             </a:r>
           </a:p>
         </p:txBody>
@@ -8681,10 +8651,15 @@
             <p:ph idx="1"/>
           </p:nvPr>
         </p:nvSpPr>
-        <p:spPr/>
+        <p:spPr>
+          <a:xfrm>
+            <a:off x="913775" y="2367093"/>
+            <a:ext cx="5182225" cy="3424107"/>
+          </a:xfrm>
+        </p:spPr>
         <p:txBody>
           <a:bodyPr>
-            <a:normAutofit/>
+            <a:normAutofit fontScale="92500" lnSpcReduction="20000"/>
           </a:bodyPr>
           <a:lstStyle/>
           <a:p>
@@ -8694,17 +8669,60 @@
                   <a:srgbClr val="FF0000"/>
                 </a:solidFill>
               </a:rPr>
-              <a:t>Hotter climate = more/less cases?</a:t>
-            </a:r>
-          </a:p>
-          <a:p>
+              <a:t>Lyme disease was clustered in relatively cooler areas, but relatively cooler areas does not imply </a:t>
+            </a:r>
+            <a:r>
+              <a:rPr lang="en-US" dirty="0" err="1">
+                <a:solidFill>
+                  <a:srgbClr val="FF0000"/>
+                </a:solidFill>
+              </a:rPr>
+              <a:t>lyme</a:t>
+            </a:r>
             <a:r>
               <a:rPr lang="en-US" dirty="0">
                 <a:solidFill>
                   <a:srgbClr val="FF0000"/>
                 </a:solidFill>
               </a:rPr>
-              <a:t>Wetter climate = more/less cases?</a:t>
+              <a:t> disease</a:t>
+            </a:r>
+          </a:p>
+          <a:p>
+            <a:pPr lvl="1"/>
+            <a:r>
+              <a:rPr lang="en-US" dirty="0">
+                <a:solidFill>
+                  <a:srgbClr val="FF0000"/>
+                </a:solidFill>
+              </a:rPr>
+              <a:t>Clusters in </a:t>
+            </a:r>
+            <a:r>
+              <a:rPr lang="en-US" dirty="0" err="1">
+                <a:solidFill>
+                  <a:srgbClr val="FF0000"/>
+                </a:solidFill>
+              </a:rPr>
+              <a:t>NorthEast</a:t>
+            </a:r>
+            <a:r>
+              <a:rPr lang="en-US" dirty="0">
+                <a:solidFill>
+                  <a:srgbClr val="FF0000"/>
+                </a:solidFill>
+              </a:rPr>
+              <a:t> and Upper Midwest</a:t>
+            </a:r>
+          </a:p>
+          <a:p>
+            <a:r>
+              <a:rPr lang="en-US" dirty="0">
+                <a:solidFill>
+                  <a:srgbClr val="FF0000"/>
+                </a:solidFill>
+              </a:rPr>
+              <a:t>West Nile virus was all over the map, literally</a:t>
             </a:r>
           </a:p>
           <a:p>
@@ -8737,6 +8755,296 @@
               </a:rPr>
               <a:t>Thoughts on inconsistencies in case reporting per county?</a:t>
             </a:r>
+          </a:p>
+        </p:txBody>
+      </p:sp>
+      <p:sp>
+        <p:nvSpPr>
+          <p:cNvPr id="5" name="Content Placeholder 2">
+            <a:extLst>
+              <a:ext uri="{FF2B5EF4-FFF2-40B4-BE49-F238E27FC236}">
+                <a16:creationId xmlns:a16="http://schemas.microsoft.com/office/drawing/2014/main" id="{369419D4-C8DD-68C7-26D3-3D370B331F09}"/>
+              </a:ext>
+            </a:extLst>
+          </p:cNvPr>
+          <p:cNvSpPr txBox="1">
+            <a:spLocks/>
+          </p:cNvSpPr>
+          <p:nvPr/>
+        </p:nvSpPr>
+        <p:spPr>
+          <a:xfrm>
+            <a:off x="6096000" y="2367092"/>
+            <a:ext cx="5182225" cy="3424107"/>
+          </a:xfrm>
+          <a:prstGeom prst="rect">
+            <a:avLst/>
+          </a:prstGeom>
+        </p:spPr>
+        <p:txBody>
+          <a:bodyPr vert="horz" lIns="91440" tIns="45720" rIns="91440" bIns="45720" rtlCol="0" anchor="ctr">
+            <a:normAutofit/>
+          </a:bodyPr>
+          <a:lstStyle>
+            <a:lvl1pPr marL="228600" indent="-228600" algn="l" defTabSz="914400" rtl="0" eaLnBrk="1" latinLnBrk="0" hangingPunct="1">
+              <a:lnSpc>
+                <a:spcPct val="120000"/>
+              </a:lnSpc>
+              <a:spcBef>
+                <a:spcPts val="1000"/>
+              </a:spcBef>
+              <a:buClr>
+                <a:schemeClr val="tx1"/>
+              </a:buClr>
+              <a:buFont typeface="Arial" panose="020B0604020202020204" pitchFamily="34" charset="0"/>
+              <a:buChar char="•"/>
+              <a:defRPr sz="2000" kern="1200" cap="none" baseline="0">
+                <a:solidFill>
+                  <a:schemeClr val="tx1"/>
+                </a:solidFill>
+                <a:effectLst/>
+                <a:latin typeface="+mn-lt"/>
+                <a:ea typeface="+mn-ea"/>
+                <a:cs typeface="+mn-cs"/>
+              </a:defRPr>
+            </a:lvl1pPr>
+            <a:lvl2pPr marL="685800" indent="-228600" algn="l" defTabSz="914400" rtl="0" eaLnBrk="1" latinLnBrk="0" hangingPunct="1">
+              <a:lnSpc>
+                <a:spcPct val="120000"/>
+              </a:lnSpc>
+              <a:spcBef>
+                <a:spcPts val="500"/>
+              </a:spcBef>
+              <a:buClr>
+                <a:schemeClr val="tx1"/>
+              </a:buClr>
+              <a:buFont typeface="Arial" panose="020B0604020202020204" pitchFamily="34" charset="0"/>
+              <a:buChar char="•"/>
+              <a:defRPr sz="1800" kern="1200" cap="none" baseline="0">
+                <a:solidFill>
+                  <a:schemeClr val="tx1"/>
+                </a:solidFill>
+                <a:effectLst/>
+                <a:latin typeface="+mn-lt"/>
+                <a:ea typeface="+mn-ea"/>
+                <a:cs typeface="+mn-cs"/>
+              </a:defRPr>
+            </a:lvl2pPr>
+            <a:lvl3pPr marL="1143000" indent="-228600" algn="l" defTabSz="914400" rtl="0" eaLnBrk="1" latinLnBrk="0" hangingPunct="1">
+              <a:lnSpc>
+                <a:spcPct val="120000"/>
+              </a:lnSpc>
+              <a:spcBef>
+                <a:spcPts val="500"/>
+              </a:spcBef>
+              <a:buClr>
+                <a:schemeClr val="tx1"/>
+              </a:buClr>
+              <a:buFont typeface="Arial" panose="020B0604020202020204" pitchFamily="34" charset="0"/>
+              <a:buChar char="•"/>
+              <a:defRPr sz="1600" kern="1200" cap="none" baseline="0">
+                <a:solidFill>
+                  <a:schemeClr val="tx1"/>
+                </a:solidFill>
+                <a:effectLst/>
+                <a:latin typeface="+mn-lt"/>
+                <a:ea typeface="+mn-ea"/>
+                <a:cs typeface="+mn-cs"/>
+              </a:defRPr>
+            </a:lvl3pPr>
+            <a:lvl4pPr marL="1600200" indent="-228600" algn="l" defTabSz="914400" rtl="0" eaLnBrk="1" latinLnBrk="0" hangingPunct="1">
+              <a:lnSpc>
+                <a:spcPct val="120000"/>
+              </a:lnSpc>
+              <a:spcBef>
+                <a:spcPts val="500"/>
+              </a:spcBef>
+              <a:buClr>
+                <a:schemeClr val="tx1"/>
+              </a:buClr>
+              <a:buFont typeface="Arial" panose="020B0604020202020204" pitchFamily="34" charset="0"/>
+              <a:buChar char="•"/>
+              <a:defRPr sz="1400" kern="1200" cap="none" baseline="0">
+                <a:solidFill>
+                  <a:schemeClr val="tx1"/>
+                </a:solidFill>
+                <a:effectLst/>
+                <a:latin typeface="+mn-lt"/>
+                <a:ea typeface="+mn-ea"/>
+                <a:cs typeface="+mn-cs"/>
+              </a:defRPr>
+            </a:lvl4pPr>
+            <a:lvl5pPr marL="2057400" indent="-228600" algn="l" defTabSz="914400" rtl="0" eaLnBrk="1" latinLnBrk="0" hangingPunct="1">
+              <a:lnSpc>
+                <a:spcPct val="120000"/>
+              </a:lnSpc>
+              <a:spcBef>
+                <a:spcPts val="500"/>
+              </a:spcBef>
+              <a:buClr>
+                <a:schemeClr val="tx1"/>
+              </a:buClr>
+              <a:buFont typeface="Arial" panose="020B0604020202020204" pitchFamily="34" charset="0"/>
+              <a:buChar char="•"/>
+              <a:defRPr sz="1400" kern="1200" cap="none" baseline="0">
+                <a:solidFill>
+                  <a:schemeClr val="tx1"/>
+                </a:solidFill>
+                <a:effectLst/>
+                <a:latin typeface="+mn-lt"/>
+                <a:ea typeface="+mn-ea"/>
+                <a:cs typeface="+mn-cs"/>
+              </a:defRPr>
+            </a:lvl5pPr>
+            <a:lvl6pPr marL="2514600" indent="-228600" algn="l" defTabSz="914400" rtl="0" eaLnBrk="1" latinLnBrk="0" hangingPunct="1">
+              <a:lnSpc>
+                <a:spcPct val="120000"/>
+              </a:lnSpc>
+              <a:spcBef>
+                <a:spcPts val="500"/>
+              </a:spcBef>
+              <a:buClr>
+                <a:schemeClr val="tx1"/>
+              </a:buClr>
+              <a:buFont typeface="Arial" panose="020B0604020202020204" pitchFamily="34" charset="0"/>
+              <a:buChar char="•"/>
+              <a:defRPr sz="1400" kern="1200" cap="all" baseline="0">
+                <a:solidFill>
+                  <a:schemeClr val="tx1"/>
+                </a:solidFill>
+                <a:effectLst/>
+                <a:latin typeface="+mn-lt"/>
+                <a:ea typeface="+mn-ea"/>
+                <a:cs typeface="+mn-cs"/>
+              </a:defRPr>
+            </a:lvl6pPr>
+            <a:lvl7pPr marL="2971800" indent="-228600" algn="l" defTabSz="914400" rtl="0" eaLnBrk="1" latinLnBrk="0" hangingPunct="1">
+              <a:lnSpc>
+                <a:spcPct val="120000"/>
+              </a:lnSpc>
+              <a:spcBef>
+                <a:spcPts val="500"/>
+              </a:spcBef>
+              <a:buClr>
+                <a:schemeClr val="tx1"/>
+              </a:buClr>
+              <a:buFont typeface="Arial" panose="020B0604020202020204" pitchFamily="34" charset="0"/>
+              <a:buChar char="•"/>
+              <a:defRPr sz="1400" kern="1200" cap="all" baseline="0">
+                <a:solidFill>
+                  <a:schemeClr val="tx1"/>
+                </a:solidFill>
+                <a:effectLst/>
+                <a:latin typeface="+mn-lt"/>
+                <a:ea typeface="+mn-ea"/>
+                <a:cs typeface="+mn-cs"/>
+              </a:defRPr>
+            </a:lvl7pPr>
+            <a:lvl8pPr marL="3429000" indent="-228600" algn="l" defTabSz="914400" rtl="0" eaLnBrk="1" latinLnBrk="0" hangingPunct="1">
+              <a:lnSpc>
+                <a:spcPct val="120000"/>
+              </a:lnSpc>
+              <a:spcBef>
+                <a:spcPts val="500"/>
+              </a:spcBef>
+              <a:buClr>
+                <a:schemeClr val="tx1"/>
+              </a:buClr>
+              <a:buFont typeface="Arial" panose="020B0604020202020204" pitchFamily="34" charset="0"/>
+              <a:buChar char="•"/>
+              <a:defRPr sz="1400" kern="1200" cap="all" baseline="0">
+                <a:solidFill>
+                  <a:schemeClr val="tx1"/>
+                </a:solidFill>
+                <a:effectLst/>
+                <a:latin typeface="+mn-lt"/>
+                <a:ea typeface="+mn-ea"/>
+                <a:cs typeface="+mn-cs"/>
+              </a:defRPr>
+            </a:lvl8pPr>
+            <a:lvl9pPr marL="3886200" indent="-228600" algn="l" defTabSz="914400" rtl="0" eaLnBrk="1" latinLnBrk="0" hangingPunct="1">
+              <a:lnSpc>
+                <a:spcPct val="120000"/>
+              </a:lnSpc>
+              <a:spcBef>
+                <a:spcPts val="500"/>
+              </a:spcBef>
+              <a:buClr>
+                <a:schemeClr val="tx1"/>
+              </a:buClr>
+              <a:buFont typeface="Arial" panose="020B0604020202020204" pitchFamily="34" charset="0"/>
+              <a:buChar char="•"/>
+              <a:defRPr sz="1400" kern="1200" cap="all" baseline="0">
+                <a:solidFill>
+                  <a:schemeClr val="tx1"/>
+                </a:solidFill>
+                <a:effectLst/>
+                <a:latin typeface="+mn-lt"/>
+                <a:ea typeface="+mn-ea"/>
+                <a:cs typeface="+mn-cs"/>
+              </a:defRPr>
+            </a:lvl9pPr>
+          </a:lstStyle>
+          <a:p>
+            <a:r>
+              <a:rPr lang="en-US" dirty="0">
+                <a:solidFill>
+                  <a:srgbClr val="FF0000"/>
+                </a:solidFill>
+              </a:rPr>
+              <a:t>Alternative hypotheses</a:t>
+            </a:r>
+          </a:p>
+          <a:p>
+            <a:pPr lvl="1"/>
+            <a:r>
+              <a:rPr lang="en-US" dirty="0">
+                <a:solidFill>
+                  <a:srgbClr val="FF0000"/>
+                </a:solidFill>
+              </a:rPr>
+              <a:t>Current predictors</a:t>
+            </a:r>
+          </a:p>
+          <a:p>
+            <a:pPr lvl="2"/>
+            <a:r>
+              <a:rPr lang="en-US" dirty="0">
+                <a:solidFill>
+                  <a:srgbClr val="FF0000"/>
+                </a:solidFill>
+              </a:rPr>
+              <a:t>Scale/resolution</a:t>
+            </a:r>
+          </a:p>
+          <a:p>
+            <a:pPr lvl="2"/>
+            <a:r>
+              <a:rPr lang="en-US" dirty="0">
+                <a:solidFill>
+                  <a:srgbClr val="FF0000"/>
+                </a:solidFill>
+              </a:rPr>
+              <a:t>Temporal window (assumptions about</a:t>
+            </a:r>
+          </a:p>
+          <a:p>
+            <a:pPr lvl="1"/>
+            <a:r>
+              <a:rPr lang="en-US" dirty="0">
+                <a:solidFill>
+                  <a:srgbClr val="FF0000"/>
+                </a:solidFill>
+              </a:rPr>
+              <a:t>Other predictors</a:t>
+            </a:r>
+          </a:p>
+          <a:p>
+            <a:endParaRPr lang="en-US" dirty="0">
+              <a:solidFill>
+                <a:srgbClr val="FF0000"/>
+              </a:solidFill>
+            </a:endParaRPr>
           </a:p>
         </p:txBody>
       </p:sp>

</xml_diff>

<commit_message>
ERS: Update presentation deck. Update readme.
</commit_message>
<xml_diff>
--- a/Presentation.pptx
+++ b/Presentation.pptx
@@ -5,7 +5,7 @@
     <p:sldMasterId id="2147483838" r:id="rId1"/>
   </p:sldMasterIdLst>
   <p:notesMasterIdLst>
-    <p:notesMasterId r:id="rId12"/>
+    <p:notesMasterId r:id="rId11"/>
   </p:notesMasterIdLst>
   <p:sldIdLst>
     <p:sldId id="276" r:id="rId2"/>
@@ -15,9 +15,8 @@
     <p:sldId id="272" r:id="rId6"/>
     <p:sldId id="295" r:id="rId7"/>
     <p:sldId id="288" r:id="rId8"/>
-    <p:sldId id="294" r:id="rId9"/>
-    <p:sldId id="274" r:id="rId10"/>
-    <p:sldId id="275" r:id="rId11"/>
+    <p:sldId id="274" r:id="rId9"/>
+    <p:sldId id="275" r:id="rId10"/>
   </p:sldIdLst>
   <p:sldSz cx="12192000" cy="6858000"/>
   <p:notesSz cx="6858000" cy="9144000"/>
@@ -124,6 +123,2927 @@
 </p:presentation>
 </file>
 
+<file path=ppt/diagrams/colors1.xml><?xml version="1.0" encoding="utf-8"?>
+<dgm:colorsDef xmlns:dgm="http://schemas.openxmlformats.org/drawingml/2006/diagram" xmlns:a="http://schemas.openxmlformats.org/drawingml/2006/main" uniqueId="urn:microsoft.com/office/officeart/2005/8/colors/colorful5">
+  <dgm:title val=""/>
+  <dgm:desc val=""/>
+  <dgm:catLst>
+    <dgm:cat type="colorful" pri="10500"/>
+  </dgm:catLst>
+  <dgm:styleLbl name="node0">
+    <dgm:fillClrLst meth="repeat">
+      <a:schemeClr val="accent4"/>
+    </dgm:fillClrLst>
+    <dgm:linClrLst meth="repeat">
+      <a:schemeClr val="lt1"/>
+    </dgm:linClrLst>
+    <dgm:effectClrLst/>
+    <dgm:txLinClrLst/>
+    <dgm:txFillClrLst/>
+    <dgm:txEffectClrLst/>
+  </dgm:styleLbl>
+  <dgm:styleLbl name="node1">
+    <dgm:fillClrLst>
+      <a:schemeClr val="accent5"/>
+      <a:schemeClr val="accent6"/>
+    </dgm:fillClrLst>
+    <dgm:linClrLst meth="repeat">
+      <a:schemeClr val="lt1"/>
+    </dgm:linClrLst>
+    <dgm:effectClrLst/>
+    <dgm:txLinClrLst/>
+    <dgm:txFillClrLst/>
+    <dgm:txEffectClrLst/>
+  </dgm:styleLbl>
+  <dgm:styleLbl name="alignNode1">
+    <dgm:fillClrLst>
+      <a:schemeClr val="accent5"/>
+      <a:schemeClr val="accent6"/>
+    </dgm:fillClrLst>
+    <dgm:linClrLst>
+      <a:schemeClr val="accent5"/>
+      <a:schemeClr val="accent6"/>
+    </dgm:linClrLst>
+    <dgm:effectClrLst/>
+    <dgm:txLinClrLst/>
+    <dgm:txFillClrLst/>
+    <dgm:txEffectClrLst/>
+  </dgm:styleLbl>
+  <dgm:styleLbl name="lnNode1">
+    <dgm:fillClrLst>
+      <a:schemeClr val="accent5"/>
+      <a:schemeClr val="accent6"/>
+    </dgm:fillClrLst>
+    <dgm:linClrLst meth="repeat">
+      <a:schemeClr val="lt1"/>
+    </dgm:linClrLst>
+    <dgm:effectClrLst/>
+    <dgm:txLinClrLst/>
+    <dgm:txFillClrLst/>
+    <dgm:txEffectClrLst/>
+  </dgm:styleLbl>
+  <dgm:styleLbl name="vennNode1">
+    <dgm:fillClrLst>
+      <a:schemeClr val="accent5">
+        <a:alpha val="50000"/>
+      </a:schemeClr>
+      <a:schemeClr val="accent6">
+        <a:alpha val="50000"/>
+      </a:schemeClr>
+    </dgm:fillClrLst>
+    <dgm:linClrLst meth="repeat">
+      <a:schemeClr val="lt1"/>
+    </dgm:linClrLst>
+    <dgm:effectClrLst/>
+    <dgm:txLinClrLst/>
+    <dgm:txFillClrLst/>
+    <dgm:txEffectClrLst/>
+  </dgm:styleLbl>
+  <dgm:styleLbl name="node2">
+    <dgm:fillClrLst>
+      <a:schemeClr val="accent6"/>
+    </dgm:fillClrLst>
+    <dgm:linClrLst meth="repeat">
+      <a:schemeClr val="lt1"/>
+    </dgm:linClrLst>
+    <dgm:effectClrLst/>
+    <dgm:txLinClrLst/>
+    <dgm:txFillClrLst/>
+    <dgm:txEffectClrLst/>
+  </dgm:styleLbl>
+  <dgm:styleLbl name="node3">
+    <dgm:fillClrLst>
+      <a:schemeClr val="accent1"/>
+    </dgm:fillClrLst>
+    <dgm:linClrLst meth="repeat">
+      <a:schemeClr val="lt1"/>
+    </dgm:linClrLst>
+    <dgm:effectClrLst/>
+    <dgm:txLinClrLst/>
+    <dgm:txFillClrLst/>
+    <dgm:txEffectClrLst/>
+  </dgm:styleLbl>
+  <dgm:styleLbl name="node4">
+    <dgm:fillClrLst>
+      <a:schemeClr val="accent2"/>
+    </dgm:fillClrLst>
+    <dgm:linClrLst meth="repeat">
+      <a:schemeClr val="lt1"/>
+    </dgm:linClrLst>
+    <dgm:effectClrLst/>
+    <dgm:txLinClrLst/>
+    <dgm:txFillClrLst/>
+    <dgm:txEffectClrLst/>
+  </dgm:styleLbl>
+  <dgm:styleLbl name="fgImgPlace1">
+    <dgm:fillClrLst>
+      <a:schemeClr val="accent5">
+        <a:tint val="50000"/>
+      </a:schemeClr>
+      <a:schemeClr val="accent6">
+        <a:tint val="50000"/>
+      </a:schemeClr>
+    </dgm:fillClrLst>
+    <dgm:linClrLst meth="repeat">
+      <a:schemeClr val="lt1"/>
+    </dgm:linClrLst>
+    <dgm:effectClrLst/>
+    <dgm:txLinClrLst/>
+    <dgm:txFillClrLst meth="repeat">
+      <a:schemeClr val="lt1"/>
+    </dgm:txFillClrLst>
+    <dgm:txEffectClrLst/>
+  </dgm:styleLbl>
+  <dgm:styleLbl name="alignImgPlace1">
+    <dgm:fillClrLst>
+      <a:schemeClr val="accent5">
+        <a:tint val="50000"/>
+      </a:schemeClr>
+      <a:schemeClr val="accent6">
+        <a:tint val="20000"/>
+      </a:schemeClr>
+    </dgm:fillClrLst>
+    <dgm:linClrLst meth="repeat">
+      <a:schemeClr val="lt1"/>
+    </dgm:linClrLst>
+    <dgm:effectClrLst/>
+    <dgm:txLinClrLst/>
+    <dgm:txFillClrLst meth="repeat">
+      <a:schemeClr val="lt1"/>
+    </dgm:txFillClrLst>
+    <dgm:txEffectClrLst/>
+  </dgm:styleLbl>
+  <dgm:styleLbl name="bgImgPlace1">
+    <dgm:fillClrLst>
+      <a:schemeClr val="accent5">
+        <a:tint val="50000"/>
+      </a:schemeClr>
+      <a:schemeClr val="accent6">
+        <a:tint val="20000"/>
+      </a:schemeClr>
+    </dgm:fillClrLst>
+    <dgm:linClrLst meth="repeat">
+      <a:schemeClr val="lt1"/>
+    </dgm:linClrLst>
+    <dgm:effectClrLst/>
+    <dgm:txLinClrLst/>
+    <dgm:txFillClrLst meth="repeat">
+      <a:schemeClr val="lt1"/>
+    </dgm:txFillClrLst>
+    <dgm:txEffectClrLst/>
+  </dgm:styleLbl>
+  <dgm:styleLbl name="sibTrans2D1">
+    <dgm:fillClrLst>
+      <a:schemeClr val="accent5"/>
+      <a:schemeClr val="accent6"/>
+    </dgm:fillClrLst>
+    <dgm:linClrLst meth="repeat">
+      <a:schemeClr val="lt1"/>
+    </dgm:linClrLst>
+    <dgm:effectClrLst/>
+    <dgm:txLinClrLst/>
+    <dgm:txFillClrLst/>
+    <dgm:txEffectClrLst/>
+  </dgm:styleLbl>
+  <dgm:styleLbl name="fgSibTrans2D1">
+    <dgm:fillClrLst>
+      <a:schemeClr val="accent5"/>
+      <a:schemeClr val="accent6"/>
+    </dgm:fillClrLst>
+    <dgm:linClrLst meth="repeat">
+      <a:schemeClr val="lt1"/>
+    </dgm:linClrLst>
+    <dgm:effectClrLst/>
+    <dgm:txLinClrLst/>
+    <dgm:txFillClrLst meth="repeat">
+      <a:schemeClr val="lt1"/>
+    </dgm:txFillClrLst>
+    <dgm:txEffectClrLst/>
+  </dgm:styleLbl>
+  <dgm:styleLbl name="bgSibTrans2D1">
+    <dgm:fillClrLst>
+      <a:schemeClr val="accent5"/>
+      <a:schemeClr val="accent6"/>
+    </dgm:fillClrLst>
+    <dgm:linClrLst meth="repeat">
+      <a:schemeClr val="lt1"/>
+    </dgm:linClrLst>
+    <dgm:effectClrLst/>
+    <dgm:txLinClrLst/>
+    <dgm:txFillClrLst meth="repeat">
+      <a:schemeClr val="lt1"/>
+    </dgm:txFillClrLst>
+    <dgm:txEffectClrLst/>
+  </dgm:styleLbl>
+  <dgm:styleLbl name="sibTrans1D1">
+    <dgm:fillClrLst/>
+    <dgm:linClrLst>
+      <a:schemeClr val="accent5"/>
+      <a:schemeClr val="accent6"/>
+    </dgm:linClrLst>
+    <dgm:effectClrLst/>
+    <dgm:txLinClrLst/>
+    <dgm:txFillClrLst meth="repeat">
+      <a:schemeClr val="tx1"/>
+    </dgm:txFillClrLst>
+    <dgm:txEffectClrLst/>
+  </dgm:styleLbl>
+  <dgm:styleLbl name="callout">
+    <dgm:fillClrLst meth="repeat">
+      <a:schemeClr val="accent5"/>
+    </dgm:fillClrLst>
+    <dgm:linClrLst meth="repeat">
+      <a:schemeClr val="accent5">
+        <a:tint val="50000"/>
+      </a:schemeClr>
+    </dgm:linClrLst>
+    <dgm:effectClrLst/>
+    <dgm:txLinClrLst/>
+    <dgm:txFillClrLst meth="repeat">
+      <a:schemeClr val="tx1"/>
+    </dgm:txFillClrLst>
+    <dgm:txEffectClrLst/>
+  </dgm:styleLbl>
+  <dgm:styleLbl name="asst0">
+    <dgm:fillClrLst meth="repeat">
+      <a:schemeClr val="accent5"/>
+    </dgm:fillClrLst>
+    <dgm:linClrLst meth="repeat">
+      <a:schemeClr val="lt1">
+        <a:shade val="80000"/>
+      </a:schemeClr>
+    </dgm:linClrLst>
+    <dgm:effectClrLst/>
+    <dgm:txLinClrLst/>
+    <dgm:txFillClrLst/>
+    <dgm:txEffectClrLst/>
+  </dgm:styleLbl>
+  <dgm:styleLbl name="asst1">
+    <dgm:fillClrLst meth="repeat">
+      <a:schemeClr val="accent6"/>
+    </dgm:fillClrLst>
+    <dgm:linClrLst meth="repeat">
+      <a:schemeClr val="lt1">
+        <a:shade val="80000"/>
+      </a:schemeClr>
+    </dgm:linClrLst>
+    <dgm:effectClrLst/>
+    <dgm:txLinClrLst/>
+    <dgm:txFillClrLst/>
+    <dgm:txEffectClrLst/>
+  </dgm:styleLbl>
+  <dgm:styleLbl name="asst2">
+    <dgm:fillClrLst>
+      <a:schemeClr val="accent1"/>
+    </dgm:fillClrLst>
+    <dgm:linClrLst meth="repeat">
+      <a:schemeClr val="lt1"/>
+    </dgm:linClrLst>
+    <dgm:effectClrLst/>
+    <dgm:txLinClrLst/>
+    <dgm:txFillClrLst/>
+    <dgm:txEffectClrLst/>
+  </dgm:styleLbl>
+  <dgm:styleLbl name="asst3">
+    <dgm:fillClrLst>
+      <a:schemeClr val="accent2"/>
+    </dgm:fillClrLst>
+    <dgm:linClrLst meth="repeat">
+      <a:schemeClr val="lt1"/>
+    </dgm:linClrLst>
+    <dgm:effectClrLst/>
+    <dgm:txLinClrLst/>
+    <dgm:txFillClrLst/>
+    <dgm:txEffectClrLst/>
+  </dgm:styleLbl>
+  <dgm:styleLbl name="asst4">
+    <dgm:fillClrLst>
+      <a:schemeClr val="accent3"/>
+    </dgm:fillClrLst>
+    <dgm:linClrLst meth="repeat">
+      <a:schemeClr val="lt1"/>
+    </dgm:linClrLst>
+    <dgm:effectClrLst/>
+    <dgm:txLinClrLst/>
+    <dgm:txFillClrLst/>
+    <dgm:txEffectClrLst/>
+  </dgm:styleLbl>
+  <dgm:styleLbl name="parChTrans2D1">
+    <dgm:fillClrLst meth="repeat">
+      <a:schemeClr val="accent5"/>
+    </dgm:fillClrLst>
+    <dgm:linClrLst meth="repeat">
+      <a:schemeClr val="lt1"/>
+    </dgm:linClrLst>
+    <dgm:effectClrLst/>
+    <dgm:txLinClrLst/>
+    <dgm:txFillClrLst meth="repeat">
+      <a:schemeClr val="lt1"/>
+    </dgm:txFillClrLst>
+    <dgm:txEffectClrLst/>
+  </dgm:styleLbl>
+  <dgm:styleLbl name="parChTrans2D2">
+    <dgm:fillClrLst meth="repeat">
+      <a:schemeClr val="accent6"/>
+    </dgm:fillClrLst>
+    <dgm:linClrLst meth="repeat">
+      <a:schemeClr val="lt1"/>
+    </dgm:linClrLst>
+    <dgm:effectClrLst/>
+    <dgm:txLinClrLst/>
+    <dgm:txFillClrLst/>
+    <dgm:txEffectClrLst/>
+  </dgm:styleLbl>
+  <dgm:styleLbl name="parChTrans2D3">
+    <dgm:fillClrLst meth="repeat">
+      <a:schemeClr val="accent6"/>
+    </dgm:fillClrLst>
+    <dgm:linClrLst meth="repeat">
+      <a:schemeClr val="lt1"/>
+    </dgm:linClrLst>
+    <dgm:effectClrLst/>
+    <dgm:txLinClrLst/>
+    <dgm:txFillClrLst/>
+    <dgm:txEffectClrLst/>
+  </dgm:styleLbl>
+  <dgm:styleLbl name="parChTrans2D4">
+    <dgm:fillClrLst meth="repeat">
+      <a:schemeClr val="accent1"/>
+    </dgm:fillClrLst>
+    <dgm:linClrLst meth="repeat">
+      <a:schemeClr val="lt1"/>
+    </dgm:linClrLst>
+    <dgm:effectClrLst/>
+    <dgm:txLinClrLst/>
+    <dgm:txFillClrLst meth="repeat">
+      <a:schemeClr val="lt1"/>
+    </dgm:txFillClrLst>
+    <dgm:txEffectClrLst/>
+  </dgm:styleLbl>
+  <dgm:styleLbl name="parChTrans1D1">
+    <dgm:fillClrLst meth="repeat">
+      <a:schemeClr val="accent5"/>
+    </dgm:fillClrLst>
+    <dgm:linClrLst meth="repeat">
+      <a:schemeClr val="accent5"/>
+    </dgm:linClrLst>
+    <dgm:effectClrLst/>
+    <dgm:txLinClrLst/>
+    <dgm:txFillClrLst meth="repeat">
+      <a:schemeClr val="tx1"/>
+    </dgm:txFillClrLst>
+    <dgm:txEffectClrLst/>
+  </dgm:styleLbl>
+  <dgm:styleLbl name="parChTrans1D2">
+    <dgm:fillClrLst meth="repeat">
+      <a:schemeClr val="accent6">
+        <a:tint val="90000"/>
+      </a:schemeClr>
+    </dgm:fillClrLst>
+    <dgm:linClrLst meth="repeat">
+      <a:schemeClr val="accent6"/>
+    </dgm:linClrLst>
+    <dgm:effectClrLst/>
+    <dgm:txLinClrLst/>
+    <dgm:txFillClrLst meth="repeat">
+      <a:schemeClr val="tx1"/>
+    </dgm:txFillClrLst>
+    <dgm:txEffectClrLst/>
+  </dgm:styleLbl>
+  <dgm:styleLbl name="parChTrans1D3">
+    <dgm:fillClrLst meth="repeat">
+      <a:schemeClr val="accent6">
+        <a:tint val="70000"/>
+      </a:schemeClr>
+    </dgm:fillClrLst>
+    <dgm:linClrLst meth="repeat">
+      <a:schemeClr val="accent1"/>
+    </dgm:linClrLst>
+    <dgm:effectClrLst/>
+    <dgm:txLinClrLst/>
+    <dgm:txFillClrLst meth="repeat">
+      <a:schemeClr val="tx1"/>
+    </dgm:txFillClrLst>
+    <dgm:txEffectClrLst/>
+  </dgm:styleLbl>
+  <dgm:styleLbl name="parChTrans1D4">
+    <dgm:fillClrLst meth="repeat">
+      <a:schemeClr val="accent6">
+        <a:tint val="50000"/>
+      </a:schemeClr>
+    </dgm:fillClrLst>
+    <dgm:linClrLst meth="repeat">
+      <a:schemeClr val="accent2"/>
+    </dgm:linClrLst>
+    <dgm:effectClrLst/>
+    <dgm:txLinClrLst/>
+    <dgm:txFillClrLst meth="repeat">
+      <a:schemeClr val="tx1"/>
+    </dgm:txFillClrLst>
+    <dgm:txEffectClrLst/>
+  </dgm:styleLbl>
+  <dgm:styleLbl name="fgAcc1">
+    <dgm:fillClrLst meth="repeat">
+      <a:schemeClr val="lt1">
+        <a:alpha val="90000"/>
+      </a:schemeClr>
+    </dgm:fillClrLst>
+    <dgm:linClrLst>
+      <a:schemeClr val="accent5"/>
+      <a:schemeClr val="accent6"/>
+    </dgm:linClrLst>
+    <dgm:effectClrLst/>
+    <dgm:txLinClrLst/>
+    <dgm:txFillClrLst meth="repeat">
+      <a:schemeClr val="dk1"/>
+    </dgm:txFillClrLst>
+    <dgm:txEffectClrLst/>
+  </dgm:styleLbl>
+  <dgm:styleLbl name="conFgAcc1">
+    <dgm:fillClrLst meth="repeat">
+      <a:schemeClr val="lt1">
+        <a:alpha val="90000"/>
+      </a:schemeClr>
+    </dgm:fillClrLst>
+    <dgm:linClrLst>
+      <a:schemeClr val="accent5"/>
+      <a:schemeClr val="accent6"/>
+    </dgm:linClrLst>
+    <dgm:effectClrLst/>
+    <dgm:txLinClrLst/>
+    <dgm:txFillClrLst meth="repeat">
+      <a:schemeClr val="dk1"/>
+    </dgm:txFillClrLst>
+    <dgm:txEffectClrLst/>
+  </dgm:styleLbl>
+  <dgm:styleLbl name="alignAcc1">
+    <dgm:fillClrLst meth="repeat">
+      <a:schemeClr val="lt1">
+        <a:alpha val="90000"/>
+      </a:schemeClr>
+    </dgm:fillClrLst>
+    <dgm:linClrLst>
+      <a:schemeClr val="accent5"/>
+      <a:schemeClr val="accent6"/>
+    </dgm:linClrLst>
+    <dgm:effectClrLst/>
+    <dgm:txLinClrLst/>
+    <dgm:txFillClrLst meth="repeat">
+      <a:schemeClr val="dk1"/>
+    </dgm:txFillClrLst>
+    <dgm:txEffectClrLst/>
+  </dgm:styleLbl>
+  <dgm:styleLbl name="trAlignAcc1">
+    <dgm:fillClrLst meth="repeat">
+      <a:schemeClr val="lt1">
+        <a:alpha val="40000"/>
+      </a:schemeClr>
+    </dgm:fillClrLst>
+    <dgm:linClrLst meth="repeat">
+      <a:schemeClr val="accent5"/>
+    </dgm:linClrLst>
+    <dgm:effectClrLst/>
+    <dgm:txLinClrLst/>
+    <dgm:txFillClrLst meth="repeat">
+      <a:schemeClr val="dk1"/>
+    </dgm:txFillClrLst>
+    <dgm:txEffectClrLst/>
+  </dgm:styleLbl>
+  <dgm:styleLbl name="bgAcc1">
+    <dgm:fillClrLst meth="repeat">
+      <a:schemeClr val="lt1">
+        <a:alpha val="90000"/>
+      </a:schemeClr>
+    </dgm:fillClrLst>
+    <dgm:linClrLst>
+      <a:schemeClr val="accent5"/>
+      <a:schemeClr val="accent6"/>
+    </dgm:linClrLst>
+    <dgm:effectClrLst/>
+    <dgm:txLinClrLst/>
+    <dgm:txFillClrLst meth="repeat">
+      <a:schemeClr val="dk1"/>
+    </dgm:txFillClrLst>
+    <dgm:txEffectClrLst/>
+  </dgm:styleLbl>
+  <dgm:styleLbl name="solidFgAcc1">
+    <dgm:fillClrLst meth="repeat">
+      <a:schemeClr val="lt1"/>
+    </dgm:fillClrLst>
+    <dgm:linClrLst>
+      <a:schemeClr val="accent5"/>
+      <a:schemeClr val="accent6"/>
+    </dgm:linClrLst>
+    <dgm:effectClrLst/>
+    <dgm:txLinClrLst/>
+    <dgm:txFillClrLst meth="repeat">
+      <a:schemeClr val="dk1"/>
+    </dgm:txFillClrLst>
+    <dgm:txEffectClrLst/>
+  </dgm:styleLbl>
+  <dgm:styleLbl name="solidAlignAcc1">
+    <dgm:fillClrLst meth="repeat">
+      <a:schemeClr val="lt1"/>
+    </dgm:fillClrLst>
+    <dgm:linClrLst>
+      <a:schemeClr val="accent5"/>
+      <a:schemeClr val="accent6"/>
+    </dgm:linClrLst>
+    <dgm:effectClrLst/>
+    <dgm:txLinClrLst/>
+    <dgm:txFillClrLst meth="repeat">
+      <a:schemeClr val="dk1"/>
+    </dgm:txFillClrLst>
+    <dgm:txEffectClrLst/>
+  </dgm:styleLbl>
+  <dgm:styleLbl name="solidBgAcc1">
+    <dgm:fillClrLst meth="repeat">
+      <a:schemeClr val="lt1"/>
+    </dgm:fillClrLst>
+    <dgm:linClrLst>
+      <a:schemeClr val="accent5"/>
+      <a:schemeClr val="accent6"/>
+    </dgm:linClrLst>
+    <dgm:effectClrLst/>
+    <dgm:txLinClrLst/>
+    <dgm:txFillClrLst meth="repeat">
+      <a:schemeClr val="dk1"/>
+    </dgm:txFillClrLst>
+    <dgm:txEffectClrLst/>
+  </dgm:styleLbl>
+  <dgm:styleLbl name="fgAccFollowNode1">
+    <dgm:fillClrLst>
+      <a:schemeClr val="accent5">
+        <a:tint val="40000"/>
+        <a:alpha val="90000"/>
+      </a:schemeClr>
+      <a:schemeClr val="accent6">
+        <a:tint val="40000"/>
+        <a:alpha val="90000"/>
+      </a:schemeClr>
+    </dgm:fillClrLst>
+    <dgm:linClrLst>
+      <a:schemeClr val="accent5">
+        <a:tint val="40000"/>
+        <a:alpha val="90000"/>
+      </a:schemeClr>
+      <a:schemeClr val="accent5">
+        <a:tint val="40000"/>
+        <a:alpha val="90000"/>
+      </a:schemeClr>
+    </dgm:linClrLst>
+    <dgm:effectClrLst/>
+    <dgm:txLinClrLst/>
+    <dgm:txFillClrLst meth="repeat">
+      <a:schemeClr val="dk1"/>
+    </dgm:txFillClrLst>
+    <dgm:txEffectClrLst/>
+  </dgm:styleLbl>
+  <dgm:styleLbl name="alignAccFollowNode1">
+    <dgm:fillClrLst>
+      <a:schemeClr val="accent5">
+        <a:tint val="40000"/>
+        <a:alpha val="90000"/>
+      </a:schemeClr>
+      <a:schemeClr val="accent6">
+        <a:tint val="40000"/>
+        <a:alpha val="90000"/>
+      </a:schemeClr>
+    </dgm:fillClrLst>
+    <dgm:linClrLst>
+      <a:schemeClr val="accent5">
+        <a:tint val="40000"/>
+        <a:alpha val="90000"/>
+      </a:schemeClr>
+      <a:schemeClr val="accent6">
+        <a:tint val="40000"/>
+        <a:alpha val="90000"/>
+      </a:schemeClr>
+    </dgm:linClrLst>
+    <dgm:effectClrLst/>
+    <dgm:txLinClrLst/>
+    <dgm:txFillClrLst meth="repeat">
+      <a:schemeClr val="dk1"/>
+    </dgm:txFillClrLst>
+    <dgm:txEffectClrLst/>
+  </dgm:styleLbl>
+  <dgm:styleLbl name="bgAccFollowNode1">
+    <dgm:fillClrLst>
+      <a:schemeClr val="accent5">
+        <a:tint val="40000"/>
+        <a:alpha val="90000"/>
+      </a:schemeClr>
+      <a:schemeClr val="accent6">
+        <a:tint val="40000"/>
+        <a:alpha val="90000"/>
+      </a:schemeClr>
+    </dgm:fillClrLst>
+    <dgm:linClrLst>
+      <a:schemeClr val="accent5">
+        <a:tint val="40000"/>
+        <a:alpha val="90000"/>
+      </a:schemeClr>
+      <a:schemeClr val="accent6">
+        <a:tint val="40000"/>
+        <a:alpha val="90000"/>
+      </a:schemeClr>
+    </dgm:linClrLst>
+    <dgm:effectClrLst/>
+    <dgm:txLinClrLst/>
+    <dgm:txFillClrLst meth="repeat">
+      <a:schemeClr val="dk1"/>
+    </dgm:txFillClrLst>
+    <dgm:txEffectClrLst/>
+  </dgm:styleLbl>
+  <dgm:styleLbl name="fgAcc0">
+    <dgm:fillClrLst meth="repeat">
+      <a:schemeClr val="lt1">
+        <a:alpha val="90000"/>
+      </a:schemeClr>
+    </dgm:fillClrLst>
+    <dgm:linClrLst>
+      <a:schemeClr val="accent4"/>
+    </dgm:linClrLst>
+    <dgm:effectClrLst/>
+    <dgm:txLinClrLst/>
+    <dgm:txFillClrLst meth="repeat">
+      <a:schemeClr val="dk1"/>
+    </dgm:txFillClrLst>
+    <dgm:txEffectClrLst/>
+  </dgm:styleLbl>
+  <dgm:styleLbl name="fgAcc2">
+    <dgm:fillClrLst meth="repeat">
+      <a:schemeClr val="lt1">
+        <a:alpha val="90000"/>
+      </a:schemeClr>
+    </dgm:fillClrLst>
+    <dgm:linClrLst>
+      <a:schemeClr val="accent6"/>
+    </dgm:linClrLst>
+    <dgm:effectClrLst/>
+    <dgm:txLinClrLst/>
+    <dgm:txFillClrLst meth="repeat">
+      <a:schemeClr val="dk1"/>
+    </dgm:txFillClrLst>
+    <dgm:txEffectClrLst/>
+  </dgm:styleLbl>
+  <dgm:styleLbl name="fgAcc3">
+    <dgm:fillClrLst meth="repeat">
+      <a:schemeClr val="lt1">
+        <a:alpha val="90000"/>
+      </a:schemeClr>
+    </dgm:fillClrLst>
+    <dgm:linClrLst>
+      <a:schemeClr val="accent1"/>
+    </dgm:linClrLst>
+    <dgm:effectClrLst/>
+    <dgm:txLinClrLst/>
+    <dgm:txFillClrLst meth="repeat">
+      <a:schemeClr val="dk1"/>
+    </dgm:txFillClrLst>
+    <dgm:txEffectClrLst/>
+  </dgm:styleLbl>
+  <dgm:styleLbl name="fgAcc4">
+    <dgm:fillClrLst meth="repeat">
+      <a:schemeClr val="lt1">
+        <a:alpha val="90000"/>
+      </a:schemeClr>
+    </dgm:fillClrLst>
+    <dgm:linClrLst>
+      <a:schemeClr val="accent2"/>
+    </dgm:linClrLst>
+    <dgm:effectClrLst/>
+    <dgm:txLinClrLst/>
+    <dgm:txFillClrLst meth="repeat">
+      <a:schemeClr val="dk1"/>
+    </dgm:txFillClrLst>
+    <dgm:txEffectClrLst/>
+  </dgm:styleLbl>
+  <dgm:styleLbl name="bgShp">
+    <dgm:fillClrLst meth="repeat">
+      <a:schemeClr val="accent5">
+        <a:tint val="40000"/>
+      </a:schemeClr>
+    </dgm:fillClrLst>
+    <dgm:linClrLst meth="repeat">
+      <a:schemeClr val="dk1"/>
+    </dgm:linClrLst>
+    <dgm:effectClrLst/>
+    <dgm:txLinClrLst/>
+    <dgm:txFillClrLst meth="repeat">
+      <a:schemeClr val="dk1"/>
+    </dgm:txFillClrLst>
+    <dgm:txEffectClrLst/>
+  </dgm:styleLbl>
+  <dgm:styleLbl name="dkBgShp">
+    <dgm:fillClrLst meth="repeat">
+      <a:schemeClr val="accent5">
+        <a:shade val="90000"/>
+      </a:schemeClr>
+    </dgm:fillClrLst>
+    <dgm:linClrLst meth="repeat">
+      <a:schemeClr val="dk1"/>
+    </dgm:linClrLst>
+    <dgm:effectClrLst/>
+    <dgm:txLinClrLst/>
+    <dgm:txFillClrLst meth="repeat">
+      <a:schemeClr val="lt1"/>
+    </dgm:txFillClrLst>
+    <dgm:txEffectClrLst/>
+  </dgm:styleLbl>
+  <dgm:styleLbl name="trBgShp">
+    <dgm:fillClrLst meth="repeat">
+      <a:schemeClr val="accent5">
+        <a:tint val="50000"/>
+        <a:alpha val="40000"/>
+      </a:schemeClr>
+    </dgm:fillClrLst>
+    <dgm:linClrLst meth="repeat">
+      <a:schemeClr val="accent5"/>
+    </dgm:linClrLst>
+    <dgm:effectClrLst/>
+    <dgm:txLinClrLst/>
+    <dgm:txFillClrLst meth="repeat">
+      <a:schemeClr val="lt1"/>
+    </dgm:txFillClrLst>
+    <dgm:txEffectClrLst/>
+  </dgm:styleLbl>
+  <dgm:styleLbl name="fgShp">
+    <dgm:fillClrLst meth="repeat">
+      <a:schemeClr val="accent5">
+        <a:tint val="40000"/>
+      </a:schemeClr>
+    </dgm:fillClrLst>
+    <dgm:linClrLst meth="repeat">
+      <a:schemeClr val="lt1"/>
+    </dgm:linClrLst>
+    <dgm:effectClrLst/>
+    <dgm:txLinClrLst/>
+    <dgm:txFillClrLst meth="repeat">
+      <a:schemeClr val="dk1"/>
+    </dgm:txFillClrLst>
+    <dgm:txEffectClrLst/>
+  </dgm:styleLbl>
+  <dgm:styleLbl name="revTx">
+    <dgm:fillClrLst meth="repeat">
+      <a:schemeClr val="lt1">
+        <a:alpha val="0"/>
+      </a:schemeClr>
+    </dgm:fillClrLst>
+    <dgm:linClrLst meth="repeat">
+      <a:schemeClr val="dk1">
+        <a:alpha val="0"/>
+      </a:schemeClr>
+    </dgm:linClrLst>
+    <dgm:effectClrLst/>
+    <dgm:txLinClrLst/>
+    <dgm:txFillClrLst meth="repeat">
+      <a:schemeClr val="tx1"/>
+    </dgm:txFillClrLst>
+    <dgm:txEffectClrLst/>
+  </dgm:styleLbl>
+</dgm:colorsDef>
+</file>
+
+<file path=ppt/diagrams/data1.xml><?xml version="1.0" encoding="utf-8"?>
+<dgm:dataModel xmlns:dgm="http://schemas.openxmlformats.org/drawingml/2006/diagram" xmlns:a="http://schemas.openxmlformats.org/drawingml/2006/main">
+  <dgm:ptLst>
+    <dgm:pt modelId="{8594FCD1-59F5-4DB1-80B4-AC8E5FEA940E}" type="doc">
+      <dgm:prSet loTypeId="urn:microsoft.com/office/officeart/2005/8/layout/process1" loCatId="process" qsTypeId="urn:microsoft.com/office/officeart/2005/8/quickstyle/simple1" qsCatId="simple" csTypeId="urn:microsoft.com/office/officeart/2005/8/colors/colorful5" csCatId="colorful" phldr="1"/>
+      <dgm:spPr/>
+    </dgm:pt>
+    <dgm:pt modelId="{F5276362-0B3C-422C-BFB2-27B41818EC34}">
+      <dgm:prSet phldrT="[Text]" custT="1"/>
+      <dgm:spPr/>
+      <dgm:t>
+        <a:bodyPr/>
+        <a:lstStyle/>
+        <a:p>
+          <a:r>
+            <a:rPr lang="en-US" sz="2400" b="1" dirty="0"/>
+            <a:t>Extract</a:t>
+          </a:r>
+          <a:r>
+            <a:rPr lang="en-US" sz="1800" dirty="0"/>
+            <a:t>:  </a:t>
+          </a:r>
+        </a:p>
+        <a:p>
+          <a:r>
+            <a:rPr lang="en-US" sz="1800" dirty="0"/>
+            <a:t>Web scrape Temp/</a:t>
+          </a:r>
+          <a:r>
+            <a:rPr lang="en-US" sz="1800" dirty="0" err="1"/>
+            <a:t>Precip</a:t>
+          </a:r>
+          <a:r>
+            <a:rPr lang="en-US" sz="1800" dirty="0"/>
+            <a:t> and illness data into Pandas </a:t>
+          </a:r>
+          <a:r>
+            <a:rPr lang="en-US" sz="1800" dirty="0" err="1"/>
+            <a:t>Dataframes</a:t>
+          </a:r>
+          <a:r>
+            <a:rPr lang="en-US" sz="1800" dirty="0"/>
+            <a:t> and CSV files</a:t>
+          </a:r>
+        </a:p>
+      </dgm:t>
+    </dgm:pt>
+    <dgm:pt modelId="{620C2E60-5065-4F3F-AD08-16D57D5124F2}" type="parTrans" cxnId="{3DD3FBC7-F5FE-4F55-B3E0-52376563F193}">
+      <dgm:prSet/>
+      <dgm:spPr/>
+      <dgm:t>
+        <a:bodyPr/>
+        <a:lstStyle/>
+        <a:p>
+          <a:endParaRPr lang="en-US"/>
+        </a:p>
+      </dgm:t>
+    </dgm:pt>
+    <dgm:pt modelId="{CBF557D5-8CF8-44F0-A8E3-985CC365223B}" type="sibTrans" cxnId="{3DD3FBC7-F5FE-4F55-B3E0-52376563F193}">
+      <dgm:prSet/>
+      <dgm:spPr/>
+      <dgm:t>
+        <a:bodyPr/>
+        <a:lstStyle/>
+        <a:p>
+          <a:endParaRPr lang="en-US"/>
+        </a:p>
+      </dgm:t>
+    </dgm:pt>
+    <dgm:pt modelId="{55102640-1BC6-4D77-B6ED-9F80A416F100}">
+      <dgm:prSet phldrT="[Text]" custT="1"/>
+      <dgm:spPr/>
+      <dgm:t>
+        <a:bodyPr/>
+        <a:lstStyle/>
+        <a:p>
+          <a:r>
+            <a:rPr lang="en-US" sz="2400" b="1" dirty="0"/>
+            <a:t>Transform</a:t>
+          </a:r>
+          <a:r>
+            <a:rPr lang="en-US" sz="1900" dirty="0"/>
+            <a:t>:  Clean data using regex and .replace(). Reorganize columns.</a:t>
+          </a:r>
+        </a:p>
+      </dgm:t>
+    </dgm:pt>
+    <dgm:pt modelId="{C6480FFE-0912-4815-9CBE-918EAE5AE9D2}" type="parTrans" cxnId="{77B9C251-D478-499E-ACB9-8CCDE609B5E7}">
+      <dgm:prSet/>
+      <dgm:spPr/>
+      <dgm:t>
+        <a:bodyPr/>
+        <a:lstStyle/>
+        <a:p>
+          <a:endParaRPr lang="en-US"/>
+        </a:p>
+      </dgm:t>
+    </dgm:pt>
+    <dgm:pt modelId="{C0EE3714-FF31-4C1A-9A22-D73021CC72F7}" type="sibTrans" cxnId="{77B9C251-D478-499E-ACB9-8CCDE609B5E7}">
+      <dgm:prSet/>
+      <dgm:spPr/>
+      <dgm:t>
+        <a:bodyPr/>
+        <a:lstStyle/>
+        <a:p>
+          <a:endParaRPr lang="en-US"/>
+        </a:p>
+      </dgm:t>
+    </dgm:pt>
+    <dgm:pt modelId="{14F5C771-6822-4F85-A29E-F3E561A20D9A}">
+      <dgm:prSet phldrT="[Text]" custT="1"/>
+      <dgm:spPr/>
+      <dgm:t>
+        <a:bodyPr/>
+        <a:lstStyle/>
+        <a:p>
+          <a:r>
+            <a:rPr lang="en-US" sz="2800" b="1" dirty="0"/>
+            <a:t>Load</a:t>
+          </a:r>
+          <a:r>
+            <a:rPr lang="en-US" sz="2300" dirty="0"/>
+            <a:t>: </a:t>
+          </a:r>
+        </a:p>
+        <a:p>
+          <a:r>
+            <a:rPr lang="en-US" sz="2300" dirty="0"/>
+            <a:t> Import cleaned data to PostgreSQL server.</a:t>
+          </a:r>
+        </a:p>
+      </dgm:t>
+    </dgm:pt>
+    <dgm:pt modelId="{6B3189E0-3ABB-41CA-A678-EC0DFECCA66D}" type="parTrans" cxnId="{BE2AFBD2-0653-4FBF-BD8C-13101D4907AF}">
+      <dgm:prSet/>
+      <dgm:spPr/>
+      <dgm:t>
+        <a:bodyPr/>
+        <a:lstStyle/>
+        <a:p>
+          <a:endParaRPr lang="en-US"/>
+        </a:p>
+      </dgm:t>
+    </dgm:pt>
+    <dgm:pt modelId="{39E0DE9D-2F9A-4422-9890-449498B259AD}" type="sibTrans" cxnId="{BE2AFBD2-0653-4FBF-BD8C-13101D4907AF}">
+      <dgm:prSet/>
+      <dgm:spPr/>
+      <dgm:t>
+        <a:bodyPr/>
+        <a:lstStyle/>
+        <a:p>
+          <a:endParaRPr lang="en-US"/>
+        </a:p>
+      </dgm:t>
+    </dgm:pt>
+    <dgm:pt modelId="{75C2B7B8-0B58-4433-BA15-CCBD8AC5BCC9}">
+      <dgm:prSet phldrT="[Text]" custT="1"/>
+      <dgm:spPr/>
+      <dgm:t>
+        <a:bodyPr/>
+        <a:lstStyle/>
+        <a:p>
+          <a:r>
+            <a:rPr lang="en-US" sz="2800" b="1" dirty="0"/>
+            <a:t>Transmit</a:t>
+          </a:r>
+          <a:r>
+            <a:rPr lang="en-US" sz="2300" dirty="0"/>
+            <a:t>:  Reflect Postgres tables to Flask app.py using </a:t>
+          </a:r>
+          <a:r>
+            <a:rPr lang="en-US" sz="2300" dirty="0" err="1"/>
+            <a:t>SQLAlchemy</a:t>
+          </a:r>
+          <a:r>
+            <a:rPr lang="en-US" sz="2300" dirty="0"/>
+            <a:t>.</a:t>
+          </a:r>
+        </a:p>
+        <a:p>
+          <a:endParaRPr lang="en-US" sz="2300" dirty="0"/>
+        </a:p>
+        <a:p>
+          <a:r>
+            <a:rPr lang="en-US" sz="2300" dirty="0"/>
+            <a:t>Read CSV tables in JavaScript.</a:t>
+          </a:r>
+        </a:p>
+      </dgm:t>
+    </dgm:pt>
+    <dgm:pt modelId="{3332251D-B2B1-4E04-9DAB-EC1363C4850C}" type="parTrans" cxnId="{005195BE-4F50-41BB-A5F1-2E7A23E9294E}">
+      <dgm:prSet/>
+      <dgm:spPr/>
+      <dgm:t>
+        <a:bodyPr/>
+        <a:lstStyle/>
+        <a:p>
+          <a:endParaRPr lang="en-US"/>
+        </a:p>
+      </dgm:t>
+    </dgm:pt>
+    <dgm:pt modelId="{11952508-8C87-46A6-B3B9-EB61BA147A23}" type="sibTrans" cxnId="{005195BE-4F50-41BB-A5F1-2E7A23E9294E}">
+      <dgm:prSet/>
+      <dgm:spPr/>
+      <dgm:t>
+        <a:bodyPr/>
+        <a:lstStyle/>
+        <a:p>
+          <a:endParaRPr lang="en-US"/>
+        </a:p>
+      </dgm:t>
+    </dgm:pt>
+    <dgm:pt modelId="{587134CB-26FE-4FF2-8380-DF743E369986}" type="pres">
+      <dgm:prSet presAssocID="{8594FCD1-59F5-4DB1-80B4-AC8E5FEA940E}" presName="Name0" presStyleCnt="0">
+        <dgm:presLayoutVars>
+          <dgm:dir/>
+          <dgm:resizeHandles val="exact"/>
+        </dgm:presLayoutVars>
+      </dgm:prSet>
+      <dgm:spPr/>
+    </dgm:pt>
+    <dgm:pt modelId="{BBBB3364-3170-45EE-BCF5-5B4CAC7B6A7C}" type="pres">
+      <dgm:prSet presAssocID="{F5276362-0B3C-422C-BFB2-27B41818EC34}" presName="node" presStyleLbl="node1" presStyleIdx="0" presStyleCnt="4">
+        <dgm:presLayoutVars>
+          <dgm:bulletEnabled val="1"/>
+        </dgm:presLayoutVars>
+      </dgm:prSet>
+      <dgm:spPr/>
+    </dgm:pt>
+    <dgm:pt modelId="{4957FA5C-5266-4418-93FF-681A7E40B159}" type="pres">
+      <dgm:prSet presAssocID="{CBF557D5-8CF8-44F0-A8E3-985CC365223B}" presName="sibTrans" presStyleLbl="sibTrans2D1" presStyleIdx="0" presStyleCnt="3"/>
+      <dgm:spPr/>
+    </dgm:pt>
+    <dgm:pt modelId="{64705604-3A94-4D1D-B9C1-967394089AED}" type="pres">
+      <dgm:prSet presAssocID="{CBF557D5-8CF8-44F0-A8E3-985CC365223B}" presName="connectorText" presStyleLbl="sibTrans2D1" presStyleIdx="0" presStyleCnt="3"/>
+      <dgm:spPr/>
+    </dgm:pt>
+    <dgm:pt modelId="{16B7B0B1-E9A9-4103-8D5D-ABCDC6303A42}" type="pres">
+      <dgm:prSet presAssocID="{55102640-1BC6-4D77-B6ED-9F80A416F100}" presName="node" presStyleLbl="node1" presStyleIdx="1" presStyleCnt="4">
+        <dgm:presLayoutVars>
+          <dgm:bulletEnabled val="1"/>
+        </dgm:presLayoutVars>
+      </dgm:prSet>
+      <dgm:spPr/>
+    </dgm:pt>
+    <dgm:pt modelId="{E598BF02-4550-460B-B053-B1DD227DF04F}" type="pres">
+      <dgm:prSet presAssocID="{C0EE3714-FF31-4C1A-9A22-D73021CC72F7}" presName="sibTrans" presStyleLbl="sibTrans2D1" presStyleIdx="1" presStyleCnt="3"/>
+      <dgm:spPr/>
+    </dgm:pt>
+    <dgm:pt modelId="{6AF801B9-96FE-4718-896C-AE7295702F8B}" type="pres">
+      <dgm:prSet presAssocID="{C0EE3714-FF31-4C1A-9A22-D73021CC72F7}" presName="connectorText" presStyleLbl="sibTrans2D1" presStyleIdx="1" presStyleCnt="3"/>
+      <dgm:spPr/>
+    </dgm:pt>
+    <dgm:pt modelId="{C362C62F-10AB-4A13-B613-B74E31A19125}" type="pres">
+      <dgm:prSet presAssocID="{14F5C771-6822-4F85-A29E-F3E561A20D9A}" presName="node" presStyleLbl="node1" presStyleIdx="2" presStyleCnt="4">
+        <dgm:presLayoutVars>
+          <dgm:bulletEnabled val="1"/>
+        </dgm:presLayoutVars>
+      </dgm:prSet>
+      <dgm:spPr/>
+    </dgm:pt>
+    <dgm:pt modelId="{1C6CD31A-2E16-4A72-97A5-F35FF7F92E50}" type="pres">
+      <dgm:prSet presAssocID="{39E0DE9D-2F9A-4422-9890-449498B259AD}" presName="sibTrans" presStyleLbl="sibTrans2D1" presStyleIdx="2" presStyleCnt="3"/>
+      <dgm:spPr/>
+    </dgm:pt>
+    <dgm:pt modelId="{4C0B2CF1-1B01-4191-AE94-F82C897CFBFC}" type="pres">
+      <dgm:prSet presAssocID="{39E0DE9D-2F9A-4422-9890-449498B259AD}" presName="connectorText" presStyleLbl="sibTrans2D1" presStyleIdx="2" presStyleCnt="3"/>
+      <dgm:spPr/>
+    </dgm:pt>
+    <dgm:pt modelId="{1D309985-83A0-47D5-BDA2-C55EA3D990DD}" type="pres">
+      <dgm:prSet presAssocID="{75C2B7B8-0B58-4433-BA15-CCBD8AC5BCC9}" presName="node" presStyleLbl="node1" presStyleIdx="3" presStyleCnt="4">
+        <dgm:presLayoutVars>
+          <dgm:bulletEnabled val="1"/>
+        </dgm:presLayoutVars>
+      </dgm:prSet>
+      <dgm:spPr/>
+    </dgm:pt>
+  </dgm:ptLst>
+  <dgm:cxnLst>
+    <dgm:cxn modelId="{8DBA9521-63D4-440D-A365-05086B312BE5}" type="presOf" srcId="{CBF557D5-8CF8-44F0-A8E3-985CC365223B}" destId="{64705604-3A94-4D1D-B9C1-967394089AED}" srcOrd="1" destOrd="0" presId="urn:microsoft.com/office/officeart/2005/8/layout/process1"/>
+    <dgm:cxn modelId="{A9A29639-7019-46E7-8E58-2D179C43D824}" type="presOf" srcId="{C0EE3714-FF31-4C1A-9A22-D73021CC72F7}" destId="{6AF801B9-96FE-4718-896C-AE7295702F8B}" srcOrd="1" destOrd="0" presId="urn:microsoft.com/office/officeart/2005/8/layout/process1"/>
+    <dgm:cxn modelId="{40C09F3C-96EE-4647-AFF8-805C6AFB1D6F}" type="presOf" srcId="{39E0DE9D-2F9A-4422-9890-449498B259AD}" destId="{4C0B2CF1-1B01-4191-AE94-F82C897CFBFC}" srcOrd="1" destOrd="0" presId="urn:microsoft.com/office/officeart/2005/8/layout/process1"/>
+    <dgm:cxn modelId="{98C4FD3D-7623-4071-8DDB-C4EE8ED105ED}" type="presOf" srcId="{14F5C771-6822-4F85-A29E-F3E561A20D9A}" destId="{C362C62F-10AB-4A13-B613-B74E31A19125}" srcOrd="0" destOrd="0" presId="urn:microsoft.com/office/officeart/2005/8/layout/process1"/>
+    <dgm:cxn modelId="{9C5DBB64-5D8F-4B5A-BCBC-5B14C50D761E}" type="presOf" srcId="{55102640-1BC6-4D77-B6ED-9F80A416F100}" destId="{16B7B0B1-E9A9-4103-8D5D-ABCDC6303A42}" srcOrd="0" destOrd="0" presId="urn:microsoft.com/office/officeart/2005/8/layout/process1"/>
+    <dgm:cxn modelId="{F3218667-E5CF-4396-890D-709D98E37192}" type="presOf" srcId="{39E0DE9D-2F9A-4422-9890-449498B259AD}" destId="{1C6CD31A-2E16-4A72-97A5-F35FF7F92E50}" srcOrd="0" destOrd="0" presId="urn:microsoft.com/office/officeart/2005/8/layout/process1"/>
+    <dgm:cxn modelId="{77B9C251-D478-499E-ACB9-8CCDE609B5E7}" srcId="{8594FCD1-59F5-4DB1-80B4-AC8E5FEA940E}" destId="{55102640-1BC6-4D77-B6ED-9F80A416F100}" srcOrd="1" destOrd="0" parTransId="{C6480FFE-0912-4815-9CBE-918EAE5AE9D2}" sibTransId="{C0EE3714-FF31-4C1A-9A22-D73021CC72F7}"/>
+    <dgm:cxn modelId="{AE1F5877-164F-4D42-8807-F4C44E2FC326}" type="presOf" srcId="{75C2B7B8-0B58-4433-BA15-CCBD8AC5BCC9}" destId="{1D309985-83A0-47D5-BDA2-C55EA3D990DD}" srcOrd="0" destOrd="0" presId="urn:microsoft.com/office/officeart/2005/8/layout/process1"/>
+    <dgm:cxn modelId="{0D0B0783-4130-4A4D-897A-2D082210B907}" type="presOf" srcId="{F5276362-0B3C-422C-BFB2-27B41818EC34}" destId="{BBBB3364-3170-45EE-BCF5-5B4CAC7B6A7C}" srcOrd="0" destOrd="0" presId="urn:microsoft.com/office/officeart/2005/8/layout/process1"/>
+    <dgm:cxn modelId="{A40A3D88-1F61-4552-B81D-EAB621120F99}" type="presOf" srcId="{8594FCD1-59F5-4DB1-80B4-AC8E5FEA940E}" destId="{587134CB-26FE-4FF2-8380-DF743E369986}" srcOrd="0" destOrd="0" presId="urn:microsoft.com/office/officeart/2005/8/layout/process1"/>
+    <dgm:cxn modelId="{1C4DD5A0-82CE-409D-9856-A6B917370DEA}" type="presOf" srcId="{CBF557D5-8CF8-44F0-A8E3-985CC365223B}" destId="{4957FA5C-5266-4418-93FF-681A7E40B159}" srcOrd="0" destOrd="0" presId="urn:microsoft.com/office/officeart/2005/8/layout/process1"/>
+    <dgm:cxn modelId="{005195BE-4F50-41BB-A5F1-2E7A23E9294E}" srcId="{8594FCD1-59F5-4DB1-80B4-AC8E5FEA940E}" destId="{75C2B7B8-0B58-4433-BA15-CCBD8AC5BCC9}" srcOrd="3" destOrd="0" parTransId="{3332251D-B2B1-4E04-9DAB-EC1363C4850C}" sibTransId="{11952508-8C87-46A6-B3B9-EB61BA147A23}"/>
+    <dgm:cxn modelId="{3DD3FBC7-F5FE-4F55-B3E0-52376563F193}" srcId="{8594FCD1-59F5-4DB1-80B4-AC8E5FEA940E}" destId="{F5276362-0B3C-422C-BFB2-27B41818EC34}" srcOrd="0" destOrd="0" parTransId="{620C2E60-5065-4F3F-AD08-16D57D5124F2}" sibTransId="{CBF557D5-8CF8-44F0-A8E3-985CC365223B}"/>
+    <dgm:cxn modelId="{BE2AFBD2-0653-4FBF-BD8C-13101D4907AF}" srcId="{8594FCD1-59F5-4DB1-80B4-AC8E5FEA940E}" destId="{14F5C771-6822-4F85-A29E-F3E561A20D9A}" srcOrd="2" destOrd="0" parTransId="{6B3189E0-3ABB-41CA-A678-EC0DFECCA66D}" sibTransId="{39E0DE9D-2F9A-4422-9890-449498B259AD}"/>
+    <dgm:cxn modelId="{555DB3D8-AD26-4DEC-8A1D-1B93106A364E}" type="presOf" srcId="{C0EE3714-FF31-4C1A-9A22-D73021CC72F7}" destId="{E598BF02-4550-460B-B053-B1DD227DF04F}" srcOrd="0" destOrd="0" presId="urn:microsoft.com/office/officeart/2005/8/layout/process1"/>
+    <dgm:cxn modelId="{58F18A8E-E7DA-4722-92B3-4967210FF10C}" type="presParOf" srcId="{587134CB-26FE-4FF2-8380-DF743E369986}" destId="{BBBB3364-3170-45EE-BCF5-5B4CAC7B6A7C}" srcOrd="0" destOrd="0" presId="urn:microsoft.com/office/officeart/2005/8/layout/process1"/>
+    <dgm:cxn modelId="{243BDF95-05EF-4D8B-B82D-488E3090E319}" type="presParOf" srcId="{587134CB-26FE-4FF2-8380-DF743E369986}" destId="{4957FA5C-5266-4418-93FF-681A7E40B159}" srcOrd="1" destOrd="0" presId="urn:microsoft.com/office/officeart/2005/8/layout/process1"/>
+    <dgm:cxn modelId="{A643DA9D-69F3-47A8-A349-879D95779C14}" type="presParOf" srcId="{4957FA5C-5266-4418-93FF-681A7E40B159}" destId="{64705604-3A94-4D1D-B9C1-967394089AED}" srcOrd="0" destOrd="0" presId="urn:microsoft.com/office/officeart/2005/8/layout/process1"/>
+    <dgm:cxn modelId="{758FAB80-3551-420C-B3ED-BA9EC08BA51C}" type="presParOf" srcId="{587134CB-26FE-4FF2-8380-DF743E369986}" destId="{16B7B0B1-E9A9-4103-8D5D-ABCDC6303A42}" srcOrd="2" destOrd="0" presId="urn:microsoft.com/office/officeart/2005/8/layout/process1"/>
+    <dgm:cxn modelId="{A23CC9C3-B4B6-4174-8709-6F5381CAB27D}" type="presParOf" srcId="{587134CB-26FE-4FF2-8380-DF743E369986}" destId="{E598BF02-4550-460B-B053-B1DD227DF04F}" srcOrd="3" destOrd="0" presId="urn:microsoft.com/office/officeart/2005/8/layout/process1"/>
+    <dgm:cxn modelId="{4598F895-BA3F-4323-BD90-4A4933396BD7}" type="presParOf" srcId="{E598BF02-4550-460B-B053-B1DD227DF04F}" destId="{6AF801B9-96FE-4718-896C-AE7295702F8B}" srcOrd="0" destOrd="0" presId="urn:microsoft.com/office/officeart/2005/8/layout/process1"/>
+    <dgm:cxn modelId="{C763359D-413C-4648-92ED-97C70EBD4076}" type="presParOf" srcId="{587134CB-26FE-4FF2-8380-DF743E369986}" destId="{C362C62F-10AB-4A13-B613-B74E31A19125}" srcOrd="4" destOrd="0" presId="urn:microsoft.com/office/officeart/2005/8/layout/process1"/>
+    <dgm:cxn modelId="{32D98DF8-EFE1-414A-8399-D206D68C5686}" type="presParOf" srcId="{587134CB-26FE-4FF2-8380-DF743E369986}" destId="{1C6CD31A-2E16-4A72-97A5-F35FF7F92E50}" srcOrd="5" destOrd="0" presId="urn:microsoft.com/office/officeart/2005/8/layout/process1"/>
+    <dgm:cxn modelId="{B9C7F34C-DDEC-4B8D-9DD8-CFF8F639C5E7}" type="presParOf" srcId="{1C6CD31A-2E16-4A72-97A5-F35FF7F92E50}" destId="{4C0B2CF1-1B01-4191-AE94-F82C897CFBFC}" srcOrd="0" destOrd="0" presId="urn:microsoft.com/office/officeart/2005/8/layout/process1"/>
+    <dgm:cxn modelId="{2017EDE5-51D2-4F88-8EC6-E7B5CC782176}" type="presParOf" srcId="{587134CB-26FE-4FF2-8380-DF743E369986}" destId="{1D309985-83A0-47D5-BDA2-C55EA3D990DD}" srcOrd="6" destOrd="0" presId="urn:microsoft.com/office/officeart/2005/8/layout/process1"/>
+  </dgm:cxnLst>
+  <dgm:bg/>
+  <dgm:whole/>
+  <dgm:extLst>
+    <a:ext uri="http://schemas.microsoft.com/office/drawing/2008/diagram">
+      <dsp:dataModelExt xmlns:dsp="http://schemas.microsoft.com/office/drawing/2008/diagram" relId="rId7" minVer="http://schemas.openxmlformats.org/drawingml/2006/diagram"/>
+    </a:ext>
+  </dgm:extLst>
+</dgm:dataModel>
+</file>
+
+<file path=ppt/diagrams/drawing1.xml><?xml version="1.0" encoding="utf-8"?>
+<dsp:drawing xmlns:dgm="http://schemas.openxmlformats.org/drawingml/2006/diagram" xmlns:dsp="http://schemas.microsoft.com/office/drawing/2008/diagram" xmlns:a="http://schemas.openxmlformats.org/drawingml/2006/main">
+  <dsp:spTree>
+    <dsp:nvGrpSpPr>
+      <dsp:cNvPr id="0" name=""/>
+      <dsp:cNvGrpSpPr/>
+    </dsp:nvGrpSpPr>
+    <dsp:grpSpPr/>
+    <dsp:sp modelId="{BBBB3364-3170-45EE-BCF5-5B4CAC7B6A7C}">
+      <dsp:nvSpPr>
+        <dsp:cNvPr id="0" name=""/>
+        <dsp:cNvSpPr/>
+      </dsp:nvSpPr>
+      <dsp:spPr>
+        <a:xfrm>
+          <a:off x="5357" y="1873596"/>
+          <a:ext cx="2342554" cy="3110805"/>
+        </a:xfrm>
+        <a:prstGeom prst="roundRect">
+          <a:avLst>
+            <a:gd name="adj" fmla="val 10000"/>
+          </a:avLst>
+        </a:prstGeom>
+        <a:solidFill>
+          <a:schemeClr val="accent5">
+            <a:hueOff val="0"/>
+            <a:satOff val="0"/>
+            <a:lumOff val="0"/>
+            <a:alphaOff val="0"/>
+          </a:schemeClr>
+        </a:solidFill>
+        <a:ln w="15875" cap="flat" cmpd="sng" algn="ctr">
+          <a:solidFill>
+            <a:schemeClr val="lt1">
+              <a:hueOff val="0"/>
+              <a:satOff val="0"/>
+              <a:lumOff val="0"/>
+              <a:alphaOff val="0"/>
+            </a:schemeClr>
+          </a:solidFill>
+          <a:prstDash val="solid"/>
+        </a:ln>
+        <a:effectLst/>
+      </dsp:spPr>
+      <dsp:style>
+        <a:lnRef idx="2">
+          <a:scrgbClr r="0" g="0" b="0"/>
+        </a:lnRef>
+        <a:fillRef idx="1">
+          <a:scrgbClr r="0" g="0" b="0"/>
+        </a:fillRef>
+        <a:effectRef idx="0">
+          <a:scrgbClr r="0" g="0" b="0"/>
+        </a:effectRef>
+        <a:fontRef idx="minor">
+          <a:schemeClr val="lt1"/>
+        </a:fontRef>
+      </dsp:style>
+      <dsp:txBody>
+        <a:bodyPr spcFirstLastPara="0" vert="horz" wrap="square" lIns="91440" tIns="91440" rIns="91440" bIns="91440" numCol="1" spcCol="1270" anchor="ctr" anchorCtr="0">
+          <a:noAutofit/>
+        </a:bodyPr>
+        <a:lstStyle/>
+        <a:p>
+          <a:pPr marL="0" lvl="0" indent="0" algn="ctr" defTabSz="1066800">
+            <a:lnSpc>
+              <a:spcPct val="90000"/>
+            </a:lnSpc>
+            <a:spcBef>
+              <a:spcPct val="0"/>
+            </a:spcBef>
+            <a:spcAft>
+              <a:spcPct val="35000"/>
+            </a:spcAft>
+            <a:buNone/>
+          </a:pPr>
+          <a:r>
+            <a:rPr lang="en-US" sz="2400" b="1" kern="1200" dirty="0"/>
+            <a:t>Extract</a:t>
+          </a:r>
+          <a:r>
+            <a:rPr lang="en-US" sz="1800" kern="1200" dirty="0"/>
+            <a:t>:  </a:t>
+          </a:r>
+        </a:p>
+        <a:p>
+          <a:pPr marL="0" lvl="0" indent="0" algn="ctr" defTabSz="1066800">
+            <a:lnSpc>
+              <a:spcPct val="90000"/>
+            </a:lnSpc>
+            <a:spcBef>
+              <a:spcPct val="0"/>
+            </a:spcBef>
+            <a:spcAft>
+              <a:spcPct val="35000"/>
+            </a:spcAft>
+            <a:buNone/>
+          </a:pPr>
+          <a:r>
+            <a:rPr lang="en-US" sz="1800" kern="1200" dirty="0"/>
+            <a:t>Web scrape Temp/</a:t>
+          </a:r>
+          <a:r>
+            <a:rPr lang="en-US" sz="1800" kern="1200" dirty="0" err="1"/>
+            <a:t>Precip</a:t>
+          </a:r>
+          <a:r>
+            <a:rPr lang="en-US" sz="1800" kern="1200" dirty="0"/>
+            <a:t> and illness data into Pandas </a:t>
+          </a:r>
+          <a:r>
+            <a:rPr lang="en-US" sz="1800" kern="1200" dirty="0" err="1"/>
+            <a:t>Dataframes</a:t>
+          </a:r>
+          <a:r>
+            <a:rPr lang="en-US" sz="1800" kern="1200" dirty="0"/>
+            <a:t> and CSV files</a:t>
+          </a:r>
+        </a:p>
+      </dsp:txBody>
+      <dsp:txXfrm>
+        <a:off x="73968" y="1942207"/>
+        <a:ext cx="2205332" cy="2973583"/>
+      </dsp:txXfrm>
+    </dsp:sp>
+    <dsp:sp modelId="{4957FA5C-5266-4418-93FF-681A7E40B159}">
+      <dsp:nvSpPr>
+        <dsp:cNvPr id="0" name=""/>
+        <dsp:cNvSpPr/>
+      </dsp:nvSpPr>
+      <dsp:spPr>
+        <a:xfrm>
+          <a:off x="2582167" y="3138522"/>
+          <a:ext cx="496621" cy="580953"/>
+        </a:xfrm>
+        <a:prstGeom prst="rightArrow">
+          <a:avLst>
+            <a:gd name="adj1" fmla="val 60000"/>
+            <a:gd name="adj2" fmla="val 50000"/>
+          </a:avLst>
+        </a:prstGeom>
+        <a:solidFill>
+          <a:schemeClr val="accent5">
+            <a:hueOff val="0"/>
+            <a:satOff val="0"/>
+            <a:lumOff val="0"/>
+            <a:alphaOff val="0"/>
+          </a:schemeClr>
+        </a:solidFill>
+        <a:ln>
+          <a:noFill/>
+        </a:ln>
+        <a:effectLst/>
+      </dsp:spPr>
+      <dsp:style>
+        <a:lnRef idx="0">
+          <a:scrgbClr r="0" g="0" b="0"/>
+        </a:lnRef>
+        <a:fillRef idx="1">
+          <a:scrgbClr r="0" g="0" b="0"/>
+        </a:fillRef>
+        <a:effectRef idx="0">
+          <a:scrgbClr r="0" g="0" b="0"/>
+        </a:effectRef>
+        <a:fontRef idx="minor">
+          <a:schemeClr val="lt1"/>
+        </a:fontRef>
+      </dsp:style>
+      <dsp:txBody>
+        <a:bodyPr spcFirstLastPara="0" vert="horz" wrap="square" lIns="0" tIns="0" rIns="0" bIns="0" numCol="1" spcCol="1270" anchor="ctr" anchorCtr="0">
+          <a:noAutofit/>
+        </a:bodyPr>
+        <a:lstStyle/>
+        <a:p>
+          <a:pPr marL="0" lvl="0" indent="0" algn="ctr" defTabSz="1155700">
+            <a:lnSpc>
+              <a:spcPct val="90000"/>
+            </a:lnSpc>
+            <a:spcBef>
+              <a:spcPct val="0"/>
+            </a:spcBef>
+            <a:spcAft>
+              <a:spcPct val="35000"/>
+            </a:spcAft>
+            <a:buNone/>
+          </a:pPr>
+          <a:endParaRPr lang="en-US" sz="2600" kern="1200"/>
+        </a:p>
+      </dsp:txBody>
+      <dsp:txXfrm>
+        <a:off x="2582167" y="3254713"/>
+        <a:ext cx="347635" cy="348571"/>
+      </dsp:txXfrm>
+    </dsp:sp>
+    <dsp:sp modelId="{16B7B0B1-E9A9-4103-8D5D-ABCDC6303A42}">
+      <dsp:nvSpPr>
+        <dsp:cNvPr id="0" name=""/>
+        <dsp:cNvSpPr/>
+      </dsp:nvSpPr>
+      <dsp:spPr>
+        <a:xfrm>
+          <a:off x="3284934" y="1873596"/>
+          <a:ext cx="2342554" cy="3110805"/>
+        </a:xfrm>
+        <a:prstGeom prst="roundRect">
+          <a:avLst>
+            <a:gd name="adj" fmla="val 10000"/>
+          </a:avLst>
+        </a:prstGeom>
+        <a:solidFill>
+          <a:schemeClr val="accent5">
+            <a:hueOff val="5129271"/>
+            <a:satOff val="-1832"/>
+            <a:lumOff val="2942"/>
+            <a:alphaOff val="0"/>
+          </a:schemeClr>
+        </a:solidFill>
+        <a:ln w="15875" cap="flat" cmpd="sng" algn="ctr">
+          <a:solidFill>
+            <a:schemeClr val="lt1">
+              <a:hueOff val="0"/>
+              <a:satOff val="0"/>
+              <a:lumOff val="0"/>
+              <a:alphaOff val="0"/>
+            </a:schemeClr>
+          </a:solidFill>
+          <a:prstDash val="solid"/>
+        </a:ln>
+        <a:effectLst/>
+      </dsp:spPr>
+      <dsp:style>
+        <a:lnRef idx="2">
+          <a:scrgbClr r="0" g="0" b="0"/>
+        </a:lnRef>
+        <a:fillRef idx="1">
+          <a:scrgbClr r="0" g="0" b="0"/>
+        </a:fillRef>
+        <a:effectRef idx="0">
+          <a:scrgbClr r="0" g="0" b="0"/>
+        </a:effectRef>
+        <a:fontRef idx="minor">
+          <a:schemeClr val="lt1"/>
+        </a:fontRef>
+      </dsp:style>
+      <dsp:txBody>
+        <a:bodyPr spcFirstLastPara="0" vert="horz" wrap="square" lIns="91440" tIns="91440" rIns="91440" bIns="91440" numCol="1" spcCol="1270" anchor="ctr" anchorCtr="0">
+          <a:noAutofit/>
+        </a:bodyPr>
+        <a:lstStyle/>
+        <a:p>
+          <a:pPr marL="0" lvl="0" indent="0" algn="ctr" defTabSz="1066800">
+            <a:lnSpc>
+              <a:spcPct val="90000"/>
+            </a:lnSpc>
+            <a:spcBef>
+              <a:spcPct val="0"/>
+            </a:spcBef>
+            <a:spcAft>
+              <a:spcPct val="35000"/>
+            </a:spcAft>
+            <a:buNone/>
+          </a:pPr>
+          <a:r>
+            <a:rPr lang="en-US" sz="2400" b="1" kern="1200" dirty="0"/>
+            <a:t>Transform</a:t>
+          </a:r>
+          <a:r>
+            <a:rPr lang="en-US" sz="1900" kern="1200" dirty="0"/>
+            <a:t>:  Clean data using regex and .replace(). Reorganize columns.</a:t>
+          </a:r>
+        </a:p>
+      </dsp:txBody>
+      <dsp:txXfrm>
+        <a:off x="3353545" y="1942207"/>
+        <a:ext cx="2205332" cy="2973583"/>
+      </dsp:txXfrm>
+    </dsp:sp>
+    <dsp:sp modelId="{E598BF02-4550-460B-B053-B1DD227DF04F}">
+      <dsp:nvSpPr>
+        <dsp:cNvPr id="0" name=""/>
+        <dsp:cNvSpPr/>
+      </dsp:nvSpPr>
+      <dsp:spPr>
+        <a:xfrm>
+          <a:off x="5861744" y="3138522"/>
+          <a:ext cx="496621" cy="580953"/>
+        </a:xfrm>
+        <a:prstGeom prst="rightArrow">
+          <a:avLst>
+            <a:gd name="adj1" fmla="val 60000"/>
+            <a:gd name="adj2" fmla="val 50000"/>
+          </a:avLst>
+        </a:prstGeom>
+        <a:solidFill>
+          <a:schemeClr val="accent5">
+            <a:hueOff val="7693906"/>
+            <a:satOff val="-2748"/>
+            <a:lumOff val="4412"/>
+            <a:alphaOff val="0"/>
+          </a:schemeClr>
+        </a:solidFill>
+        <a:ln>
+          <a:noFill/>
+        </a:ln>
+        <a:effectLst/>
+      </dsp:spPr>
+      <dsp:style>
+        <a:lnRef idx="0">
+          <a:scrgbClr r="0" g="0" b="0"/>
+        </a:lnRef>
+        <a:fillRef idx="1">
+          <a:scrgbClr r="0" g="0" b="0"/>
+        </a:fillRef>
+        <a:effectRef idx="0">
+          <a:scrgbClr r="0" g="0" b="0"/>
+        </a:effectRef>
+        <a:fontRef idx="minor">
+          <a:schemeClr val="lt1"/>
+        </a:fontRef>
+      </dsp:style>
+      <dsp:txBody>
+        <a:bodyPr spcFirstLastPara="0" vert="horz" wrap="square" lIns="0" tIns="0" rIns="0" bIns="0" numCol="1" spcCol="1270" anchor="ctr" anchorCtr="0">
+          <a:noAutofit/>
+        </a:bodyPr>
+        <a:lstStyle/>
+        <a:p>
+          <a:pPr marL="0" lvl="0" indent="0" algn="ctr" defTabSz="1155700">
+            <a:lnSpc>
+              <a:spcPct val="90000"/>
+            </a:lnSpc>
+            <a:spcBef>
+              <a:spcPct val="0"/>
+            </a:spcBef>
+            <a:spcAft>
+              <a:spcPct val="35000"/>
+            </a:spcAft>
+            <a:buNone/>
+          </a:pPr>
+          <a:endParaRPr lang="en-US" sz="2600" kern="1200"/>
+        </a:p>
+      </dsp:txBody>
+      <dsp:txXfrm>
+        <a:off x="5861744" y="3254713"/>
+        <a:ext cx="347635" cy="348571"/>
+      </dsp:txXfrm>
+    </dsp:sp>
+    <dsp:sp modelId="{C362C62F-10AB-4A13-B613-B74E31A19125}">
+      <dsp:nvSpPr>
+        <dsp:cNvPr id="0" name=""/>
+        <dsp:cNvSpPr/>
+      </dsp:nvSpPr>
+      <dsp:spPr>
+        <a:xfrm>
+          <a:off x="6564510" y="1873596"/>
+          <a:ext cx="2342554" cy="3110805"/>
+        </a:xfrm>
+        <a:prstGeom prst="roundRect">
+          <a:avLst>
+            <a:gd name="adj" fmla="val 10000"/>
+          </a:avLst>
+        </a:prstGeom>
+        <a:solidFill>
+          <a:schemeClr val="accent5">
+            <a:hueOff val="10258542"/>
+            <a:satOff val="-3664"/>
+            <a:lumOff val="5883"/>
+            <a:alphaOff val="0"/>
+          </a:schemeClr>
+        </a:solidFill>
+        <a:ln w="15875" cap="flat" cmpd="sng" algn="ctr">
+          <a:solidFill>
+            <a:schemeClr val="lt1">
+              <a:hueOff val="0"/>
+              <a:satOff val="0"/>
+              <a:lumOff val="0"/>
+              <a:alphaOff val="0"/>
+            </a:schemeClr>
+          </a:solidFill>
+          <a:prstDash val="solid"/>
+        </a:ln>
+        <a:effectLst/>
+      </dsp:spPr>
+      <dsp:style>
+        <a:lnRef idx="2">
+          <a:scrgbClr r="0" g="0" b="0"/>
+        </a:lnRef>
+        <a:fillRef idx="1">
+          <a:scrgbClr r="0" g="0" b="0"/>
+        </a:fillRef>
+        <a:effectRef idx="0">
+          <a:scrgbClr r="0" g="0" b="0"/>
+        </a:effectRef>
+        <a:fontRef idx="minor">
+          <a:schemeClr val="lt1"/>
+        </a:fontRef>
+      </dsp:style>
+      <dsp:txBody>
+        <a:bodyPr spcFirstLastPara="0" vert="horz" wrap="square" lIns="106680" tIns="106680" rIns="106680" bIns="106680" numCol="1" spcCol="1270" anchor="ctr" anchorCtr="0">
+          <a:noAutofit/>
+        </a:bodyPr>
+        <a:lstStyle/>
+        <a:p>
+          <a:pPr marL="0" lvl="0" indent="0" algn="ctr" defTabSz="1244600">
+            <a:lnSpc>
+              <a:spcPct val="90000"/>
+            </a:lnSpc>
+            <a:spcBef>
+              <a:spcPct val="0"/>
+            </a:spcBef>
+            <a:spcAft>
+              <a:spcPct val="35000"/>
+            </a:spcAft>
+            <a:buNone/>
+          </a:pPr>
+          <a:r>
+            <a:rPr lang="en-US" sz="2800" b="1" kern="1200" dirty="0"/>
+            <a:t>Load</a:t>
+          </a:r>
+          <a:r>
+            <a:rPr lang="en-US" sz="2300" kern="1200" dirty="0"/>
+            <a:t>: </a:t>
+          </a:r>
+        </a:p>
+        <a:p>
+          <a:pPr marL="0" lvl="0" indent="0" algn="ctr" defTabSz="1244600">
+            <a:lnSpc>
+              <a:spcPct val="90000"/>
+            </a:lnSpc>
+            <a:spcBef>
+              <a:spcPct val="0"/>
+            </a:spcBef>
+            <a:spcAft>
+              <a:spcPct val="35000"/>
+            </a:spcAft>
+            <a:buNone/>
+          </a:pPr>
+          <a:r>
+            <a:rPr lang="en-US" sz="2300" kern="1200" dirty="0"/>
+            <a:t> Import cleaned data to PostgreSQL server.</a:t>
+          </a:r>
+        </a:p>
+      </dsp:txBody>
+      <dsp:txXfrm>
+        <a:off x="6633121" y="1942207"/>
+        <a:ext cx="2205332" cy="2973583"/>
+      </dsp:txXfrm>
+    </dsp:sp>
+    <dsp:sp modelId="{1C6CD31A-2E16-4A72-97A5-F35FF7F92E50}">
+      <dsp:nvSpPr>
+        <dsp:cNvPr id="0" name=""/>
+        <dsp:cNvSpPr/>
+      </dsp:nvSpPr>
+      <dsp:spPr>
+        <a:xfrm>
+          <a:off x="9141321" y="3138522"/>
+          <a:ext cx="496621" cy="580953"/>
+        </a:xfrm>
+        <a:prstGeom prst="rightArrow">
+          <a:avLst>
+            <a:gd name="adj1" fmla="val 60000"/>
+            <a:gd name="adj2" fmla="val 50000"/>
+          </a:avLst>
+        </a:prstGeom>
+        <a:solidFill>
+          <a:schemeClr val="accent5">
+            <a:hueOff val="15387812"/>
+            <a:satOff val="-5496"/>
+            <a:lumOff val="8825"/>
+            <a:alphaOff val="0"/>
+          </a:schemeClr>
+        </a:solidFill>
+        <a:ln>
+          <a:noFill/>
+        </a:ln>
+        <a:effectLst/>
+      </dsp:spPr>
+      <dsp:style>
+        <a:lnRef idx="0">
+          <a:scrgbClr r="0" g="0" b="0"/>
+        </a:lnRef>
+        <a:fillRef idx="1">
+          <a:scrgbClr r="0" g="0" b="0"/>
+        </a:fillRef>
+        <a:effectRef idx="0">
+          <a:scrgbClr r="0" g="0" b="0"/>
+        </a:effectRef>
+        <a:fontRef idx="minor">
+          <a:schemeClr val="lt1"/>
+        </a:fontRef>
+      </dsp:style>
+      <dsp:txBody>
+        <a:bodyPr spcFirstLastPara="0" vert="horz" wrap="square" lIns="0" tIns="0" rIns="0" bIns="0" numCol="1" spcCol="1270" anchor="ctr" anchorCtr="0">
+          <a:noAutofit/>
+        </a:bodyPr>
+        <a:lstStyle/>
+        <a:p>
+          <a:pPr marL="0" lvl="0" indent="0" algn="ctr" defTabSz="1155700">
+            <a:lnSpc>
+              <a:spcPct val="90000"/>
+            </a:lnSpc>
+            <a:spcBef>
+              <a:spcPct val="0"/>
+            </a:spcBef>
+            <a:spcAft>
+              <a:spcPct val="35000"/>
+            </a:spcAft>
+            <a:buNone/>
+          </a:pPr>
+          <a:endParaRPr lang="en-US" sz="2600" kern="1200"/>
+        </a:p>
+      </dsp:txBody>
+      <dsp:txXfrm>
+        <a:off x="9141321" y="3254713"/>
+        <a:ext cx="347635" cy="348571"/>
+      </dsp:txXfrm>
+    </dsp:sp>
+    <dsp:sp modelId="{1D309985-83A0-47D5-BDA2-C55EA3D990DD}">
+      <dsp:nvSpPr>
+        <dsp:cNvPr id="0" name=""/>
+        <dsp:cNvSpPr/>
+      </dsp:nvSpPr>
+      <dsp:spPr>
+        <a:xfrm>
+          <a:off x="9844087" y="1873596"/>
+          <a:ext cx="2342554" cy="3110805"/>
+        </a:xfrm>
+        <a:prstGeom prst="roundRect">
+          <a:avLst>
+            <a:gd name="adj" fmla="val 10000"/>
+          </a:avLst>
+        </a:prstGeom>
+        <a:solidFill>
+          <a:schemeClr val="accent5">
+            <a:hueOff val="15387812"/>
+            <a:satOff val="-5496"/>
+            <a:lumOff val="8825"/>
+            <a:alphaOff val="0"/>
+          </a:schemeClr>
+        </a:solidFill>
+        <a:ln w="15875" cap="flat" cmpd="sng" algn="ctr">
+          <a:solidFill>
+            <a:schemeClr val="lt1">
+              <a:hueOff val="0"/>
+              <a:satOff val="0"/>
+              <a:lumOff val="0"/>
+              <a:alphaOff val="0"/>
+            </a:schemeClr>
+          </a:solidFill>
+          <a:prstDash val="solid"/>
+        </a:ln>
+        <a:effectLst/>
+      </dsp:spPr>
+      <dsp:style>
+        <a:lnRef idx="2">
+          <a:scrgbClr r="0" g="0" b="0"/>
+        </a:lnRef>
+        <a:fillRef idx="1">
+          <a:scrgbClr r="0" g="0" b="0"/>
+        </a:fillRef>
+        <a:effectRef idx="0">
+          <a:scrgbClr r="0" g="0" b="0"/>
+        </a:effectRef>
+        <a:fontRef idx="minor">
+          <a:schemeClr val="lt1"/>
+        </a:fontRef>
+      </dsp:style>
+      <dsp:txBody>
+        <a:bodyPr spcFirstLastPara="0" vert="horz" wrap="square" lIns="106680" tIns="106680" rIns="106680" bIns="106680" numCol="1" spcCol="1270" anchor="ctr" anchorCtr="0">
+          <a:noAutofit/>
+        </a:bodyPr>
+        <a:lstStyle/>
+        <a:p>
+          <a:pPr marL="0" lvl="0" indent="0" algn="ctr" defTabSz="1244600">
+            <a:lnSpc>
+              <a:spcPct val="90000"/>
+            </a:lnSpc>
+            <a:spcBef>
+              <a:spcPct val="0"/>
+            </a:spcBef>
+            <a:spcAft>
+              <a:spcPct val="35000"/>
+            </a:spcAft>
+            <a:buNone/>
+          </a:pPr>
+          <a:r>
+            <a:rPr lang="en-US" sz="2800" b="1" kern="1200" dirty="0"/>
+            <a:t>Transmit</a:t>
+          </a:r>
+          <a:r>
+            <a:rPr lang="en-US" sz="2300" kern="1200" dirty="0"/>
+            <a:t>:  Reflect Postgres tables to Flask app.py using </a:t>
+          </a:r>
+          <a:r>
+            <a:rPr lang="en-US" sz="2300" kern="1200" dirty="0" err="1"/>
+            <a:t>SQLAlchemy</a:t>
+          </a:r>
+          <a:r>
+            <a:rPr lang="en-US" sz="2300" kern="1200" dirty="0"/>
+            <a:t>.</a:t>
+          </a:r>
+        </a:p>
+        <a:p>
+          <a:pPr marL="0" lvl="0" indent="0" algn="ctr" defTabSz="1244600">
+            <a:lnSpc>
+              <a:spcPct val="90000"/>
+            </a:lnSpc>
+            <a:spcBef>
+              <a:spcPct val="0"/>
+            </a:spcBef>
+            <a:spcAft>
+              <a:spcPct val="35000"/>
+            </a:spcAft>
+            <a:buNone/>
+          </a:pPr>
+          <a:endParaRPr lang="en-US" sz="2300" kern="1200" dirty="0"/>
+        </a:p>
+        <a:p>
+          <a:pPr marL="0" lvl="0" indent="0" algn="ctr" defTabSz="1244600">
+            <a:lnSpc>
+              <a:spcPct val="90000"/>
+            </a:lnSpc>
+            <a:spcBef>
+              <a:spcPct val="0"/>
+            </a:spcBef>
+            <a:spcAft>
+              <a:spcPct val="35000"/>
+            </a:spcAft>
+            <a:buNone/>
+          </a:pPr>
+          <a:r>
+            <a:rPr lang="en-US" sz="2300" kern="1200" dirty="0"/>
+            <a:t>Read CSV tables in JavaScript.</a:t>
+          </a:r>
+        </a:p>
+      </dsp:txBody>
+      <dsp:txXfrm>
+        <a:off x="9912698" y="1942207"/>
+        <a:ext cx="2205332" cy="2973583"/>
+      </dsp:txXfrm>
+    </dsp:sp>
+  </dsp:spTree>
+</dsp:drawing>
+</file>
+
+<file path=ppt/diagrams/layout1.xml><?xml version="1.0" encoding="utf-8"?>
+<dgm:layoutDef xmlns:dgm="http://schemas.openxmlformats.org/drawingml/2006/diagram" xmlns:a="http://schemas.openxmlformats.org/drawingml/2006/main" uniqueId="urn:microsoft.com/office/officeart/2005/8/layout/process1">
+  <dgm:title val=""/>
+  <dgm:desc val=""/>
+  <dgm:catLst>
+    <dgm:cat type="process" pri="1000"/>
+    <dgm:cat type="convert" pri="15000"/>
+  </dgm:catLst>
+  <dgm:sampData useDef="1">
+    <dgm:dataModel>
+      <dgm:ptLst/>
+      <dgm:bg/>
+      <dgm:whole/>
+    </dgm:dataModel>
+  </dgm:sampData>
+  <dgm:styleData>
+    <dgm:dataModel>
+      <dgm:ptLst>
+        <dgm:pt modelId="0" type="doc"/>
+        <dgm:pt modelId="1"/>
+        <dgm:pt modelId="2"/>
+      </dgm:ptLst>
+      <dgm:cxnLst>
+        <dgm:cxn modelId="3" srcId="0" destId="1" srcOrd="0" destOrd="0"/>
+        <dgm:cxn modelId="4" srcId="0" destId="2" srcOrd="1" destOrd="0"/>
+      </dgm:cxnLst>
+      <dgm:bg/>
+      <dgm:whole/>
+    </dgm:dataModel>
+  </dgm:styleData>
+  <dgm:clrData>
+    <dgm:dataModel>
+      <dgm:ptLst>
+        <dgm:pt modelId="0" type="doc"/>
+        <dgm:pt modelId="1"/>
+        <dgm:pt modelId="2"/>
+        <dgm:pt modelId="3"/>
+        <dgm:pt modelId="4"/>
+      </dgm:ptLst>
+      <dgm:cxnLst>
+        <dgm:cxn modelId="5" srcId="0" destId="1" srcOrd="0" destOrd="0"/>
+        <dgm:cxn modelId="6" srcId="0" destId="2" srcOrd="1" destOrd="0"/>
+        <dgm:cxn modelId="7" srcId="0" destId="3" srcOrd="2" destOrd="0"/>
+        <dgm:cxn modelId="8" srcId="0" destId="4" srcOrd="3" destOrd="0"/>
+      </dgm:cxnLst>
+      <dgm:bg/>
+      <dgm:whole/>
+    </dgm:dataModel>
+  </dgm:clrData>
+  <dgm:layoutNode name="Name0">
+    <dgm:varLst>
+      <dgm:dir/>
+      <dgm:resizeHandles val="exact"/>
+    </dgm:varLst>
+    <dgm:choose name="Name1">
+      <dgm:if name="Name2" func="var" arg="dir" op="equ" val="norm">
+        <dgm:alg type="lin"/>
+      </dgm:if>
+      <dgm:else name="Name3">
+        <dgm:alg type="lin">
+          <dgm:param type="linDir" val="fromR"/>
+        </dgm:alg>
+      </dgm:else>
+    </dgm:choose>
+    <dgm:shape xmlns:r="http://schemas.openxmlformats.org/officeDocument/2006/relationships" r:blip="">
+      <dgm:adjLst/>
+    </dgm:shape>
+    <dgm:presOf/>
+    <dgm:constrLst>
+      <dgm:constr type="w" for="ch" ptType="node" refType="w"/>
+      <dgm:constr type="h" for="ch" ptType="node" op="equ"/>
+      <dgm:constr type="primFontSz" for="ch" ptType="node" op="equ" val="65"/>
+      <dgm:constr type="w" for="ch" ptType="sibTrans" refType="w" refFor="ch" refPtType="node" op="equ" fact="0.4"/>
+      <dgm:constr type="h" for="ch" ptType="sibTrans" op="equ"/>
+      <dgm:constr type="primFontSz" for="des" forName="connectorText" op="equ" val="55"/>
+      <dgm:constr type="primFontSz" for="des" forName="connectorText" refType="primFontSz" refFor="ch" refPtType="node" op="lte" fact="0.8"/>
+    </dgm:constrLst>
+    <dgm:ruleLst/>
+    <dgm:forEach name="nodesForEach" axis="ch" ptType="node">
+      <dgm:layoutNode name="node">
+        <dgm:varLst>
+          <dgm:bulletEnabled val="1"/>
+        </dgm:varLst>
+        <dgm:alg type="tx"/>
+        <dgm:shape xmlns:r="http://schemas.openxmlformats.org/officeDocument/2006/relationships" type="roundRect" r:blip="">
+          <dgm:adjLst>
+            <dgm:adj idx="1" val="0.1"/>
+          </dgm:adjLst>
+        </dgm:shape>
+        <dgm:presOf axis="desOrSelf" ptType="node"/>
+        <dgm:constrLst>
+          <dgm:constr type="h" refType="w" fact="0.6"/>
+          <dgm:constr type="tMarg" refType="primFontSz" fact="0.3"/>
+          <dgm:constr type="bMarg" refType="primFontSz" fact="0.3"/>
+          <dgm:constr type="lMarg" refType="primFontSz" fact="0.3"/>
+          <dgm:constr type="rMarg" refType="primFontSz" fact="0.3"/>
+        </dgm:constrLst>
+        <dgm:ruleLst>
+          <dgm:rule type="primFontSz" val="18" fact="NaN" max="NaN"/>
+          <dgm:rule type="h" val="NaN" fact="1.5" max="NaN"/>
+          <dgm:rule type="primFontSz" val="5" fact="NaN" max="NaN"/>
+          <dgm:rule type="h" val="INF" fact="NaN" max="NaN"/>
+        </dgm:ruleLst>
+      </dgm:layoutNode>
+      <dgm:forEach name="sibTransForEach" axis="followSib" ptType="sibTrans" cnt="1">
+        <dgm:layoutNode name="sibTrans">
+          <dgm:alg type="conn">
+            <dgm:param type="begPts" val="auto"/>
+            <dgm:param type="endPts" val="auto"/>
+          </dgm:alg>
+          <dgm:shape xmlns:r="http://schemas.openxmlformats.org/officeDocument/2006/relationships" type="conn" r:blip="">
+            <dgm:adjLst/>
+          </dgm:shape>
+          <dgm:presOf axis="self"/>
+          <dgm:constrLst>
+            <dgm:constr type="h" refType="w" fact="0.62"/>
+            <dgm:constr type="connDist"/>
+            <dgm:constr type="begPad" refType="connDist" fact="0.25"/>
+            <dgm:constr type="endPad" refType="connDist" fact="0.22"/>
+          </dgm:constrLst>
+          <dgm:ruleLst/>
+          <dgm:layoutNode name="connectorText">
+            <dgm:alg type="tx">
+              <dgm:param type="autoTxRot" val="grav"/>
+            </dgm:alg>
+            <dgm:shape xmlns:r="http://schemas.openxmlformats.org/officeDocument/2006/relationships" type="conn" r:blip="" hideGeom="1">
+              <dgm:adjLst/>
+            </dgm:shape>
+            <dgm:presOf axis="self"/>
+            <dgm:constrLst>
+              <dgm:constr type="lMarg"/>
+              <dgm:constr type="rMarg"/>
+              <dgm:constr type="tMarg"/>
+              <dgm:constr type="bMarg"/>
+            </dgm:constrLst>
+            <dgm:ruleLst>
+              <dgm:rule type="primFontSz" val="5" fact="NaN" max="NaN"/>
+            </dgm:ruleLst>
+          </dgm:layoutNode>
+        </dgm:layoutNode>
+      </dgm:forEach>
+    </dgm:forEach>
+  </dgm:layoutNode>
+</dgm:layoutDef>
+</file>
+
+<file path=ppt/diagrams/quickStyle1.xml><?xml version="1.0" encoding="utf-8"?>
+<dgm:styleDef xmlns:dgm="http://schemas.openxmlformats.org/drawingml/2006/diagram" xmlns:a="http://schemas.openxmlformats.org/drawingml/2006/main" uniqueId="urn:microsoft.com/office/officeart/2005/8/quickstyle/simple1">
+  <dgm:title val=""/>
+  <dgm:desc val=""/>
+  <dgm:catLst>
+    <dgm:cat type="simple" pri="10100"/>
+  </dgm:catLst>
+  <dgm:scene3d>
+    <a:camera prst="orthographicFront"/>
+    <a:lightRig rig="threePt" dir="t"/>
+  </dgm:scene3d>
+  <dgm:styleLbl name="node0">
+    <dgm:scene3d>
+      <a:camera prst="orthographicFront"/>
+      <a:lightRig rig="threePt" dir="t"/>
+    </dgm:scene3d>
+    <dgm:sp3d/>
+    <dgm:txPr/>
+    <dgm:style>
+      <a:lnRef idx="2">
+        <a:scrgbClr r="0" g="0" b="0"/>
+      </a:lnRef>
+      <a:fillRef idx="1">
+        <a:scrgbClr r="0" g="0" b="0"/>
+      </a:fillRef>
+      <a:effectRef idx="0">
+        <a:scrgbClr r="0" g="0" b="0"/>
+      </a:effectRef>
+      <a:fontRef idx="minor">
+        <a:schemeClr val="lt1"/>
+      </a:fontRef>
+    </dgm:style>
+  </dgm:styleLbl>
+  <dgm:styleLbl name="lnNode1">
+    <dgm:scene3d>
+      <a:camera prst="orthographicFront"/>
+      <a:lightRig rig="threePt" dir="t"/>
+    </dgm:scene3d>
+    <dgm:sp3d/>
+    <dgm:txPr/>
+    <dgm:style>
+      <a:lnRef idx="2">
+        <a:scrgbClr r="0" g="0" b="0"/>
+      </a:lnRef>
+      <a:fillRef idx="1">
+        <a:scrgbClr r="0" g="0" b="0"/>
+      </a:fillRef>
+      <a:effectRef idx="0">
+        <a:scrgbClr r="0" g="0" b="0"/>
+      </a:effectRef>
+      <a:fontRef idx="minor">
+        <a:schemeClr val="lt1"/>
+      </a:fontRef>
+    </dgm:style>
+  </dgm:styleLbl>
+  <dgm:styleLbl name="vennNode1">
+    <dgm:scene3d>
+      <a:camera prst="orthographicFront"/>
+      <a:lightRig rig="threePt" dir="t"/>
+    </dgm:scene3d>
+    <dgm:sp3d/>
+    <dgm:txPr/>
+    <dgm:style>
+      <a:lnRef idx="2">
+        <a:scrgbClr r="0" g="0" b="0"/>
+      </a:lnRef>
+      <a:fillRef idx="1">
+        <a:scrgbClr r="0" g="0" b="0"/>
+      </a:fillRef>
+      <a:effectRef idx="0">
+        <a:scrgbClr r="0" g="0" b="0"/>
+      </a:effectRef>
+      <a:fontRef idx="minor">
+        <a:schemeClr val="tx1"/>
+      </a:fontRef>
+    </dgm:style>
+  </dgm:styleLbl>
+  <dgm:styleLbl name="alignNode1">
+    <dgm:scene3d>
+      <a:camera prst="orthographicFront"/>
+      <a:lightRig rig="threePt" dir="t"/>
+    </dgm:scene3d>
+    <dgm:sp3d/>
+    <dgm:txPr/>
+    <dgm:style>
+      <a:lnRef idx="2">
+        <a:scrgbClr r="0" g="0" b="0"/>
+      </a:lnRef>
+      <a:fillRef idx="1">
+        <a:scrgbClr r="0" g="0" b="0"/>
+      </a:fillRef>
+      <a:effectRef idx="0">
+        <a:scrgbClr r="0" g="0" b="0"/>
+      </a:effectRef>
+      <a:fontRef idx="minor">
+        <a:schemeClr val="lt1"/>
+      </a:fontRef>
+    </dgm:style>
+  </dgm:styleLbl>
+  <dgm:styleLbl name="node1">
+    <dgm:scene3d>
+      <a:camera prst="orthographicFront"/>
+      <a:lightRig rig="threePt" dir="t"/>
+    </dgm:scene3d>
+    <dgm:sp3d/>
+    <dgm:txPr/>
+    <dgm:style>
+      <a:lnRef idx="2">
+        <a:scrgbClr r="0" g="0" b="0"/>
+      </a:lnRef>
+      <a:fillRef idx="1">
+        <a:scrgbClr r="0" g="0" b="0"/>
+      </a:fillRef>
+      <a:effectRef idx="0">
+        <a:scrgbClr r="0" g="0" b="0"/>
+      </a:effectRef>
+      <a:fontRef idx="minor">
+        <a:schemeClr val="lt1"/>
+      </a:fontRef>
+    </dgm:style>
+  </dgm:styleLbl>
+  <dgm:styleLbl name="node2">
+    <dgm:scene3d>
+      <a:camera prst="orthographicFront"/>
+      <a:lightRig rig="threePt" dir="t"/>
+    </dgm:scene3d>
+    <dgm:sp3d/>
+    <dgm:txPr/>
+    <dgm:style>
+      <a:lnRef idx="2">
+        <a:scrgbClr r="0" g="0" b="0"/>
+      </a:lnRef>
+      <a:fillRef idx="1">
+        <a:scrgbClr r="0" g="0" b="0"/>
+      </a:fillRef>
+      <a:effectRef idx="0">
+        <a:scrgbClr r="0" g="0" b="0"/>
+      </a:effectRef>
+      <a:fontRef idx="minor">
+        <a:schemeClr val="lt1"/>
+      </a:fontRef>
+    </dgm:style>
+  </dgm:styleLbl>
+  <dgm:styleLbl name="node3">
+    <dgm:scene3d>
+      <a:camera prst="orthographicFront"/>
+      <a:lightRig rig="threePt" dir="t"/>
+    </dgm:scene3d>
+    <dgm:sp3d/>
+    <dgm:txPr/>
+    <dgm:style>
+      <a:lnRef idx="2">
+        <a:scrgbClr r="0" g="0" b="0"/>
+      </a:lnRef>
+      <a:fillRef idx="1">
+        <a:scrgbClr r="0" g="0" b="0"/>
+      </a:fillRef>
+      <a:effectRef idx="0">
+        <a:scrgbClr r="0" g="0" b="0"/>
+      </a:effectRef>
+      <a:fontRef idx="minor">
+        <a:schemeClr val="lt1"/>
+      </a:fontRef>
+    </dgm:style>
+  </dgm:styleLbl>
+  <dgm:styleLbl name="node4">
+    <dgm:scene3d>
+      <a:camera prst="orthographicFront"/>
+      <a:lightRig rig="threePt" dir="t"/>
+    </dgm:scene3d>
+    <dgm:sp3d/>
+    <dgm:txPr/>
+    <dgm:style>
+      <a:lnRef idx="2">
+        <a:scrgbClr r="0" g="0" b="0"/>
+      </a:lnRef>
+      <a:fillRef idx="1">
+        <a:scrgbClr r="0" g="0" b="0"/>
+      </a:fillRef>
+      <a:effectRef idx="0">
+        <a:scrgbClr r="0" g="0" b="0"/>
+      </a:effectRef>
+      <a:fontRef idx="minor">
+        <a:schemeClr val="lt1"/>
+      </a:fontRef>
+    </dgm:style>
+  </dgm:styleLbl>
+  <dgm:styleLbl name="fgImgPlace1">
+    <dgm:scene3d>
+      <a:camera prst="orthographicFront"/>
+      <a:lightRig rig="threePt" dir="t"/>
+    </dgm:scene3d>
+    <dgm:sp3d/>
+    <dgm:txPr/>
+    <dgm:style>
+      <a:lnRef idx="2">
+        <a:scrgbClr r="0" g="0" b="0"/>
+      </a:lnRef>
+      <a:fillRef idx="1">
+        <a:scrgbClr r="0" g="0" b="0"/>
+      </a:fillRef>
+      <a:effectRef idx="0">
+        <a:scrgbClr r="0" g="0" b="0"/>
+      </a:effectRef>
+      <a:fontRef idx="minor"/>
+    </dgm:style>
+  </dgm:styleLbl>
+  <dgm:styleLbl name="alignImgPlace1">
+    <dgm:scene3d>
+      <a:camera prst="orthographicFront"/>
+      <a:lightRig rig="threePt" dir="t"/>
+    </dgm:scene3d>
+    <dgm:sp3d/>
+    <dgm:txPr/>
+    <dgm:style>
+      <a:lnRef idx="2">
+        <a:scrgbClr r="0" g="0" b="0"/>
+      </a:lnRef>
+      <a:fillRef idx="1">
+        <a:scrgbClr r="0" g="0" b="0"/>
+      </a:fillRef>
+      <a:effectRef idx="0">
+        <a:scrgbClr r="0" g="0" b="0"/>
+      </a:effectRef>
+      <a:fontRef idx="minor"/>
+    </dgm:style>
+  </dgm:styleLbl>
+  <dgm:styleLbl name="bgImgPlace1">
+    <dgm:scene3d>
+      <a:camera prst="orthographicFront"/>
+      <a:lightRig rig="threePt" dir="t"/>
+    </dgm:scene3d>
+    <dgm:sp3d/>
+    <dgm:txPr/>
+    <dgm:style>
+      <a:lnRef idx="2">
+        <a:scrgbClr r="0" g="0" b="0"/>
+      </a:lnRef>
+      <a:fillRef idx="1">
+        <a:scrgbClr r="0" g="0" b="0"/>
+      </a:fillRef>
+      <a:effectRef idx="0">
+        <a:scrgbClr r="0" g="0" b="0"/>
+      </a:effectRef>
+      <a:fontRef idx="minor"/>
+    </dgm:style>
+  </dgm:styleLbl>
+  <dgm:styleLbl name="sibTrans2D1">
+    <dgm:scene3d>
+      <a:camera prst="orthographicFront"/>
+      <a:lightRig rig="threePt" dir="t"/>
+    </dgm:scene3d>
+    <dgm:sp3d/>
+    <dgm:txPr/>
+    <dgm:style>
+      <a:lnRef idx="0">
+        <a:scrgbClr r="0" g="0" b="0"/>
+      </a:lnRef>
+      <a:fillRef idx="1">
+        <a:scrgbClr r="0" g="0" b="0"/>
+      </a:fillRef>
+      <a:effectRef idx="0">
+        <a:scrgbClr r="0" g="0" b="0"/>
+      </a:effectRef>
+      <a:fontRef idx="minor">
+        <a:schemeClr val="lt1"/>
+      </a:fontRef>
+    </dgm:style>
+  </dgm:styleLbl>
+  <dgm:styleLbl name="fgSibTrans2D1">
+    <dgm:scene3d>
+      <a:camera prst="orthographicFront"/>
+      <a:lightRig rig="threePt" dir="t"/>
+    </dgm:scene3d>
+    <dgm:sp3d/>
+    <dgm:txPr/>
+    <dgm:style>
+      <a:lnRef idx="0">
+        <a:scrgbClr r="0" g="0" b="0"/>
+      </a:lnRef>
+      <a:fillRef idx="1">
+        <a:scrgbClr r="0" g="0" b="0"/>
+      </a:fillRef>
+      <a:effectRef idx="0">
+        <a:scrgbClr r="0" g="0" b="0"/>
+      </a:effectRef>
+      <a:fontRef idx="minor">
+        <a:schemeClr val="lt1"/>
+      </a:fontRef>
+    </dgm:style>
+  </dgm:styleLbl>
+  <dgm:styleLbl name="bgSibTrans2D1">
+    <dgm:scene3d>
+      <a:camera prst="orthographicFront"/>
+      <a:lightRig rig="threePt" dir="t"/>
+    </dgm:scene3d>
+    <dgm:sp3d/>
+    <dgm:txPr/>
+    <dgm:style>
+      <a:lnRef idx="0">
+        <a:scrgbClr r="0" g="0" b="0"/>
+      </a:lnRef>
+      <a:fillRef idx="1">
+        <a:scrgbClr r="0" g="0" b="0"/>
+      </a:fillRef>
+      <a:effectRef idx="0">
+        <a:scrgbClr r="0" g="0" b="0"/>
+      </a:effectRef>
+      <a:fontRef idx="minor">
+        <a:schemeClr val="lt1"/>
+      </a:fontRef>
+    </dgm:style>
+  </dgm:styleLbl>
+  <dgm:styleLbl name="sibTrans1D1">
+    <dgm:scene3d>
+      <a:camera prst="orthographicFront"/>
+      <a:lightRig rig="threePt" dir="t"/>
+    </dgm:scene3d>
+    <dgm:sp3d/>
+    <dgm:txPr/>
+    <dgm:style>
+      <a:lnRef idx="1">
+        <a:scrgbClr r="0" g="0" b="0"/>
+      </a:lnRef>
+      <a:fillRef idx="0">
+        <a:scrgbClr r="0" g="0" b="0"/>
+      </a:fillRef>
+      <a:effectRef idx="0">
+        <a:scrgbClr r="0" g="0" b="0"/>
+      </a:effectRef>
+      <a:fontRef idx="minor"/>
+    </dgm:style>
+  </dgm:styleLbl>
+  <dgm:styleLbl name="callout">
+    <dgm:scene3d>
+      <a:camera prst="orthographicFront"/>
+      <a:lightRig rig="threePt" dir="t"/>
+    </dgm:scene3d>
+    <dgm:sp3d/>
+    <dgm:txPr/>
+    <dgm:style>
+      <a:lnRef idx="2">
+        <a:scrgbClr r="0" g="0" b="0"/>
+      </a:lnRef>
+      <a:fillRef idx="1">
+        <a:scrgbClr r="0" g="0" b="0"/>
+      </a:fillRef>
+      <a:effectRef idx="0">
+        <a:scrgbClr r="0" g="0" b="0"/>
+      </a:effectRef>
+      <a:fontRef idx="minor"/>
+    </dgm:style>
+  </dgm:styleLbl>
+  <dgm:styleLbl name="asst0">
+    <dgm:scene3d>
+      <a:camera prst="orthographicFront"/>
+      <a:lightRig rig="threePt" dir="t"/>
+    </dgm:scene3d>
+    <dgm:sp3d/>
+    <dgm:txPr/>
+    <dgm:style>
+      <a:lnRef idx="2">
+        <a:scrgbClr r="0" g="0" b="0"/>
+      </a:lnRef>
+      <a:fillRef idx="1">
+        <a:scrgbClr r="0" g="0" b="0"/>
+      </a:fillRef>
+      <a:effectRef idx="0">
+        <a:scrgbClr r="0" g="0" b="0"/>
+      </a:effectRef>
+      <a:fontRef idx="minor">
+        <a:schemeClr val="lt1"/>
+      </a:fontRef>
+    </dgm:style>
+  </dgm:styleLbl>
+  <dgm:styleLbl name="asst1">
+    <dgm:scene3d>
+      <a:camera prst="orthographicFront"/>
+      <a:lightRig rig="threePt" dir="t"/>
+    </dgm:scene3d>
+    <dgm:sp3d/>
+    <dgm:txPr/>
+    <dgm:style>
+      <a:lnRef idx="2">
+        <a:scrgbClr r="0" g="0" b="0"/>
+      </a:lnRef>
+      <a:fillRef idx="1">
+        <a:scrgbClr r="0" g="0" b="0"/>
+      </a:fillRef>
+      <a:effectRef idx="0">
+        <a:scrgbClr r="0" g="0" b="0"/>
+      </a:effectRef>
+      <a:fontRef idx="minor">
+        <a:schemeClr val="lt1"/>
+      </a:fontRef>
+    </dgm:style>
+  </dgm:styleLbl>
+  <dgm:styleLbl name="asst2">
+    <dgm:scene3d>
+      <a:camera prst="orthographicFront"/>
+      <a:lightRig rig="threePt" dir="t"/>
+    </dgm:scene3d>
+    <dgm:sp3d/>
+    <dgm:txPr/>
+    <dgm:style>
+      <a:lnRef idx="2">
+        <a:scrgbClr r="0" g="0" b="0"/>
+      </a:lnRef>
+      <a:fillRef idx="1">
+        <a:scrgbClr r="0" g="0" b="0"/>
+      </a:fillRef>
+      <a:effectRef idx="0">
+        <a:scrgbClr r="0" g="0" b="0"/>
+      </a:effectRef>
+      <a:fontRef idx="minor">
+        <a:schemeClr val="lt1"/>
+      </a:fontRef>
+    </dgm:style>
+  </dgm:styleLbl>
+  <dgm:styleLbl name="asst3">
+    <dgm:scene3d>
+      <a:camera prst="orthographicFront"/>
+      <a:lightRig rig="threePt" dir="t"/>
+    </dgm:scene3d>
+    <dgm:sp3d/>
+    <dgm:txPr/>
+    <dgm:style>
+      <a:lnRef idx="2">
+        <a:scrgbClr r="0" g="0" b="0"/>
+      </a:lnRef>
+      <a:fillRef idx="1">
+        <a:scrgbClr r="0" g="0" b="0"/>
+      </a:fillRef>
+      <a:effectRef idx="0">
+        <a:scrgbClr r="0" g="0" b="0"/>
+      </a:effectRef>
+      <a:fontRef idx="minor">
+        <a:schemeClr val="lt1"/>
+      </a:fontRef>
+    </dgm:style>
+  </dgm:styleLbl>
+  <dgm:styleLbl name="asst4">
+    <dgm:scene3d>
+      <a:camera prst="orthographicFront"/>
+      <a:lightRig rig="threePt" dir="t"/>
+    </dgm:scene3d>
+    <dgm:sp3d/>
+    <dgm:txPr/>
+    <dgm:style>
+      <a:lnRef idx="2">
+        <a:scrgbClr r="0" g="0" b="0"/>
+      </a:lnRef>
+      <a:fillRef idx="1">
+        <a:scrgbClr r="0" g="0" b="0"/>
+      </a:fillRef>
+      <a:effectRef idx="0">
+        <a:scrgbClr r="0" g="0" b="0"/>
+      </a:effectRef>
+      <a:fontRef idx="minor">
+        <a:schemeClr val="lt1"/>
+      </a:fontRef>
+    </dgm:style>
+  </dgm:styleLbl>
+  <dgm:styleLbl name="parChTrans2D1">
+    <dgm:scene3d>
+      <a:camera prst="orthographicFront"/>
+      <a:lightRig rig="threePt" dir="t"/>
+    </dgm:scene3d>
+    <dgm:sp3d/>
+    <dgm:txPr/>
+    <dgm:style>
+      <a:lnRef idx="2">
+        <a:scrgbClr r="0" g="0" b="0"/>
+      </a:lnRef>
+      <a:fillRef idx="1">
+        <a:scrgbClr r="0" g="0" b="0"/>
+      </a:fillRef>
+      <a:effectRef idx="0">
+        <a:scrgbClr r="0" g="0" b="0"/>
+      </a:effectRef>
+      <a:fontRef idx="minor">
+        <a:schemeClr val="lt1"/>
+      </a:fontRef>
+    </dgm:style>
+  </dgm:styleLbl>
+  <dgm:styleLbl name="parChTrans2D2">
+    <dgm:scene3d>
+      <a:camera prst="orthographicFront"/>
+      <a:lightRig rig="threePt" dir="t"/>
+    </dgm:scene3d>
+    <dgm:sp3d/>
+    <dgm:txPr/>
+    <dgm:style>
+      <a:lnRef idx="2">
+        <a:scrgbClr r="0" g="0" b="0"/>
+      </a:lnRef>
+      <a:fillRef idx="1">
+        <a:scrgbClr r="0" g="0" b="0"/>
+      </a:fillRef>
+      <a:effectRef idx="0">
+        <a:scrgbClr r="0" g="0" b="0"/>
+      </a:effectRef>
+      <a:fontRef idx="minor">
+        <a:schemeClr val="lt1"/>
+      </a:fontRef>
+    </dgm:style>
+  </dgm:styleLbl>
+  <dgm:styleLbl name="parChTrans2D3">
+    <dgm:scene3d>
+      <a:camera prst="orthographicFront"/>
+      <a:lightRig rig="threePt" dir="t"/>
+    </dgm:scene3d>
+    <dgm:sp3d/>
+    <dgm:txPr/>
+    <dgm:style>
+      <a:lnRef idx="2">
+        <a:scrgbClr r="0" g="0" b="0"/>
+      </a:lnRef>
+      <a:fillRef idx="1">
+        <a:scrgbClr r="0" g="0" b="0"/>
+      </a:fillRef>
+      <a:effectRef idx="0">
+        <a:scrgbClr r="0" g="0" b="0"/>
+      </a:effectRef>
+      <a:fontRef idx="minor">
+        <a:schemeClr val="lt1"/>
+      </a:fontRef>
+    </dgm:style>
+  </dgm:styleLbl>
+  <dgm:styleLbl name="parChTrans2D4">
+    <dgm:scene3d>
+      <a:camera prst="orthographicFront"/>
+      <a:lightRig rig="threePt" dir="t"/>
+    </dgm:scene3d>
+    <dgm:sp3d/>
+    <dgm:txPr/>
+    <dgm:style>
+      <a:lnRef idx="2">
+        <a:scrgbClr r="0" g="0" b="0"/>
+      </a:lnRef>
+      <a:fillRef idx="1">
+        <a:scrgbClr r="0" g="0" b="0"/>
+      </a:fillRef>
+      <a:effectRef idx="0">
+        <a:scrgbClr r="0" g="0" b="0"/>
+      </a:effectRef>
+      <a:fontRef idx="minor">
+        <a:schemeClr val="lt1"/>
+      </a:fontRef>
+    </dgm:style>
+  </dgm:styleLbl>
+  <dgm:styleLbl name="parChTrans1D1">
+    <dgm:scene3d>
+      <a:camera prst="orthographicFront"/>
+      <a:lightRig rig="threePt" dir="t"/>
+    </dgm:scene3d>
+    <dgm:sp3d/>
+    <dgm:txPr/>
+    <dgm:style>
+      <a:lnRef idx="2">
+        <a:scrgbClr r="0" g="0" b="0"/>
+      </a:lnRef>
+      <a:fillRef idx="0">
+        <a:scrgbClr r="0" g="0" b="0"/>
+      </a:fillRef>
+      <a:effectRef idx="0">
+        <a:scrgbClr r="0" g="0" b="0"/>
+      </a:effectRef>
+      <a:fontRef idx="minor"/>
+    </dgm:style>
+  </dgm:styleLbl>
+  <dgm:styleLbl name="parChTrans1D2">
+    <dgm:scene3d>
+      <a:camera prst="orthographicFront"/>
+      <a:lightRig rig="threePt" dir="t"/>
+    </dgm:scene3d>
+    <dgm:sp3d/>
+    <dgm:txPr/>
+    <dgm:style>
+      <a:lnRef idx="2">
+        <a:scrgbClr r="0" g="0" b="0"/>
+      </a:lnRef>
+      <a:fillRef idx="0">
+        <a:scrgbClr r="0" g="0" b="0"/>
+      </a:fillRef>
+      <a:effectRef idx="0">
+        <a:scrgbClr r="0" g="0" b="0"/>
+      </a:effectRef>
+      <a:fontRef idx="minor"/>
+    </dgm:style>
+  </dgm:styleLbl>
+  <dgm:styleLbl name="parChTrans1D3">
+    <dgm:scene3d>
+      <a:camera prst="orthographicFront"/>
+      <a:lightRig rig="threePt" dir="t"/>
+    </dgm:scene3d>
+    <dgm:sp3d/>
+    <dgm:txPr/>
+    <dgm:style>
+      <a:lnRef idx="2">
+        <a:scrgbClr r="0" g="0" b="0"/>
+      </a:lnRef>
+      <a:fillRef idx="0">
+        <a:scrgbClr r="0" g="0" b="0"/>
+      </a:fillRef>
+      <a:effectRef idx="0">
+        <a:scrgbClr r="0" g="0" b="0"/>
+      </a:effectRef>
+      <a:fontRef idx="minor"/>
+    </dgm:style>
+  </dgm:styleLbl>
+  <dgm:styleLbl name="parChTrans1D4">
+    <dgm:scene3d>
+      <a:camera prst="orthographicFront"/>
+      <a:lightRig rig="threePt" dir="t"/>
+    </dgm:scene3d>
+    <dgm:sp3d/>
+    <dgm:txPr/>
+    <dgm:style>
+      <a:lnRef idx="2">
+        <a:scrgbClr r="0" g="0" b="0"/>
+      </a:lnRef>
+      <a:fillRef idx="0">
+        <a:scrgbClr r="0" g="0" b="0"/>
+      </a:fillRef>
+      <a:effectRef idx="0">
+        <a:scrgbClr r="0" g="0" b="0"/>
+      </a:effectRef>
+      <a:fontRef idx="minor"/>
+    </dgm:style>
+  </dgm:styleLbl>
+  <dgm:styleLbl name="fgAcc1">
+    <dgm:scene3d>
+      <a:camera prst="orthographicFront"/>
+      <a:lightRig rig="threePt" dir="t"/>
+    </dgm:scene3d>
+    <dgm:sp3d/>
+    <dgm:txPr/>
+    <dgm:style>
+      <a:lnRef idx="2">
+        <a:scrgbClr r="0" g="0" b="0"/>
+      </a:lnRef>
+      <a:fillRef idx="1">
+        <a:scrgbClr r="0" g="0" b="0"/>
+      </a:fillRef>
+      <a:effectRef idx="0">
+        <a:scrgbClr r="0" g="0" b="0"/>
+      </a:effectRef>
+      <a:fontRef idx="minor"/>
+    </dgm:style>
+  </dgm:styleLbl>
+  <dgm:styleLbl name="conFgAcc1">
+    <dgm:scene3d>
+      <a:camera prst="orthographicFront"/>
+      <a:lightRig rig="threePt" dir="t"/>
+    </dgm:scene3d>
+    <dgm:sp3d/>
+    <dgm:txPr/>
+    <dgm:style>
+      <a:lnRef idx="2">
+        <a:scrgbClr r="0" g="0" b="0"/>
+      </a:lnRef>
+      <a:fillRef idx="1">
+        <a:scrgbClr r="0" g="0" b="0"/>
+      </a:fillRef>
+      <a:effectRef idx="0">
+        <a:scrgbClr r="0" g="0" b="0"/>
+      </a:effectRef>
+      <a:fontRef idx="minor"/>
+    </dgm:style>
+  </dgm:styleLbl>
+  <dgm:styleLbl name="alignAcc1">
+    <dgm:scene3d>
+      <a:camera prst="orthographicFront"/>
+      <a:lightRig rig="threePt" dir="t"/>
+    </dgm:scene3d>
+    <dgm:sp3d/>
+    <dgm:txPr/>
+    <dgm:style>
+      <a:lnRef idx="2">
+        <a:scrgbClr r="0" g="0" b="0"/>
+      </a:lnRef>
+      <a:fillRef idx="1">
+        <a:scrgbClr r="0" g="0" b="0"/>
+      </a:fillRef>
+      <a:effectRef idx="0">
+        <a:scrgbClr r="0" g="0" b="0"/>
+      </a:effectRef>
+      <a:fontRef idx="minor"/>
+    </dgm:style>
+  </dgm:styleLbl>
+  <dgm:styleLbl name="trAlignAcc1">
+    <dgm:scene3d>
+      <a:camera prst="orthographicFront"/>
+      <a:lightRig rig="threePt" dir="t"/>
+    </dgm:scene3d>
+    <dgm:sp3d/>
+    <dgm:txPr/>
+    <dgm:style>
+      <a:lnRef idx="1">
+        <a:scrgbClr r="0" g="0" b="0"/>
+      </a:lnRef>
+      <a:fillRef idx="1">
+        <a:scrgbClr r="0" g="0" b="0"/>
+      </a:fillRef>
+      <a:effectRef idx="0">
+        <a:scrgbClr r="0" g="0" b="0"/>
+      </a:effectRef>
+      <a:fontRef idx="minor"/>
+    </dgm:style>
+  </dgm:styleLbl>
+  <dgm:styleLbl name="bgAcc1">
+    <dgm:scene3d>
+      <a:camera prst="orthographicFront"/>
+      <a:lightRig rig="threePt" dir="t"/>
+    </dgm:scene3d>
+    <dgm:sp3d/>
+    <dgm:txPr/>
+    <dgm:style>
+      <a:lnRef idx="2">
+        <a:scrgbClr r="0" g="0" b="0"/>
+      </a:lnRef>
+      <a:fillRef idx="1">
+        <a:scrgbClr r="0" g="0" b="0"/>
+      </a:fillRef>
+      <a:effectRef idx="0">
+        <a:scrgbClr r="0" g="0" b="0"/>
+      </a:effectRef>
+      <a:fontRef idx="minor"/>
+    </dgm:style>
+  </dgm:styleLbl>
+  <dgm:styleLbl name="solidFgAcc1">
+    <dgm:scene3d>
+      <a:camera prst="orthographicFront"/>
+      <a:lightRig rig="threePt" dir="t"/>
+    </dgm:scene3d>
+    <dgm:sp3d/>
+    <dgm:txPr/>
+    <dgm:style>
+      <a:lnRef idx="2">
+        <a:scrgbClr r="0" g="0" b="0"/>
+      </a:lnRef>
+      <a:fillRef idx="1">
+        <a:scrgbClr r="0" g="0" b="0"/>
+      </a:fillRef>
+      <a:effectRef idx="0">
+        <a:scrgbClr r="0" g="0" b="0"/>
+      </a:effectRef>
+      <a:fontRef idx="minor"/>
+    </dgm:style>
+  </dgm:styleLbl>
+  <dgm:styleLbl name="solidAlignAcc1">
+    <dgm:scene3d>
+      <a:camera prst="orthographicFront"/>
+      <a:lightRig rig="threePt" dir="t"/>
+    </dgm:scene3d>
+    <dgm:sp3d/>
+    <dgm:txPr/>
+    <dgm:style>
+      <a:lnRef idx="2">
+        <a:scrgbClr r="0" g="0" b="0"/>
+      </a:lnRef>
+      <a:fillRef idx="1">
+        <a:scrgbClr r="0" g="0" b="0"/>
+      </a:fillRef>
+      <a:effectRef idx="0">
+        <a:scrgbClr r="0" g="0" b="0"/>
+      </a:effectRef>
+      <a:fontRef idx="minor"/>
+    </dgm:style>
+  </dgm:styleLbl>
+  <dgm:styleLbl name="solidBgAcc1">
+    <dgm:scene3d>
+      <a:camera prst="orthographicFront"/>
+      <a:lightRig rig="threePt" dir="t"/>
+    </dgm:scene3d>
+    <dgm:sp3d/>
+    <dgm:txPr/>
+    <dgm:style>
+      <a:lnRef idx="2">
+        <a:scrgbClr r="0" g="0" b="0"/>
+      </a:lnRef>
+      <a:fillRef idx="1">
+        <a:scrgbClr r="0" g="0" b="0"/>
+      </a:fillRef>
+      <a:effectRef idx="0">
+        <a:scrgbClr r="0" g="0" b="0"/>
+      </a:effectRef>
+      <a:fontRef idx="minor"/>
+    </dgm:style>
+  </dgm:styleLbl>
+  <dgm:styleLbl name="fgAccFollowNode1">
+    <dgm:scene3d>
+      <a:camera prst="orthographicFront"/>
+      <a:lightRig rig="threePt" dir="t"/>
+    </dgm:scene3d>
+    <dgm:sp3d/>
+    <dgm:txPr/>
+    <dgm:style>
+      <a:lnRef idx="2">
+        <a:scrgbClr r="0" g="0" b="0"/>
+      </a:lnRef>
+      <a:fillRef idx="1">
+        <a:scrgbClr r="0" g="0" b="0"/>
+      </a:fillRef>
+      <a:effectRef idx="0">
+        <a:scrgbClr r="0" g="0" b="0"/>
+      </a:effectRef>
+      <a:fontRef idx="minor"/>
+    </dgm:style>
+  </dgm:styleLbl>
+  <dgm:styleLbl name="alignAccFollowNode1">
+    <dgm:scene3d>
+      <a:camera prst="orthographicFront"/>
+      <a:lightRig rig="threePt" dir="t"/>
+    </dgm:scene3d>
+    <dgm:sp3d/>
+    <dgm:txPr/>
+    <dgm:style>
+      <a:lnRef idx="2">
+        <a:scrgbClr r="0" g="0" b="0"/>
+      </a:lnRef>
+      <a:fillRef idx="1">
+        <a:scrgbClr r="0" g="0" b="0"/>
+      </a:fillRef>
+      <a:effectRef idx="0">
+        <a:scrgbClr r="0" g="0" b="0"/>
+      </a:effectRef>
+      <a:fontRef idx="minor"/>
+    </dgm:style>
+  </dgm:styleLbl>
+  <dgm:styleLbl name="bgAccFollowNode1">
+    <dgm:scene3d>
+      <a:camera prst="orthographicFront"/>
+      <a:lightRig rig="threePt" dir="t"/>
+    </dgm:scene3d>
+    <dgm:sp3d/>
+    <dgm:txPr/>
+    <dgm:style>
+      <a:lnRef idx="2">
+        <a:scrgbClr r="0" g="0" b="0"/>
+      </a:lnRef>
+      <a:fillRef idx="1">
+        <a:scrgbClr r="0" g="0" b="0"/>
+      </a:fillRef>
+      <a:effectRef idx="0">
+        <a:scrgbClr r="0" g="0" b="0"/>
+      </a:effectRef>
+      <a:fontRef idx="minor"/>
+    </dgm:style>
+  </dgm:styleLbl>
+  <dgm:styleLbl name="fgAcc0">
+    <dgm:scene3d>
+      <a:camera prst="orthographicFront"/>
+      <a:lightRig rig="threePt" dir="t"/>
+    </dgm:scene3d>
+    <dgm:sp3d/>
+    <dgm:txPr/>
+    <dgm:style>
+      <a:lnRef idx="2">
+        <a:scrgbClr r="0" g="0" b="0"/>
+      </a:lnRef>
+      <a:fillRef idx="1">
+        <a:scrgbClr r="0" g="0" b="0"/>
+      </a:fillRef>
+      <a:effectRef idx="0">
+        <a:scrgbClr r="0" g="0" b="0"/>
+      </a:effectRef>
+      <a:fontRef idx="minor"/>
+    </dgm:style>
+  </dgm:styleLbl>
+  <dgm:styleLbl name="fgAcc2">
+    <dgm:scene3d>
+      <a:camera prst="orthographicFront"/>
+      <a:lightRig rig="threePt" dir="t"/>
+    </dgm:scene3d>
+    <dgm:sp3d/>
+    <dgm:txPr/>
+    <dgm:style>
+      <a:lnRef idx="2">
+        <a:scrgbClr r="0" g="0" b="0"/>
+      </a:lnRef>
+      <a:fillRef idx="1">
+        <a:scrgbClr r="0" g="0" b="0"/>
+      </a:fillRef>
+      <a:effectRef idx="0">
+        <a:scrgbClr r="0" g="0" b="0"/>
+      </a:effectRef>
+      <a:fontRef idx="minor"/>
+    </dgm:style>
+  </dgm:styleLbl>
+  <dgm:styleLbl name="fgAcc3">
+    <dgm:scene3d>
+      <a:camera prst="orthographicFront"/>
+      <a:lightRig rig="threePt" dir="t"/>
+    </dgm:scene3d>
+    <dgm:sp3d/>
+    <dgm:txPr/>
+    <dgm:style>
+      <a:lnRef idx="2">
+        <a:scrgbClr r="0" g="0" b="0"/>
+      </a:lnRef>
+      <a:fillRef idx="1">
+        <a:scrgbClr r="0" g="0" b="0"/>
+      </a:fillRef>
+      <a:effectRef idx="0">
+        <a:scrgbClr r="0" g="0" b="0"/>
+      </a:effectRef>
+      <a:fontRef idx="minor"/>
+    </dgm:style>
+  </dgm:styleLbl>
+  <dgm:styleLbl name="fgAcc4">
+    <dgm:scene3d>
+      <a:camera prst="orthographicFront"/>
+      <a:lightRig rig="threePt" dir="t"/>
+    </dgm:scene3d>
+    <dgm:sp3d/>
+    <dgm:txPr/>
+    <dgm:style>
+      <a:lnRef idx="2">
+        <a:scrgbClr r="0" g="0" b="0"/>
+      </a:lnRef>
+      <a:fillRef idx="1">
+        <a:scrgbClr r="0" g="0" b="0"/>
+      </a:fillRef>
+      <a:effectRef idx="0">
+        <a:scrgbClr r="0" g="0" b="0"/>
+      </a:effectRef>
+      <a:fontRef idx="minor"/>
+    </dgm:style>
+  </dgm:styleLbl>
+  <dgm:styleLbl name="bgShp">
+    <dgm:scene3d>
+      <a:camera prst="orthographicFront"/>
+      <a:lightRig rig="threePt" dir="t"/>
+    </dgm:scene3d>
+    <dgm:sp3d/>
+    <dgm:txPr/>
+    <dgm:style>
+      <a:lnRef idx="0">
+        <a:scrgbClr r="0" g="0" b="0"/>
+      </a:lnRef>
+      <a:fillRef idx="1">
+        <a:scrgbClr r="0" g="0" b="0"/>
+      </a:fillRef>
+      <a:effectRef idx="0">
+        <a:scrgbClr r="0" g="0" b="0"/>
+      </a:effectRef>
+      <a:fontRef idx="minor"/>
+    </dgm:style>
+  </dgm:styleLbl>
+  <dgm:styleLbl name="dkBgShp">
+    <dgm:scene3d>
+      <a:camera prst="orthographicFront"/>
+      <a:lightRig rig="threePt" dir="t"/>
+    </dgm:scene3d>
+    <dgm:sp3d/>
+    <dgm:txPr/>
+    <dgm:style>
+      <a:lnRef idx="0">
+        <a:scrgbClr r="0" g="0" b="0"/>
+      </a:lnRef>
+      <a:fillRef idx="1">
+        <a:scrgbClr r="0" g="0" b="0"/>
+      </a:fillRef>
+      <a:effectRef idx="0">
+        <a:scrgbClr r="0" g="0" b="0"/>
+      </a:effectRef>
+      <a:fontRef idx="minor"/>
+    </dgm:style>
+  </dgm:styleLbl>
+  <dgm:styleLbl name="trBgShp">
+    <dgm:scene3d>
+      <a:camera prst="orthographicFront"/>
+      <a:lightRig rig="threePt" dir="t"/>
+    </dgm:scene3d>
+    <dgm:sp3d/>
+    <dgm:txPr/>
+    <dgm:style>
+      <a:lnRef idx="0">
+        <a:scrgbClr r="0" g="0" b="0"/>
+      </a:lnRef>
+      <a:fillRef idx="1">
+        <a:scrgbClr r="0" g="0" b="0"/>
+      </a:fillRef>
+      <a:effectRef idx="0">
+        <a:scrgbClr r="0" g="0" b="0"/>
+      </a:effectRef>
+      <a:fontRef idx="minor"/>
+    </dgm:style>
+  </dgm:styleLbl>
+  <dgm:styleLbl name="fgShp">
+    <dgm:scene3d>
+      <a:camera prst="orthographicFront"/>
+      <a:lightRig rig="threePt" dir="t"/>
+    </dgm:scene3d>
+    <dgm:sp3d/>
+    <dgm:txPr/>
+    <dgm:style>
+      <a:lnRef idx="2">
+        <a:scrgbClr r="0" g="0" b="0"/>
+      </a:lnRef>
+      <a:fillRef idx="1">
+        <a:scrgbClr r="0" g="0" b="0"/>
+      </a:fillRef>
+      <a:effectRef idx="0">
+        <a:scrgbClr r="0" g="0" b="0"/>
+      </a:effectRef>
+      <a:fontRef idx="minor"/>
+    </dgm:style>
+  </dgm:styleLbl>
+  <dgm:styleLbl name="revTx">
+    <dgm:scene3d>
+      <a:camera prst="orthographicFront"/>
+      <a:lightRig rig="threePt" dir="t"/>
+    </dgm:scene3d>
+    <dgm:sp3d/>
+    <dgm:txPr/>
+    <dgm:style>
+      <a:lnRef idx="0">
+        <a:scrgbClr r="0" g="0" b="0"/>
+      </a:lnRef>
+      <a:fillRef idx="0">
+        <a:scrgbClr r="0" g="0" b="0"/>
+      </a:fillRef>
+      <a:effectRef idx="0">
+        <a:scrgbClr r="0" g="0" b="0"/>
+      </a:effectRef>
+      <a:fontRef idx="minor"/>
+    </dgm:style>
+  </dgm:styleLbl>
+</dgm:styleDef>
+</file>
+
 <file path=ppt/notesMasters/notesMaster1.xml><?xml version="1.0" encoding="utf-8"?>
 <p:notesMaster xmlns:a="http://schemas.openxmlformats.org/drawingml/2006/main" xmlns:r="http://schemas.openxmlformats.org/officeDocument/2006/relationships" xmlns:p="http://schemas.openxmlformats.org/presentationml/2006/main">
   <p:cSld>
@@ -206,7 +3126,7 @@
           <a:p>
             <a:fld id="{218C8F45-0D35-4F06-9AC8-C547C595EDF0}" type="datetimeFigureOut">
               <a:rPr lang="en-US" smtClean="0"/>
-              <a:t>7/29/2023</a:t>
+              <a:t>7/31/2023</a:t>
             </a:fld>
             <a:endParaRPr lang="en-US"/>
           </a:p>
@@ -517,6 +3437,79 @@
           <a:bodyPr/>
           <a:lstStyle/>
           <a:p>
+            <a:pPr>
+              <a:buFont typeface="Wingdings" panose="05000000000000000000" pitchFamily="2" charset="2"/>
+              <a:buChar char="§"/>
+            </a:pPr>
+            <a:r>
+              <a:rPr lang="en-US" dirty="0"/>
+              <a:t>Methods:</a:t>
+            </a:r>
+          </a:p>
+          <a:p>
+            <a:pPr lvl="1">
+              <a:buFont typeface="Wingdings" panose="05000000000000000000" pitchFamily="2" charset="2"/>
+              <a:buChar char="§"/>
+            </a:pPr>
+            <a:r>
+              <a:rPr lang="en-US" dirty="0"/>
+              <a:t>Scrape web tables to Pandas </a:t>
+            </a:r>
+            <a:r>
+              <a:rPr lang="en-US" dirty="0" err="1"/>
+              <a:t>DataFrames</a:t>
+            </a:r>
+            <a:endParaRPr lang="en-US" dirty="0"/>
+          </a:p>
+          <a:p>
+            <a:pPr lvl="1">
+              <a:buFont typeface="Wingdings" panose="05000000000000000000" pitchFamily="2" charset="2"/>
+              <a:buChar char="§"/>
+            </a:pPr>
+            <a:r>
+              <a:rPr lang="en-US" dirty="0"/>
+              <a:t>Use regex and .replace to clean column data</a:t>
+            </a:r>
+          </a:p>
+          <a:p>
+            <a:pPr lvl="1">
+              <a:buFont typeface="Wingdings" panose="05000000000000000000" pitchFamily="2" charset="2"/>
+              <a:buChar char="§"/>
+            </a:pPr>
+            <a:r>
+              <a:rPr lang="en-US" dirty="0"/>
+              <a:t>.loc and .</a:t>
+            </a:r>
+            <a:r>
+              <a:rPr lang="en-US" dirty="0" err="1"/>
+              <a:t>iloc</a:t>
+            </a:r>
+            <a:r>
+              <a:rPr lang="en-US" dirty="0"/>
+              <a:t> to append state and county columns</a:t>
+            </a:r>
+          </a:p>
+          <a:p>
+            <a:pPr lvl="1">
+              <a:buFont typeface="Wingdings" panose="05000000000000000000" pitchFamily="2" charset="2"/>
+              <a:buChar char="§"/>
+            </a:pPr>
+            <a:r>
+              <a:rPr lang="en-US" dirty="0">
+                <a:solidFill>
+                  <a:srgbClr val="FF0000"/>
+                </a:solidFill>
+              </a:rPr>
+              <a:t>Remap data tables to horizontal year format</a:t>
+            </a:r>
+          </a:p>
+          <a:p>
+            <a:pPr marL="0" indent="0">
+              <a:buNone/>
+            </a:pPr>
+            <a:endParaRPr lang="en-US" dirty="0"/>
+          </a:p>
+          <a:p>
             <a:endParaRPr lang="en-US" dirty="0"/>
           </a:p>
         </p:txBody>
@@ -536,9 +3529,93 @@
           <a:bodyPr/>
           <a:lstStyle/>
           <a:p>
+            <a:fld id="{34523330-130C-4A11-8249-F3612B4CD402}" type="slidenum">
+              <a:rPr lang="en-US" smtClean="0"/>
+              <a:t>5</a:t>
+            </a:fld>
+            <a:endParaRPr lang="en-US"/>
+          </a:p>
+        </p:txBody>
+      </p:sp>
+    </p:spTree>
+    <p:extLst>
+      <p:ext uri="{BB962C8B-B14F-4D97-AF65-F5344CB8AC3E}">
+        <p14:creationId xmlns:p14="http://schemas.microsoft.com/office/powerpoint/2010/main" val="3024222980"/>
+      </p:ext>
+    </p:extLst>
+  </p:cSld>
+  <p:clrMapOvr>
+    <a:masterClrMapping/>
+  </p:clrMapOvr>
+</p:notes>
+</file>
+
+<file path=ppt/notesSlides/notesSlide2.xml><?xml version="1.0" encoding="utf-8"?>
+<p:notes xmlns:a="http://schemas.openxmlformats.org/drawingml/2006/main" xmlns:r="http://schemas.openxmlformats.org/officeDocument/2006/relationships" xmlns:p="http://schemas.openxmlformats.org/presentationml/2006/main">
+  <p:cSld>
+    <p:spTree>
+      <p:nvGrpSpPr>
+        <p:cNvPr id="1" name=""/>
+        <p:cNvGrpSpPr/>
+        <p:nvPr/>
+      </p:nvGrpSpPr>
+      <p:grpSpPr>
+        <a:xfrm>
+          <a:off x="0" y="0"/>
+          <a:ext cx="0" cy="0"/>
+          <a:chOff x="0" y="0"/>
+          <a:chExt cx="0" cy="0"/>
+        </a:xfrm>
+      </p:grpSpPr>
+      <p:sp>
+        <p:nvSpPr>
+          <p:cNvPr id="2" name="Slide Image Placeholder 1"/>
+          <p:cNvSpPr>
+            <a:spLocks noGrp="1" noRot="1" noChangeAspect="1"/>
+          </p:cNvSpPr>
+          <p:nvPr>
+            <p:ph type="sldImg"/>
+          </p:nvPr>
+        </p:nvSpPr>
+        <p:spPr/>
+      </p:sp>
+      <p:sp>
+        <p:nvSpPr>
+          <p:cNvPr id="3" name="Notes Placeholder 2"/>
+          <p:cNvSpPr>
+            <a:spLocks noGrp="1"/>
+          </p:cNvSpPr>
+          <p:nvPr>
+            <p:ph type="body" idx="1"/>
+          </p:nvPr>
+        </p:nvSpPr>
+        <p:spPr/>
+        <p:txBody>
+          <a:bodyPr/>
+          <a:lstStyle/>
+          <a:p>
+            <a:endParaRPr lang="en-US" dirty="0"/>
+          </a:p>
+        </p:txBody>
+      </p:sp>
+      <p:sp>
+        <p:nvSpPr>
+          <p:cNvPr id="4" name="Slide Number Placeholder 3"/>
+          <p:cNvSpPr>
+            <a:spLocks noGrp="1"/>
+          </p:cNvSpPr>
+          <p:nvPr>
+            <p:ph type="sldNum" sz="quarter" idx="5"/>
+          </p:nvPr>
+        </p:nvSpPr>
+        <p:spPr/>
+        <p:txBody>
+          <a:bodyPr/>
+          <a:lstStyle/>
+          <a:p>
             <a:fld id="{F1D59B1D-B0BC-4C10-A0E9-E068C37A006F}" type="slidenum">
               <a:rPr lang="en-US" smtClean="0"/>
-              <a:t>9</a:t>
+              <a:t>8</a:t>
             </a:fld>
             <a:endParaRPr lang="en-US"/>
           </a:p>
@@ -728,7 +3805,7 @@
           <a:p>
             <a:fld id="{EDD99DFF-4D7C-4671-8EF0-23A72D1484EC}" type="datetimeFigureOut">
               <a:rPr lang="en-US" smtClean="0"/>
-              <a:t>7/29/2023</a:t>
+              <a:t>7/31/2023</a:t>
             </a:fld>
             <a:endParaRPr lang="en-US"/>
           </a:p>
@@ -1040,7 +4117,7 @@
           <a:p>
             <a:fld id="{EDD99DFF-4D7C-4671-8EF0-23A72D1484EC}" type="datetimeFigureOut">
               <a:rPr lang="en-US" smtClean="0"/>
-              <a:t>7/29/2023</a:t>
+              <a:t>7/31/2023</a:t>
             </a:fld>
             <a:endParaRPr lang="en-US"/>
           </a:p>
@@ -1262,7 +4339,7 @@
           <a:p>
             <a:fld id="{EDD99DFF-4D7C-4671-8EF0-23A72D1484EC}" type="datetimeFigureOut">
               <a:rPr lang="en-US" smtClean="0"/>
-              <a:t>7/29/2023</a:t>
+              <a:t>7/31/2023</a:t>
             </a:fld>
             <a:endParaRPr lang="en-US"/>
           </a:p>
@@ -1553,7 +4630,7 @@
           <a:p>
             <a:fld id="{EDD99DFF-4D7C-4671-8EF0-23A72D1484EC}" type="datetimeFigureOut">
               <a:rPr lang="en-US" smtClean="0"/>
-              <a:t>7/29/2023</a:t>
+              <a:t>7/31/2023</a:t>
             </a:fld>
             <a:endParaRPr lang="en-US"/>
           </a:p>
@@ -2007,7 +5084,7 @@
           <a:p>
             <a:fld id="{EDD99DFF-4D7C-4671-8EF0-23A72D1484EC}" type="datetimeFigureOut">
               <a:rPr lang="en-US" smtClean="0"/>
-              <a:t>7/29/2023</a:t>
+              <a:t>7/31/2023</a:t>
             </a:fld>
             <a:endParaRPr lang="en-US"/>
           </a:p>
@@ -2583,7 +5660,7 @@
           <a:p>
             <a:fld id="{EDD99DFF-4D7C-4671-8EF0-23A72D1484EC}" type="datetimeFigureOut">
               <a:rPr lang="en-US" smtClean="0"/>
-              <a:t>7/29/2023</a:t>
+              <a:t>7/31/2023</a:t>
             </a:fld>
             <a:endParaRPr lang="en-US"/>
           </a:p>
@@ -3435,7 +6512,7 @@
           <a:p>
             <a:fld id="{EDD99DFF-4D7C-4671-8EF0-23A72D1484EC}" type="datetimeFigureOut">
               <a:rPr lang="en-US" smtClean="0"/>
-              <a:t>7/29/2023</a:t>
+              <a:t>7/31/2023</a:t>
             </a:fld>
             <a:endParaRPr lang="en-US"/>
           </a:p>
@@ -3640,7 +6717,7 @@
           <a:p>
             <a:fld id="{EDD99DFF-4D7C-4671-8EF0-23A72D1484EC}" type="datetimeFigureOut">
               <a:rPr lang="en-US" smtClean="0"/>
-              <a:t>7/29/2023</a:t>
+              <a:t>7/31/2023</a:t>
             </a:fld>
             <a:endParaRPr lang="en-US"/>
           </a:p>
@@ -3854,7 +6931,7 @@
           <a:p>
             <a:fld id="{EDD99DFF-4D7C-4671-8EF0-23A72D1484EC}" type="datetimeFigureOut">
               <a:rPr lang="en-US" smtClean="0"/>
-              <a:t>7/29/2023</a:t>
+              <a:t>7/31/2023</a:t>
             </a:fld>
             <a:endParaRPr lang="en-US"/>
           </a:p>
@@ -4048,7 +7125,7 @@
             <a:fld id="{EDD99DFF-4D7C-4671-8EF0-23A72D1484EC}" type="datetimeFigureOut">
               <a:rPr lang="en-US" smtClean="0"/>
               <a:pPr/>
-              <a:t>7/29/2023</a:t>
+              <a:t>7/31/2023</a:t>
             </a:fld>
             <a:endParaRPr lang="en-US"/>
           </a:p>
@@ -4294,7 +7371,7 @@
           <a:p>
             <a:fld id="{925EA6E8-F76E-44A9-9BED-4361634B60BD}" type="datetimeFigureOut">
               <a:rPr lang="en-US" smtClean="0"/>
-              <a:t>7/29/2023</a:t>
+              <a:t>7/31/2023</a:t>
             </a:fld>
             <a:endParaRPr lang="en-US"/>
           </a:p>
@@ -4499,7 +7576,7 @@
           <a:p>
             <a:fld id="{EDD99DFF-4D7C-4671-8EF0-23A72D1484EC}" type="datetimeFigureOut">
               <a:rPr lang="en-US" smtClean="0"/>
-              <a:t>7/29/2023</a:t>
+              <a:t>7/31/2023</a:t>
             </a:fld>
             <a:endParaRPr lang="en-US"/>
           </a:p>
@@ -4779,7 +7856,7 @@
           <a:p>
             <a:fld id="{EDD99DFF-4D7C-4671-8EF0-23A72D1484EC}" type="datetimeFigureOut">
               <a:rPr lang="en-US" smtClean="0"/>
-              <a:t>7/29/2023</a:t>
+              <a:t>7/31/2023</a:t>
             </a:fld>
             <a:endParaRPr lang="en-US"/>
           </a:p>
@@ -5046,7 +8123,7 @@
           <a:p>
             <a:fld id="{EDD99DFF-4D7C-4671-8EF0-23A72D1484EC}" type="datetimeFigureOut">
               <a:rPr lang="en-US" smtClean="0"/>
-              <a:t>7/29/2023</a:t>
+              <a:t>7/31/2023</a:t>
             </a:fld>
             <a:endParaRPr lang="en-US"/>
           </a:p>
@@ -5461,7 +8538,7 @@
           <a:p>
             <a:fld id="{EDD99DFF-4D7C-4671-8EF0-23A72D1484EC}" type="datetimeFigureOut">
               <a:rPr lang="en-US" smtClean="0"/>
-              <a:t>7/29/2023</a:t>
+              <a:t>7/31/2023</a:t>
             </a:fld>
             <a:endParaRPr lang="en-US"/>
           </a:p>
@@ -5609,7 +8686,7 @@
           <a:p>
             <a:fld id="{EDD99DFF-4D7C-4671-8EF0-23A72D1484EC}" type="datetimeFigureOut">
               <a:rPr lang="en-US" smtClean="0"/>
-              <a:t>7/29/2023</a:t>
+              <a:t>7/31/2023</a:t>
             </a:fld>
             <a:endParaRPr lang="en-US"/>
           </a:p>
@@ -5734,7 +8811,7 @@
           <a:p>
             <a:fld id="{EDD99DFF-4D7C-4671-8EF0-23A72D1484EC}" type="datetimeFigureOut">
               <a:rPr lang="en-US" smtClean="0"/>
-              <a:t>7/29/2023</a:t>
+              <a:t>7/31/2023</a:t>
             </a:fld>
             <a:endParaRPr lang="en-US"/>
           </a:p>
@@ -6013,7 +9090,7 @@
           <a:p>
             <a:fld id="{EDD99DFF-4D7C-4671-8EF0-23A72D1484EC}" type="datetimeFigureOut">
               <a:rPr lang="en-US" smtClean="0"/>
-              <a:t>7/29/2023</a:t>
+              <a:t>7/31/2023</a:t>
             </a:fld>
             <a:endParaRPr lang="en-US"/>
           </a:p>
@@ -6325,7 +9402,7 @@
           <a:p>
             <a:fld id="{EDD99DFF-4D7C-4671-8EF0-23A72D1484EC}" type="datetimeFigureOut">
               <a:rPr lang="en-US" smtClean="0"/>
-              <a:t>7/29/2023</a:t>
+              <a:t>7/31/2023</a:t>
             </a:fld>
             <a:endParaRPr lang="en-US"/>
           </a:p>
@@ -6578,7 +9655,7 @@
           <a:p>
             <a:fld id="{EDD99DFF-4D7C-4671-8EF0-23A72D1484EC}" type="datetimeFigureOut">
               <a:rPr lang="en-US" smtClean="0"/>
-              <a:t>7/29/2023</a:t>
+              <a:t>7/31/2023</a:t>
             </a:fld>
             <a:endParaRPr lang="en-US"/>
           </a:p>
@@ -7107,113 +10184,6 @@
 </p:sld>
 </file>
 
-<file path=ppt/slides/slide10.xml><?xml version="1.0" encoding="utf-8"?>
-<p:sld xmlns:a="http://schemas.openxmlformats.org/drawingml/2006/main" xmlns:r="http://schemas.openxmlformats.org/officeDocument/2006/relationships" xmlns:p="http://schemas.openxmlformats.org/presentationml/2006/main">
-  <p:cSld>
-    <p:spTree>
-      <p:nvGrpSpPr>
-        <p:cNvPr id="1" name=""/>
-        <p:cNvGrpSpPr/>
-        <p:nvPr/>
-      </p:nvGrpSpPr>
-      <p:grpSpPr>
-        <a:xfrm>
-          <a:off x="0" y="0"/>
-          <a:ext cx="0" cy="0"/>
-          <a:chOff x="0" y="0"/>
-          <a:chExt cx="0" cy="0"/>
-        </a:xfrm>
-      </p:grpSpPr>
-      <p:sp>
-        <p:nvSpPr>
-          <p:cNvPr id="2" name="Title 1">
-            <a:extLst>
-              <a:ext uri="{FF2B5EF4-FFF2-40B4-BE49-F238E27FC236}">
-                <a16:creationId xmlns:a16="http://schemas.microsoft.com/office/drawing/2014/main" id="{DDB2557C-9949-3B6C-7B73-1B10F2EB142A}"/>
-              </a:ext>
-            </a:extLst>
-          </p:cNvPr>
-          <p:cNvSpPr>
-            <a:spLocks noGrp="1"/>
-          </p:cNvSpPr>
-          <p:nvPr>
-            <p:ph type="title"/>
-          </p:nvPr>
-        </p:nvSpPr>
-        <p:spPr/>
-        <p:txBody>
-          <a:bodyPr>
-            <a:normAutofit/>
-          </a:bodyPr>
-          <a:lstStyle/>
-          <a:p>
-            <a:r>
-              <a:rPr lang="en-US" cap="none" dirty="0">
-                <a:solidFill>
-                  <a:srgbClr val="FF0000"/>
-                </a:solidFill>
-              </a:rPr>
-              <a:t>Next Steps for Analysis</a:t>
-            </a:r>
-          </a:p>
-        </p:txBody>
-      </p:sp>
-      <p:sp>
-        <p:nvSpPr>
-          <p:cNvPr id="3" name="Content Placeholder 2">
-            <a:extLst>
-              <a:ext uri="{FF2B5EF4-FFF2-40B4-BE49-F238E27FC236}">
-                <a16:creationId xmlns:a16="http://schemas.microsoft.com/office/drawing/2014/main" id="{C48AB4A4-A926-573B-950A-9061BE172B6A}"/>
-              </a:ext>
-            </a:extLst>
-          </p:cNvPr>
-          <p:cNvSpPr>
-            <a:spLocks noGrp="1"/>
-          </p:cNvSpPr>
-          <p:nvPr>
-            <p:ph idx="1"/>
-          </p:nvPr>
-        </p:nvSpPr>
-        <p:spPr>
-          <a:xfrm>
-            <a:off x="913775" y="1989439"/>
-            <a:ext cx="10364452" cy="3801762"/>
-          </a:xfrm>
-        </p:spPr>
-        <p:txBody>
-          <a:bodyPr>
-            <a:normAutofit/>
-          </a:bodyPr>
-          <a:lstStyle/>
-          <a:p>
-            <a:pPr>
-              <a:buFont typeface="Wingdings" panose="05000000000000000000" pitchFamily="2" charset="2"/>
-              <a:buChar char="§"/>
-            </a:pPr>
-            <a:r>
-              <a:rPr lang="en-US" cap="none" dirty="0">
-                <a:solidFill>
-                  <a:srgbClr val="FF0000"/>
-                </a:solidFill>
-              </a:rPr>
-              <a:t>(After reviewing data, note any potential next steps for analysis here. Assume this project was the “scoping” phase for refining the analysis.)</a:t>
-            </a:r>
-          </a:p>
-        </p:txBody>
-      </p:sp>
-    </p:spTree>
-    <p:extLst>
-      <p:ext uri="{BB962C8B-B14F-4D97-AF65-F5344CB8AC3E}">
-        <p14:creationId xmlns:p14="http://schemas.microsoft.com/office/powerpoint/2010/main" val="2792450198"/>
-      </p:ext>
-    </p:extLst>
-  </p:cSld>
-  <p:clrMapOvr>
-    <a:masterClrMapping/>
-  </p:clrMapOvr>
-</p:sld>
-</file>
-
 <file path=ppt/slides/slide2.xml><?xml version="1.0" encoding="utf-8"?>
 <p:sld xmlns:a="http://schemas.openxmlformats.org/drawingml/2006/main" xmlns:r="http://schemas.openxmlformats.org/officeDocument/2006/relationships" xmlns:p="http://schemas.openxmlformats.org/presentationml/2006/main">
   <p:cSld>
@@ -7305,7 +10275,7 @@
           <a:p>
             <a:r>
               <a:rPr lang="en-US" cap="none" dirty="0"/>
-              <a:t>(Observe the year-over-year rates of specific vector-borne illnesses as they relate to average county temperatures and precipitation levels.)</a:t>
+              <a:t>Observe year-over-year rates of specific vector-borne illnesses as related to average county temperatures and precipitation levels.</a:t>
             </a:r>
           </a:p>
         </p:txBody>
@@ -7349,13 +10319,13 @@
           <a:p>
             <a:r>
               <a:rPr lang="en-US" cap="none" dirty="0"/>
-              <a:t>(data for USA counties only)</a:t>
+              <a:t>Data for USA counties only</a:t>
             </a:r>
           </a:p>
           <a:p>
             <a:r>
               <a:rPr lang="en-US" cap="none" dirty="0"/>
-              <a:t>(illnesses analyzed were West Nile Virus and Lyme Disease)</a:t>
+              <a:t>Illnesses analyzed were West Nile Virus and Lyme Disease</a:t>
             </a:r>
           </a:p>
         </p:txBody>
@@ -7479,12 +10449,8 @@
           <a:lstStyle/>
           <a:p>
             <a:r>
-              <a:rPr lang="en-US" dirty="0">
-                <a:solidFill>
-                  <a:srgbClr val="FF0000"/>
-                </a:solidFill>
-              </a:rPr>
-              <a:t>(Questions asked of the Datasets)</a:t>
+              <a:rPr lang="en-US" dirty="0"/>
+              <a:t>Questions asked of the Datasets</a:t>
             </a:r>
           </a:p>
         </p:txBody>
@@ -7508,7 +10474,7 @@
         <p:spPr>
           <a:xfrm>
             <a:off x="337339" y="1487387"/>
-            <a:ext cx="5834861" cy="4301753"/>
+            <a:ext cx="11157975" cy="4301753"/>
           </a:xfrm>
         </p:spPr>
         <p:txBody>
@@ -7530,7 +10496,7 @@
             </a:pPr>
             <a:r>
               <a:rPr lang="en-US" cap="none" dirty="0"/>
-              <a:t>How did temperature and precipitation levels relate to rates of </a:t>
+              <a:t>How did temperature and precipitation levels relate visually to rates of </a:t>
             </a:r>
             <a:r>
               <a:rPr lang="en-US" dirty="0"/>
@@ -7562,69 +10528,35 @@
             <a:pPr marL="457200" lvl="1" indent="0">
               <a:buNone/>
             </a:pPr>
-            <a:endParaRPr lang="en-US" cap="none" dirty="0"/>
+            <a:endParaRPr lang="en-US" dirty="0"/>
           </a:p>
           <a:p>
             <a:pPr marL="457200" lvl="1" indent="0">
               <a:buNone/>
             </a:pPr>
-            <a:r>
-              <a:rPr lang="en-US" dirty="0">
+            <a:endParaRPr lang="en-US" dirty="0"/>
+          </a:p>
+          <a:p>
+            <a:pPr marL="457200" lvl="1" indent="0">
+              <a:buNone/>
+            </a:pPr>
+            <a:r>
+              <a:rPr lang="en-US" cap="none" dirty="0">
                 <a:solidFill>
                   <a:srgbClr val="FF0000"/>
                 </a:solidFill>
               </a:rPr>
-              <a:t>(Include high-level visual for audience attention.)</a:t>
-            </a:r>
-            <a:endParaRPr lang="en-US" cap="none" dirty="0">
-              <a:solidFill>
-                <a:srgbClr val="FF0000"/>
-              </a:solidFill>
-            </a:endParaRPr>
-          </a:p>
-        </p:txBody>
-      </p:sp>
-      <p:pic>
-        <p:nvPicPr>
-          <p:cNvPr id="4" name="Content Placeholder 5">
-            <a:extLst>
-              <a:ext uri="{FF2B5EF4-FFF2-40B4-BE49-F238E27FC236}">
-                <a16:creationId xmlns:a16="http://schemas.microsoft.com/office/drawing/2014/main" id="{1557966F-96AA-AEA1-484C-EF32691D85B2}"/>
-              </a:ext>
-            </a:extLst>
-          </p:cNvPr>
-          <p:cNvPicPr>
-            <a:picLocks noChangeAspect="1"/>
-          </p:cNvPicPr>
-          <p:nvPr/>
-        </p:nvPicPr>
-        <p:blipFill>
-          <a:blip r:embed="rId2">
-            <a:extLst>
-              <a:ext uri="{28A0092B-C50C-407E-A947-70E740481C1C}">
-                <a14:useLocalDpi xmlns:a14="http://schemas.microsoft.com/office/drawing/2010/main" val="0"/>
-              </a:ext>
-            </a:extLst>
-          </a:blip>
-          <a:stretch>
-            <a:fillRect/>
-          </a:stretch>
-        </p:blipFill>
-        <p:spPr>
-          <a:xfrm>
-            <a:off x="6884492" y="1626583"/>
-            <a:ext cx="4821887" cy="4023360"/>
-          </a:xfrm>
-          <a:prstGeom prst="rect">
-            <a:avLst/>
-          </a:prstGeom>
-          <a:ln>
-            <a:solidFill>
-              <a:schemeClr val="tx1"/>
-            </a:solidFill>
-          </a:ln>
-        </p:spPr>
-      </p:pic>
+              <a:t>(Screen share line chart of state illness rates)</a:t>
+            </a:r>
+          </a:p>
+          <a:p>
+            <a:pPr marL="457200" lvl="1" indent="0">
+              <a:buNone/>
+            </a:pPr>
+            <a:endParaRPr lang="en-US" cap="none" dirty="0"/>
+          </a:p>
+        </p:txBody>
+      </p:sp>
     </p:spTree>
     <p:extLst>
       <p:ext uri="{BB962C8B-B14F-4D97-AF65-F5344CB8AC3E}">
@@ -8016,117 +10948,34 @@
           </a:p>
         </p:txBody>
       </p:sp>
-      <p:sp>
-        <p:nvSpPr>
-          <p:cNvPr id="3" name="Content Placeholder 2">
+      <p:graphicFrame>
+        <p:nvGraphicFramePr>
+          <p:cNvPr id="4" name="Diagram 3">
             <a:extLst>
               <a:ext uri="{FF2B5EF4-FFF2-40B4-BE49-F238E27FC236}">
-                <a16:creationId xmlns:a16="http://schemas.microsoft.com/office/drawing/2014/main" id="{F99B99BC-6593-564A-6627-E07C1249922C}"/>
+                <a16:creationId xmlns:a16="http://schemas.microsoft.com/office/drawing/2014/main" id="{77F03C7F-128D-77BF-3126-9F061EE9F5C9}"/>
               </a:ext>
             </a:extLst>
           </p:cNvPr>
-          <p:cNvSpPr>
-            <a:spLocks noGrp="1"/>
-          </p:cNvSpPr>
-          <p:nvPr>
-            <p:ph idx="1"/>
-          </p:nvPr>
-        </p:nvSpPr>
-        <p:spPr>
-          <a:xfrm>
-            <a:off x="913775" y="1470454"/>
-            <a:ext cx="10364452" cy="5183659"/>
-          </a:xfrm>
-        </p:spPr>
-        <p:txBody>
-          <a:bodyPr anchor="t">
-            <a:normAutofit/>
-          </a:bodyPr>
-          <a:lstStyle/>
-          <a:p>
-            <a:pPr>
-              <a:buFont typeface="Wingdings" panose="05000000000000000000" pitchFamily="2" charset="2"/>
-              <a:buChar char="§"/>
-            </a:pPr>
-            <a:r>
-              <a:rPr lang="en-US" dirty="0"/>
-              <a:t>Methods:</a:t>
-            </a:r>
-          </a:p>
-          <a:p>
-            <a:pPr lvl="1">
-              <a:buFont typeface="Wingdings" panose="05000000000000000000" pitchFamily="2" charset="2"/>
-              <a:buChar char="§"/>
-            </a:pPr>
-            <a:r>
-              <a:rPr lang="en-US" dirty="0"/>
-              <a:t>Scrape web tables to Pandas DataFrames</a:t>
-            </a:r>
-          </a:p>
-          <a:p>
-            <a:pPr lvl="1">
-              <a:buFont typeface="Wingdings" panose="05000000000000000000" pitchFamily="2" charset="2"/>
-              <a:buChar char="§"/>
-            </a:pPr>
-            <a:r>
-              <a:rPr lang="en-US" dirty="0"/>
-              <a:t>Use regex and .replace to clean column data</a:t>
-            </a:r>
-          </a:p>
-          <a:p>
-            <a:pPr lvl="1">
-              <a:buFont typeface="Wingdings" panose="05000000000000000000" pitchFamily="2" charset="2"/>
-              <a:buChar char="§"/>
-            </a:pPr>
-            <a:r>
-              <a:rPr lang="en-US" dirty="0"/>
-              <a:t>.loc and .</a:t>
-            </a:r>
-            <a:r>
-              <a:rPr lang="en-US" dirty="0" err="1"/>
-              <a:t>iloc</a:t>
-            </a:r>
-            <a:r>
-              <a:rPr lang="en-US" dirty="0"/>
-              <a:t> to append state and county columns</a:t>
-            </a:r>
-          </a:p>
-          <a:p>
-            <a:pPr lvl="1">
-              <a:buFont typeface="Wingdings" panose="05000000000000000000" pitchFamily="2" charset="2"/>
-              <a:buChar char="§"/>
-            </a:pPr>
-            <a:r>
-              <a:rPr lang="en-US" dirty="0">
-                <a:solidFill>
-                  <a:srgbClr val="FF0000"/>
-                </a:solidFill>
-              </a:rPr>
-              <a:t>…</a:t>
-            </a:r>
-          </a:p>
-          <a:p>
-            <a:pPr lvl="1">
-              <a:buFont typeface="Wingdings" panose="05000000000000000000" pitchFamily="2" charset="2"/>
-              <a:buChar char="§"/>
-            </a:pPr>
-            <a:r>
-              <a:rPr lang="en-US" dirty="0">
-                <a:solidFill>
-                  <a:srgbClr val="FF0000"/>
-                </a:solidFill>
-              </a:rPr>
-              <a:t>Remap data tables to horizontal year format</a:t>
-            </a:r>
-          </a:p>
-          <a:p>
-            <a:pPr marL="0" indent="0">
-              <a:buNone/>
-            </a:pPr>
-            <a:endParaRPr lang="en-US" dirty="0"/>
-          </a:p>
-        </p:txBody>
-      </p:sp>
+          <p:cNvGraphicFramePr/>
+          <p:nvPr>
+            <p:extLst>
+              <p:ext uri="{D42A27DB-BD31-4B8C-83A1-F6EECF244321}">
+                <p14:modId xmlns:p14="http://schemas.microsoft.com/office/powerpoint/2010/main" val="1511789436"/>
+              </p:ext>
+            </p:extLst>
+          </p:nvPr>
+        </p:nvGraphicFramePr>
+        <p:xfrm>
+          <a:off x="0" y="0"/>
+          <a:ext cx="12192000" cy="6857999"/>
+        </p:xfrm>
+        <a:graphic>
+          <a:graphicData uri="http://schemas.openxmlformats.org/drawingml/2006/diagram">
+            <dgm:relIds xmlns:dgm="http://schemas.openxmlformats.org/drawingml/2006/diagram" xmlns:r="http://schemas.openxmlformats.org/officeDocument/2006/relationships" r:dm="rId3" r:lo="rId4" r:qs="rId5" r:cs="rId6"/>
+          </a:graphicData>
+        </a:graphic>
+      </p:graphicFrame>
     </p:spTree>
     <p:extLst>
       <p:ext uri="{BB962C8B-B14F-4D97-AF65-F5344CB8AC3E}">
@@ -8208,12 +11057,14 @@
         </p:nvSpPr>
         <p:spPr>
           <a:xfrm>
-            <a:off x="913775" y="1495169"/>
-            <a:ext cx="10364452" cy="4296032"/>
+            <a:off x="913775" y="1495168"/>
+            <a:ext cx="10364452" cy="5084051"/>
           </a:xfrm>
         </p:spPr>
         <p:txBody>
-          <a:bodyPr anchor="t"/>
+          <a:bodyPr anchor="t">
+            <a:normAutofit/>
+          </a:bodyPr>
           <a:lstStyle/>
           <a:p>
             <a:pPr marL="457200" indent="-457200">
@@ -8271,6 +11122,10 @@
           </a:p>
           <a:p>
             <a:pPr lvl="1"/>
+            <a:endParaRPr lang="en-US" dirty="0"/>
+          </a:p>
+          <a:p>
+            <a:pPr lvl="1"/>
             <a:r>
               <a:rPr lang="en-US" dirty="0"/>
               <a:t>Output reflected tables in dictionary format for consuming the API with JavaScript</a:t>
@@ -8278,36 +11133,148 @@
           </a:p>
         </p:txBody>
       </p:sp>
-      <p:pic>
-        <p:nvPicPr>
-          <p:cNvPr id="5" name="Picture 4">
+      <p:grpSp>
+        <p:nvGrpSpPr>
+          <p:cNvPr id="8" name="Group 7">
             <a:extLst>
               <a:ext uri="{FF2B5EF4-FFF2-40B4-BE49-F238E27FC236}">
-                <a16:creationId xmlns:a16="http://schemas.microsoft.com/office/drawing/2014/main" id="{C5041C4E-CDF3-51EB-37CB-4F9A1D4B90AD}"/>
+                <a16:creationId xmlns:a16="http://schemas.microsoft.com/office/drawing/2014/main" id="{49449163-6F0F-E011-9A52-0B82B4647724}"/>
               </a:ext>
             </a:extLst>
           </p:cNvPr>
-          <p:cNvPicPr>
-            <a:picLocks noChangeAspect="1"/>
-          </p:cNvPicPr>
+          <p:cNvGrpSpPr/>
           <p:nvPr/>
-        </p:nvPicPr>
-        <p:blipFill>
-          <a:blip r:embed="rId2"/>
-          <a:stretch>
-            <a:fillRect/>
-          </a:stretch>
-        </p:blipFill>
-        <p:spPr>
+        </p:nvGrpSpPr>
+        <p:grpSpPr>
           <a:xfrm>
-            <a:off x="2062042" y="3429000"/>
-            <a:ext cx="3984531" cy="1596177"/>
+            <a:off x="762115" y="3703682"/>
+            <a:ext cx="9934517" cy="1659150"/>
+            <a:chOff x="784417" y="3429000"/>
+            <a:chExt cx="9934517" cy="1659150"/>
           </a:xfrm>
-          <a:prstGeom prst="rect">
-            <a:avLst/>
-          </a:prstGeom>
-        </p:spPr>
-      </p:pic>
+        </p:grpSpPr>
+        <p:pic>
+          <p:nvPicPr>
+            <p:cNvPr id="5" name="Picture 4">
+              <a:extLst>
+                <a:ext uri="{FF2B5EF4-FFF2-40B4-BE49-F238E27FC236}">
+                  <a16:creationId xmlns:a16="http://schemas.microsoft.com/office/drawing/2014/main" id="{C5041C4E-CDF3-51EB-37CB-4F9A1D4B90AD}"/>
+                </a:ext>
+              </a:extLst>
+            </p:cNvPr>
+            <p:cNvPicPr>
+              <a:picLocks noChangeAspect="1"/>
+            </p:cNvPicPr>
+            <p:nvPr/>
+          </p:nvPicPr>
+          <p:blipFill>
+            <a:blip r:embed="rId2"/>
+            <a:stretch>
+              <a:fillRect/>
+            </a:stretch>
+          </p:blipFill>
+          <p:spPr>
+            <a:xfrm>
+              <a:off x="6734403" y="3460487"/>
+              <a:ext cx="3984531" cy="1596177"/>
+            </a:xfrm>
+            <a:prstGeom prst="rect">
+              <a:avLst/>
+            </a:prstGeom>
+            <a:ln>
+              <a:solidFill>
+                <a:schemeClr val="tx1"/>
+              </a:solidFill>
+            </a:ln>
+          </p:spPr>
+        </p:pic>
+        <p:pic>
+          <p:nvPicPr>
+            <p:cNvPr id="6" name="Picture 5">
+              <a:extLst>
+                <a:ext uri="{FF2B5EF4-FFF2-40B4-BE49-F238E27FC236}">
+                  <a16:creationId xmlns:a16="http://schemas.microsoft.com/office/drawing/2014/main" id="{D32E0AC6-1652-1D83-5699-185354164849}"/>
+                </a:ext>
+              </a:extLst>
+            </p:cNvPr>
+            <p:cNvPicPr>
+              <a:picLocks noChangeAspect="1"/>
+            </p:cNvPicPr>
+            <p:nvPr/>
+          </p:nvPicPr>
+          <p:blipFill>
+            <a:blip r:embed="rId3"/>
+            <a:stretch>
+              <a:fillRect/>
+            </a:stretch>
+          </p:blipFill>
+          <p:spPr>
+            <a:xfrm>
+              <a:off x="784417" y="3429000"/>
+              <a:ext cx="4024560" cy="1659150"/>
+            </a:xfrm>
+            <a:prstGeom prst="rect">
+              <a:avLst/>
+            </a:prstGeom>
+            <a:ln>
+              <a:solidFill>
+                <a:schemeClr val="tx1"/>
+              </a:solidFill>
+            </a:ln>
+          </p:spPr>
+        </p:pic>
+        <p:sp>
+          <p:nvSpPr>
+            <p:cNvPr id="7" name="Arrow: Right 6">
+              <a:extLst>
+                <a:ext uri="{FF2B5EF4-FFF2-40B4-BE49-F238E27FC236}">
+                  <a16:creationId xmlns:a16="http://schemas.microsoft.com/office/drawing/2014/main" id="{8FC11500-C053-777D-8999-3F01F500C3AB}"/>
+                </a:ext>
+              </a:extLst>
+            </p:cNvPr>
+            <p:cNvSpPr/>
+            <p:nvPr/>
+          </p:nvSpPr>
+          <p:spPr>
+            <a:xfrm>
+              <a:off x="5225280" y="3963067"/>
+              <a:ext cx="1092820" cy="591015"/>
+            </a:xfrm>
+            <a:prstGeom prst="rightArrow">
+              <a:avLst/>
+            </a:prstGeom>
+            <a:ln>
+              <a:solidFill>
+                <a:schemeClr val="tx1"/>
+              </a:solidFill>
+            </a:ln>
+          </p:spPr>
+          <p:style>
+            <a:lnRef idx="2">
+              <a:schemeClr val="accent1">
+                <a:shade val="15000"/>
+              </a:schemeClr>
+            </a:lnRef>
+            <a:fillRef idx="1">
+              <a:schemeClr val="accent1"/>
+            </a:fillRef>
+            <a:effectRef idx="0">
+              <a:schemeClr val="accent1"/>
+            </a:effectRef>
+            <a:fontRef idx="minor">
+              <a:schemeClr val="lt1"/>
+            </a:fontRef>
+          </p:style>
+          <p:txBody>
+            <a:bodyPr rtlCol="0" anchor="ctr"/>
+            <a:lstStyle/>
+            <a:p>
+              <a:pPr algn="ctr"/>
+              <a:endParaRPr lang="en-US"/>
+            </a:p>
+          </p:txBody>
+        </p:sp>
+      </p:grpSp>
     </p:spTree>
     <p:extLst>
       <p:ext uri="{BB962C8B-B14F-4D97-AF65-F5344CB8AC3E}">
@@ -8363,7 +11330,7 @@
           <a:p>
             <a:r>
               <a:rPr lang="en-US" sz="4000" cap="none" dirty="0"/>
-              <a:t>Show Project Visuals here</a:t>
+              <a:t>JavaScript Visuals</a:t>
             </a:r>
           </a:p>
         </p:txBody>
@@ -8398,7 +11365,7 @@
                   <a:srgbClr val="FF0000"/>
                 </a:solidFill>
               </a:rPr>
-              <a:t>(Run the .html in Live server)</a:t>
+              <a:t>(Run the .html in Live server for JS visuals)</a:t>
             </a:r>
           </a:p>
         </p:txBody>
@@ -8417,178 +11384,6 @@
 </file>
 
 <file path=ppt/slides/slide8.xml><?xml version="1.0" encoding="utf-8"?>
-<p:sld xmlns:a="http://schemas.openxmlformats.org/drawingml/2006/main" xmlns:r="http://schemas.openxmlformats.org/officeDocument/2006/relationships" xmlns:p="http://schemas.openxmlformats.org/presentationml/2006/main">
-  <p:cSld>
-    <p:spTree>
-      <p:nvGrpSpPr>
-        <p:cNvPr id="1" name=""/>
-        <p:cNvGrpSpPr/>
-        <p:nvPr/>
-      </p:nvGrpSpPr>
-      <p:grpSpPr>
-        <a:xfrm>
-          <a:off x="0" y="0"/>
-          <a:ext cx="0" cy="0"/>
-          <a:chOff x="0" y="0"/>
-          <a:chExt cx="0" cy="0"/>
-        </a:xfrm>
-      </p:grpSpPr>
-      <p:sp>
-        <p:nvSpPr>
-          <p:cNvPr id="3" name="Title 1">
-            <a:extLst>
-              <a:ext uri="{FF2B5EF4-FFF2-40B4-BE49-F238E27FC236}">
-                <a16:creationId xmlns:a16="http://schemas.microsoft.com/office/drawing/2014/main" id="{7BDCAE3D-4443-CCA7-3CA9-BE1DFA8640F8}"/>
-              </a:ext>
-            </a:extLst>
-          </p:cNvPr>
-          <p:cNvSpPr txBox="1">
-            <a:spLocks/>
-          </p:cNvSpPr>
-          <p:nvPr/>
-        </p:nvSpPr>
-        <p:spPr>
-          <a:xfrm>
-            <a:off x="710512" y="1083154"/>
-            <a:ext cx="6405063" cy="829558"/>
-          </a:xfrm>
-          <a:prstGeom prst="rect">
-            <a:avLst/>
-          </a:prstGeom>
-        </p:spPr>
-        <p:txBody>
-          <a:bodyPr vert="horz" lIns="91440" tIns="45720" rIns="91440" bIns="45720" rtlCol="0" anchor="b">
-            <a:normAutofit/>
-          </a:bodyPr>
-          <a:lstStyle>
-            <a:lvl1pPr algn="l" defTabSz="914400" rtl="0" eaLnBrk="1" latinLnBrk="0" hangingPunct="1">
-              <a:lnSpc>
-                <a:spcPct val="85000"/>
-              </a:lnSpc>
-              <a:spcBef>
-                <a:spcPct val="0"/>
-              </a:spcBef>
-              <a:buNone/>
-              <a:defRPr sz="4800" kern="1200" spc="-50" baseline="0">
-                <a:solidFill>
-                  <a:schemeClr val="tx1">
-                    <a:lumMod val="75000"/>
-                    <a:lumOff val="25000"/>
-                  </a:schemeClr>
-                </a:solidFill>
-                <a:latin typeface="+mj-lt"/>
-                <a:ea typeface="+mj-ea"/>
-                <a:cs typeface="+mj-cs"/>
-              </a:defRPr>
-            </a:lvl1pPr>
-          </a:lstStyle>
-          <a:p>
-            <a:pPr>
-              <a:spcAft>
-                <a:spcPts val="600"/>
-              </a:spcAft>
-            </a:pPr>
-            <a:r>
-              <a:rPr lang="en-US" dirty="0">
-                <a:solidFill>
-                  <a:srgbClr val="FF0000"/>
-                </a:solidFill>
-              </a:rPr>
-              <a:t>(Other analysis?)</a:t>
-            </a:r>
-          </a:p>
-        </p:txBody>
-      </p:sp>
-      <p:sp>
-        <p:nvSpPr>
-          <p:cNvPr id="2" name="TextBox 1">
-            <a:extLst>
-              <a:ext uri="{FF2B5EF4-FFF2-40B4-BE49-F238E27FC236}">
-                <a16:creationId xmlns:a16="http://schemas.microsoft.com/office/drawing/2014/main" id="{E3DCFDCF-7E8F-94A9-88D5-8EF1F657162B}"/>
-              </a:ext>
-            </a:extLst>
-          </p:cNvPr>
-          <p:cNvSpPr txBox="1"/>
-          <p:nvPr/>
-        </p:nvSpPr>
-        <p:spPr>
-          <a:xfrm>
-            <a:off x="710512" y="2025923"/>
-            <a:ext cx="6405063" cy="3670180"/>
-          </a:xfrm>
-          <a:prstGeom prst="rect">
-            <a:avLst/>
-          </a:prstGeom>
-        </p:spPr>
-        <p:txBody>
-          <a:bodyPr vert="horz" lIns="0" tIns="45720" rIns="0" bIns="45720" rtlCol="0">
-            <a:normAutofit/>
-          </a:bodyPr>
-          <a:lstStyle/>
-          <a:p>
-            <a:pPr marL="285750" indent="-285750" defTabSz="914400">
-              <a:lnSpc>
-                <a:spcPct val="90000"/>
-              </a:lnSpc>
-              <a:spcBef>
-                <a:spcPts val="1200"/>
-              </a:spcBef>
-              <a:spcAft>
-                <a:spcPts val="200"/>
-              </a:spcAft>
-              <a:buSzPct val="100000"/>
-              <a:buFont typeface="Arial" panose="020B0604020202020204" pitchFamily="34" charset="0"/>
-              <a:buChar char="•"/>
-            </a:pPr>
-            <a:r>
-              <a:rPr lang="en-US" dirty="0">
-                <a:solidFill>
-                  <a:srgbClr val="FF0000"/>
-                </a:solidFill>
-              </a:rPr>
-              <a:t>Describe any additional analysis performed here</a:t>
-            </a:r>
-          </a:p>
-          <a:p>
-            <a:pPr marL="285750" indent="-285750" defTabSz="914400">
-              <a:lnSpc>
-                <a:spcPct val="90000"/>
-              </a:lnSpc>
-              <a:spcBef>
-                <a:spcPts val="1200"/>
-              </a:spcBef>
-              <a:spcAft>
-                <a:spcPts val="200"/>
-              </a:spcAft>
-              <a:buSzPct val="100000"/>
-              <a:buFont typeface="Arial" panose="020B0604020202020204" pitchFamily="34" charset="0"/>
-              <a:buChar char="•"/>
-            </a:pPr>
-            <a:r>
-              <a:rPr lang="en-US" dirty="0">
-                <a:solidFill>
-                  <a:srgbClr val="FF0000"/>
-                </a:solidFill>
-              </a:rPr>
-              <a:t>Include visual graph/correlation/table on the right side of the slide </a:t>
-            </a:r>
-          </a:p>
-        </p:txBody>
-      </p:sp>
-    </p:spTree>
-    <p:extLst>
-      <p:ext uri="{BB962C8B-B14F-4D97-AF65-F5344CB8AC3E}">
-        <p14:creationId xmlns:p14="http://schemas.microsoft.com/office/powerpoint/2010/main" val="2582230407"/>
-      </p:ext>
-    </p:extLst>
-  </p:cSld>
-  <p:clrMapOvr>
-    <a:masterClrMapping/>
-  </p:clrMapOvr>
-</p:sld>
-</file>
-
-<file path=ppt/slides/slide9.xml><?xml version="1.0" encoding="utf-8"?>
 <p:sld xmlns:a="http://schemas.openxmlformats.org/drawingml/2006/main" xmlns:r="http://schemas.openxmlformats.org/officeDocument/2006/relationships" xmlns:p="http://schemas.openxmlformats.org/presentationml/2006/main">
   <p:cSld>
     <p:spTree>
@@ -9052,6 +11847,113 @@
     <p:extLst>
       <p:ext uri="{BB962C8B-B14F-4D97-AF65-F5344CB8AC3E}">
         <p14:creationId xmlns:p14="http://schemas.microsoft.com/office/powerpoint/2010/main" val="4039070215"/>
+      </p:ext>
+    </p:extLst>
+  </p:cSld>
+  <p:clrMapOvr>
+    <a:masterClrMapping/>
+  </p:clrMapOvr>
+</p:sld>
+</file>
+
+<file path=ppt/slides/slide9.xml><?xml version="1.0" encoding="utf-8"?>
+<p:sld xmlns:a="http://schemas.openxmlformats.org/drawingml/2006/main" xmlns:r="http://schemas.openxmlformats.org/officeDocument/2006/relationships" xmlns:p="http://schemas.openxmlformats.org/presentationml/2006/main">
+  <p:cSld>
+    <p:spTree>
+      <p:nvGrpSpPr>
+        <p:cNvPr id="1" name=""/>
+        <p:cNvGrpSpPr/>
+        <p:nvPr/>
+      </p:nvGrpSpPr>
+      <p:grpSpPr>
+        <a:xfrm>
+          <a:off x="0" y="0"/>
+          <a:ext cx="0" cy="0"/>
+          <a:chOff x="0" y="0"/>
+          <a:chExt cx="0" cy="0"/>
+        </a:xfrm>
+      </p:grpSpPr>
+      <p:sp>
+        <p:nvSpPr>
+          <p:cNvPr id="2" name="Title 1">
+            <a:extLst>
+              <a:ext uri="{FF2B5EF4-FFF2-40B4-BE49-F238E27FC236}">
+                <a16:creationId xmlns:a16="http://schemas.microsoft.com/office/drawing/2014/main" id="{DDB2557C-9949-3B6C-7B73-1B10F2EB142A}"/>
+              </a:ext>
+            </a:extLst>
+          </p:cNvPr>
+          <p:cNvSpPr>
+            <a:spLocks noGrp="1"/>
+          </p:cNvSpPr>
+          <p:nvPr>
+            <p:ph type="title"/>
+          </p:nvPr>
+        </p:nvSpPr>
+        <p:spPr/>
+        <p:txBody>
+          <a:bodyPr>
+            <a:normAutofit/>
+          </a:bodyPr>
+          <a:lstStyle/>
+          <a:p>
+            <a:r>
+              <a:rPr lang="en-US" cap="none" dirty="0">
+                <a:solidFill>
+                  <a:srgbClr val="FF0000"/>
+                </a:solidFill>
+              </a:rPr>
+              <a:t>Next Steps for Analysis</a:t>
+            </a:r>
+          </a:p>
+        </p:txBody>
+      </p:sp>
+      <p:sp>
+        <p:nvSpPr>
+          <p:cNvPr id="3" name="Content Placeholder 2">
+            <a:extLst>
+              <a:ext uri="{FF2B5EF4-FFF2-40B4-BE49-F238E27FC236}">
+                <a16:creationId xmlns:a16="http://schemas.microsoft.com/office/drawing/2014/main" id="{C48AB4A4-A926-573B-950A-9061BE172B6A}"/>
+              </a:ext>
+            </a:extLst>
+          </p:cNvPr>
+          <p:cNvSpPr>
+            <a:spLocks noGrp="1"/>
+          </p:cNvSpPr>
+          <p:nvPr>
+            <p:ph idx="1"/>
+          </p:nvPr>
+        </p:nvSpPr>
+        <p:spPr>
+          <a:xfrm>
+            <a:off x="913775" y="1989439"/>
+            <a:ext cx="10364452" cy="3801762"/>
+          </a:xfrm>
+        </p:spPr>
+        <p:txBody>
+          <a:bodyPr>
+            <a:normAutofit/>
+          </a:bodyPr>
+          <a:lstStyle/>
+          <a:p>
+            <a:pPr>
+              <a:buFont typeface="Wingdings" panose="05000000000000000000" pitchFamily="2" charset="2"/>
+              <a:buChar char="§"/>
+            </a:pPr>
+            <a:r>
+              <a:rPr lang="en-US" cap="none" dirty="0">
+                <a:solidFill>
+                  <a:srgbClr val="FF0000"/>
+                </a:solidFill>
+              </a:rPr>
+              <a:t>(After reviewing data, note any potential next steps for analysis here. Assume this project was the “scoping” phase for refining the analysis.)</a:t>
+            </a:r>
+          </a:p>
+        </p:txBody>
+      </p:sp>
+    </p:spTree>
+    <p:extLst>
+      <p:ext uri="{BB962C8B-B14F-4D97-AF65-F5344CB8AC3E}">
+        <p14:creationId xmlns:p14="http://schemas.microsoft.com/office/powerpoint/2010/main" val="2792450198"/>
       </p:ext>
     </p:extLst>
   </p:cSld>

</xml_diff>

<commit_message>
ERS: Update presentation deck.
</commit_message>
<xml_diff>
--- a/Presentation.pptx
+++ b/Presentation.pptx
@@ -11135,10 +11135,10 @@
       </p:sp>
       <p:grpSp>
         <p:nvGrpSpPr>
-          <p:cNvPr id="8" name="Group 7">
+          <p:cNvPr id="10" name="Group 9">
             <a:extLst>
               <a:ext uri="{FF2B5EF4-FFF2-40B4-BE49-F238E27FC236}">
-                <a16:creationId xmlns:a16="http://schemas.microsoft.com/office/drawing/2014/main" id="{49449163-6F0F-E011-9A52-0B82B4647724}"/>
+                <a16:creationId xmlns:a16="http://schemas.microsoft.com/office/drawing/2014/main" id="{41C590EE-460D-C6DA-F61B-DB440A3E3FB3}"/>
               </a:ext>
             </a:extLst>
           </p:cNvPr>
@@ -11148,52 +11148,124 @@
         <p:grpSpPr>
           <a:xfrm>
             <a:off x="762115" y="3703682"/>
-            <a:ext cx="9934517" cy="1659150"/>
-            <a:chOff x="784417" y="3429000"/>
-            <a:chExt cx="9934517" cy="1659150"/>
+            <a:ext cx="10211419" cy="1659150"/>
+            <a:chOff x="762115" y="3703682"/>
+            <a:chExt cx="10211419" cy="1659150"/>
           </a:xfrm>
         </p:grpSpPr>
-        <p:pic>
-          <p:nvPicPr>
-            <p:cNvPr id="5" name="Picture 4">
+        <p:grpSp>
+          <p:nvGrpSpPr>
+            <p:cNvPr id="8" name="Group 7">
               <a:extLst>
                 <a:ext uri="{FF2B5EF4-FFF2-40B4-BE49-F238E27FC236}">
-                  <a16:creationId xmlns:a16="http://schemas.microsoft.com/office/drawing/2014/main" id="{C5041C4E-CDF3-51EB-37CB-4F9A1D4B90AD}"/>
+                  <a16:creationId xmlns:a16="http://schemas.microsoft.com/office/drawing/2014/main" id="{49449163-6F0F-E011-9A52-0B82B4647724}"/>
                 </a:ext>
               </a:extLst>
             </p:cNvPr>
-            <p:cNvPicPr>
-              <a:picLocks noChangeAspect="1"/>
-            </p:cNvPicPr>
+            <p:cNvGrpSpPr/>
             <p:nvPr/>
-          </p:nvPicPr>
-          <p:blipFill>
-            <a:blip r:embed="rId2"/>
-            <a:stretch>
-              <a:fillRect/>
-            </a:stretch>
-          </p:blipFill>
-          <p:spPr>
+          </p:nvGrpSpPr>
+          <p:grpSpPr>
             <a:xfrm>
-              <a:off x="6734403" y="3460487"/>
-              <a:ext cx="3984531" cy="1596177"/>
+              <a:off x="762115" y="3703682"/>
+              <a:ext cx="5533683" cy="1659150"/>
+              <a:chOff x="784417" y="3429000"/>
+              <a:chExt cx="5533683" cy="1659150"/>
             </a:xfrm>
-            <a:prstGeom prst="rect">
-              <a:avLst/>
-            </a:prstGeom>
-            <a:ln>
-              <a:solidFill>
-                <a:schemeClr val="tx1"/>
-              </a:solidFill>
-            </a:ln>
-          </p:spPr>
-        </p:pic>
+          </p:grpSpPr>
+          <p:pic>
+            <p:nvPicPr>
+              <p:cNvPr id="6" name="Picture 5">
+                <a:extLst>
+                  <a:ext uri="{FF2B5EF4-FFF2-40B4-BE49-F238E27FC236}">
+                    <a16:creationId xmlns:a16="http://schemas.microsoft.com/office/drawing/2014/main" id="{D32E0AC6-1652-1D83-5699-185354164849}"/>
+                  </a:ext>
+                </a:extLst>
+              </p:cNvPr>
+              <p:cNvPicPr>
+                <a:picLocks noChangeAspect="1"/>
+              </p:cNvPicPr>
+              <p:nvPr/>
+            </p:nvPicPr>
+            <p:blipFill>
+              <a:blip r:embed="rId2"/>
+              <a:stretch>
+                <a:fillRect/>
+              </a:stretch>
+            </p:blipFill>
+            <p:spPr>
+              <a:xfrm>
+                <a:off x="784417" y="3429000"/>
+                <a:ext cx="4024560" cy="1659150"/>
+              </a:xfrm>
+              <a:prstGeom prst="rect">
+                <a:avLst/>
+              </a:prstGeom>
+              <a:ln>
+                <a:solidFill>
+                  <a:schemeClr val="tx1"/>
+                </a:solidFill>
+              </a:ln>
+            </p:spPr>
+          </p:pic>
+          <p:sp>
+            <p:nvSpPr>
+              <p:cNvPr id="7" name="Arrow: Right 6">
+                <a:extLst>
+                  <a:ext uri="{FF2B5EF4-FFF2-40B4-BE49-F238E27FC236}">
+                    <a16:creationId xmlns:a16="http://schemas.microsoft.com/office/drawing/2014/main" id="{8FC11500-C053-777D-8999-3F01F500C3AB}"/>
+                  </a:ext>
+                </a:extLst>
+              </p:cNvPr>
+              <p:cNvSpPr/>
+              <p:nvPr/>
+            </p:nvSpPr>
+            <p:spPr>
+              <a:xfrm>
+                <a:off x="5225280" y="3963067"/>
+                <a:ext cx="1092820" cy="591015"/>
+              </a:xfrm>
+              <a:prstGeom prst="rightArrow">
+                <a:avLst/>
+              </a:prstGeom>
+              <a:ln>
+                <a:solidFill>
+                  <a:schemeClr val="tx1"/>
+                </a:solidFill>
+              </a:ln>
+            </p:spPr>
+            <p:style>
+              <a:lnRef idx="2">
+                <a:schemeClr val="accent1">
+                  <a:shade val="15000"/>
+                </a:schemeClr>
+              </a:lnRef>
+              <a:fillRef idx="1">
+                <a:schemeClr val="accent1"/>
+              </a:fillRef>
+              <a:effectRef idx="0">
+                <a:schemeClr val="accent1"/>
+              </a:effectRef>
+              <a:fontRef idx="minor">
+                <a:schemeClr val="lt1"/>
+              </a:fontRef>
+            </p:style>
+            <p:txBody>
+              <a:bodyPr rtlCol="0" anchor="ctr"/>
+              <a:lstStyle/>
+              <a:p>
+                <a:pPr algn="ctr"/>
+                <a:endParaRPr lang="en-US"/>
+              </a:p>
+            </p:txBody>
+          </p:sp>
+        </p:grpSp>
         <p:pic>
           <p:nvPicPr>
-            <p:cNvPr id="6" name="Picture 5">
+            <p:cNvPr id="9" name="Picture 8">
               <a:extLst>
                 <a:ext uri="{FF2B5EF4-FFF2-40B4-BE49-F238E27FC236}">
-                  <a16:creationId xmlns:a16="http://schemas.microsoft.com/office/drawing/2014/main" id="{D32E0AC6-1652-1D83-5699-185354164849}"/>
+                  <a16:creationId xmlns:a16="http://schemas.microsoft.com/office/drawing/2014/main" id="{9E126045-EC2F-003F-FA18-2710BB325648}"/>
                 </a:ext>
               </a:extLst>
             </p:cNvPr>
@@ -11210,70 +11282,14 @@
           </p:blipFill>
           <p:spPr>
             <a:xfrm>
-              <a:off x="784417" y="3429000"/>
-              <a:ext cx="4024560" cy="1659150"/>
+              <a:off x="6637351" y="3703682"/>
+              <a:ext cx="4336183" cy="1659150"/>
             </a:xfrm>
             <a:prstGeom prst="rect">
               <a:avLst/>
             </a:prstGeom>
-            <a:ln>
-              <a:solidFill>
-                <a:schemeClr val="tx1"/>
-              </a:solidFill>
-            </a:ln>
           </p:spPr>
         </p:pic>
-        <p:sp>
-          <p:nvSpPr>
-            <p:cNvPr id="7" name="Arrow: Right 6">
-              <a:extLst>
-                <a:ext uri="{FF2B5EF4-FFF2-40B4-BE49-F238E27FC236}">
-                  <a16:creationId xmlns:a16="http://schemas.microsoft.com/office/drawing/2014/main" id="{8FC11500-C053-777D-8999-3F01F500C3AB}"/>
-                </a:ext>
-              </a:extLst>
-            </p:cNvPr>
-            <p:cNvSpPr/>
-            <p:nvPr/>
-          </p:nvSpPr>
-          <p:spPr>
-            <a:xfrm>
-              <a:off x="5225280" y="3963067"/>
-              <a:ext cx="1092820" cy="591015"/>
-            </a:xfrm>
-            <a:prstGeom prst="rightArrow">
-              <a:avLst/>
-            </a:prstGeom>
-            <a:ln>
-              <a:solidFill>
-                <a:schemeClr val="tx1"/>
-              </a:solidFill>
-            </a:ln>
-          </p:spPr>
-          <p:style>
-            <a:lnRef idx="2">
-              <a:schemeClr val="accent1">
-                <a:shade val="15000"/>
-              </a:schemeClr>
-            </a:lnRef>
-            <a:fillRef idx="1">
-              <a:schemeClr val="accent1"/>
-            </a:fillRef>
-            <a:effectRef idx="0">
-              <a:schemeClr val="accent1"/>
-            </a:effectRef>
-            <a:fontRef idx="minor">
-              <a:schemeClr val="lt1"/>
-            </a:fontRef>
-          </p:style>
-          <p:txBody>
-            <a:bodyPr rtlCol="0" anchor="ctr"/>
-            <a:lstStyle/>
-            <a:p>
-              <a:pPr algn="ctr"/>
-              <a:endParaRPr lang="en-US"/>
-            </a:p>
-          </p:txBody>
-        </p:sp>
       </p:grpSp>
     </p:spTree>
     <p:extLst>

</xml_diff>

<commit_message>
TRS edits to presentation
</commit_message>
<xml_diff>
--- a/Presentation.pptx
+++ b/Presentation.pptx
@@ -3634,6 +3634,90 @@
 </p:notes>
 </file>
 
+<file path=ppt/notesSlides/notesSlide3.xml><?xml version="1.0" encoding="utf-8"?>
+<p:notes xmlns:a="http://schemas.openxmlformats.org/drawingml/2006/main" xmlns:r="http://schemas.openxmlformats.org/officeDocument/2006/relationships" xmlns:p="http://schemas.openxmlformats.org/presentationml/2006/main">
+  <p:cSld>
+    <p:spTree>
+      <p:nvGrpSpPr>
+        <p:cNvPr id="1" name=""/>
+        <p:cNvGrpSpPr/>
+        <p:nvPr/>
+      </p:nvGrpSpPr>
+      <p:grpSpPr>
+        <a:xfrm>
+          <a:off x="0" y="0"/>
+          <a:ext cx="0" cy="0"/>
+          <a:chOff x="0" y="0"/>
+          <a:chExt cx="0" cy="0"/>
+        </a:xfrm>
+      </p:grpSpPr>
+      <p:sp>
+        <p:nvSpPr>
+          <p:cNvPr id="2" name="Slide Image Placeholder 1"/>
+          <p:cNvSpPr>
+            <a:spLocks noGrp="1" noRot="1" noChangeAspect="1"/>
+          </p:cNvSpPr>
+          <p:nvPr>
+            <p:ph type="sldImg"/>
+          </p:nvPr>
+        </p:nvSpPr>
+        <p:spPr/>
+      </p:sp>
+      <p:sp>
+        <p:nvSpPr>
+          <p:cNvPr id="3" name="Notes Placeholder 2"/>
+          <p:cNvSpPr>
+            <a:spLocks noGrp="1"/>
+          </p:cNvSpPr>
+          <p:nvPr>
+            <p:ph type="body" idx="1"/>
+          </p:nvPr>
+        </p:nvSpPr>
+        <p:spPr/>
+        <p:txBody>
+          <a:bodyPr/>
+          <a:lstStyle/>
+          <a:p>
+            <a:endParaRPr lang="en-US" dirty="0"/>
+          </a:p>
+        </p:txBody>
+      </p:sp>
+      <p:sp>
+        <p:nvSpPr>
+          <p:cNvPr id="4" name="Slide Number Placeholder 3"/>
+          <p:cNvSpPr>
+            <a:spLocks noGrp="1"/>
+          </p:cNvSpPr>
+          <p:nvPr>
+            <p:ph type="sldNum" sz="quarter" idx="5"/>
+          </p:nvPr>
+        </p:nvSpPr>
+        <p:spPr/>
+        <p:txBody>
+          <a:bodyPr/>
+          <a:lstStyle/>
+          <a:p>
+            <a:fld id="{34523330-130C-4A11-8249-F3612B4CD402}" type="slidenum">
+              <a:rPr lang="en-US" smtClean="0"/>
+              <a:t>9</a:t>
+            </a:fld>
+            <a:endParaRPr lang="en-US"/>
+          </a:p>
+        </p:txBody>
+      </p:sp>
+    </p:spTree>
+    <p:extLst>
+      <p:ext uri="{BB962C8B-B14F-4D97-AF65-F5344CB8AC3E}">
+        <p14:creationId xmlns:p14="http://schemas.microsoft.com/office/powerpoint/2010/main" val="810619267"/>
+      </p:ext>
+    </p:extLst>
+  </p:cSld>
+  <p:clrMapOvr>
+    <a:masterClrMapping/>
+  </p:clrMapOvr>
+</p:notes>
+</file>
+
 <file path=ppt/slideLayouts/slideLayout1.xml><?xml version="1.0" encoding="utf-8"?>
 <p:sldLayout xmlns:a="http://schemas.openxmlformats.org/drawingml/2006/main" xmlns:r="http://schemas.openxmlformats.org/officeDocument/2006/relationships" xmlns:p="http://schemas.openxmlformats.org/presentationml/2006/main" type="title" preserve="1">
   <p:cSld name="Title Slide">
@@ -11441,7 +11525,7 @@
           <a:p>
             <a:r>
               <a:rPr lang="en-US" dirty="0"/>
-              <a:t>Conclusions/Further Directions</a:t>
+              <a:t>Results and Preliminary Conclusions</a:t>
             </a:r>
           </a:p>
         </p:txBody>
@@ -11465,38 +11549,301 @@
         <p:spPr>
           <a:xfrm>
             <a:off x="913775" y="2367093"/>
-            <a:ext cx="5182225" cy="3424107"/>
+            <a:ext cx="10364451" cy="3424107"/>
           </a:xfrm>
         </p:spPr>
         <p:txBody>
           <a:bodyPr>
-            <a:normAutofit fontScale="92500" lnSpcReduction="20000"/>
+            <a:normAutofit fontScale="77500" lnSpcReduction="20000"/>
           </a:bodyPr>
           <a:lstStyle/>
           <a:p>
             <a:r>
+              <a:rPr lang="en-US" dirty="0"/>
+              <a:t>Lyme disease clusters in North-East and Upper Midwest</a:t>
+            </a:r>
+          </a:p>
+          <a:p>
+            <a:pPr lvl="1"/>
+            <a:r>
+              <a:rPr lang="en-US" dirty="0"/>
+              <a:t>Lyme disease was clustered in relatively cooler areas, but relatively cooler areas do not imply Lyme disease</a:t>
+            </a:r>
+          </a:p>
+          <a:p>
+            <a:pPr lvl="1"/>
+            <a:r>
+              <a:rPr lang="en-US" dirty="0"/>
+              <a:t>Similar pattern with precipitation</a:t>
+            </a:r>
+          </a:p>
+          <a:p>
+            <a:pPr lvl="1"/>
+            <a:r>
+              <a:rPr lang="en-US" dirty="0"/>
+              <a:t>Interaction effect?</a:t>
+            </a:r>
+          </a:p>
+          <a:p>
+            <a:r>
+              <a:rPr lang="en-US" dirty="0"/>
+              <a:t>West Nile virus was all over the map, literally</a:t>
+            </a:r>
+          </a:p>
+          <a:p>
+            <a:pPr lvl="1"/>
+            <a:r>
+              <a:rPr lang="en-US" dirty="0"/>
+              <a:t>Much lower infection prevalence relative to Lyme disease</a:t>
+            </a:r>
+          </a:p>
+          <a:p>
+            <a:pPr lvl="1"/>
+            <a:r>
+              <a:rPr lang="en-US" dirty="0"/>
+              <a:t>No clear qualitative pattern with climate variables</a:t>
+            </a:r>
+          </a:p>
+          <a:p>
+            <a:r>
+              <a:rPr lang="en-US" dirty="0"/>
+              <a:t>Reporting biases?</a:t>
+            </a:r>
+          </a:p>
+          <a:p>
+            <a:pPr lvl="1"/>
+            <a:r>
+              <a:rPr lang="en-US" dirty="0" err="1"/>
+              <a:t>Nonneuroinvasive</a:t>
+            </a:r>
+            <a:r>
+              <a:rPr lang="en-US" dirty="0"/>
+              <a:t> WNV v. neuroinvasive WNV</a:t>
+            </a:r>
+          </a:p>
+          <a:p>
+            <a:pPr lvl="1"/>
+            <a:r>
+              <a:rPr lang="en-US" dirty="0"/>
+              <a:t>70-80% of WNV infections are subclinical or asymptomatic per CDC</a:t>
+            </a:r>
+          </a:p>
+          <a:p>
+            <a:pPr lvl="1"/>
+            <a:r>
+              <a:rPr lang="en-US" dirty="0"/>
+              <a:t>Lyme disease data is reported by county of residence, not county of exposure</a:t>
+            </a:r>
+          </a:p>
+        </p:txBody>
+      </p:sp>
+      <p:sp>
+        <p:nvSpPr>
+          <p:cNvPr id="6" name="TextBox 5">
+            <a:extLst>
+              <a:ext uri="{FF2B5EF4-FFF2-40B4-BE49-F238E27FC236}">
+                <a16:creationId xmlns:a16="http://schemas.microsoft.com/office/drawing/2014/main" id="{55B8DCA6-8C42-002D-1E3C-A5EA17B96C4E}"/>
+              </a:ext>
+            </a:extLst>
+          </p:cNvPr>
+          <p:cNvSpPr txBox="1"/>
+          <p:nvPr/>
+        </p:nvSpPr>
+        <p:spPr>
+          <a:xfrm>
+            <a:off x="0" y="6295676"/>
+            <a:ext cx="11897032" cy="577081"/>
+          </a:xfrm>
+          <a:prstGeom prst="rect">
+            <a:avLst/>
+          </a:prstGeom>
+          <a:noFill/>
+        </p:spPr>
+        <p:txBody>
+          <a:bodyPr wrap="square">
+            <a:spAutoFit/>
+          </a:bodyPr>
+          <a:lstStyle/>
+          <a:p>
+            <a:r>
+              <a:rPr lang="en-US" sz="1050" dirty="0"/>
+              <a:t>Centers for Disease Control and Prevention. (April 25, 2023). West Nile Virus: Clinical Laboratory Evaluation. Retrieved from </a:t>
+            </a:r>
+            <a:r>
+              <a:rPr lang="en-US" sz="1050" dirty="0">
+                <a:hlinkClick r:id="rId3"/>
+              </a:rPr>
+              <a:t>https://www.cdc.gov/westnile/healthcareproviders/healthCareProviders-ClinLabEval.html</a:t>
+            </a:r>
+            <a:endParaRPr lang="en-US" sz="1050" dirty="0"/>
+          </a:p>
+          <a:p>
+            <a:r>
+              <a:rPr lang="en-US" sz="1050" dirty="0"/>
+              <a:t>Centers for Disease Control and Prevention. (November 15, 2022). Lyme Disease: Surveillance Frequently Asked Questions (FAQs). Retrieved from </a:t>
+            </a:r>
+            <a:r>
+              <a:rPr lang="en-US" sz="1050" dirty="0">
+                <a:hlinkClick r:id="rId4"/>
+              </a:rPr>
+              <a:t>https://www.cdc.gov/lyme/stats/survfaq.html</a:t>
+            </a:r>
+            <a:endParaRPr lang="en-US" sz="1050" dirty="0"/>
+          </a:p>
+          <a:p>
+            <a:r>
+              <a:rPr lang="en-US" sz="1050" dirty="0"/>
+              <a:t>Centers for Disease Control and Prevention. (April 4, 2023.). West Nile Virus: Surveillance Resources. Retrieved from </a:t>
+            </a:r>
+            <a:r>
+              <a:rPr lang="en-US" sz="1050" dirty="0">
+                <a:hlinkClick r:id="rId5"/>
+              </a:rPr>
+              <a:t>https://www.cdc.gov/westnile/resourcepages/survResources.html</a:t>
+            </a:r>
+            <a:endParaRPr lang="en-US" sz="1050" dirty="0"/>
+          </a:p>
+        </p:txBody>
+      </p:sp>
+    </p:spTree>
+    <p:extLst>
+      <p:ext uri="{BB962C8B-B14F-4D97-AF65-F5344CB8AC3E}">
+        <p14:creationId xmlns:p14="http://schemas.microsoft.com/office/powerpoint/2010/main" val="4039070215"/>
+      </p:ext>
+    </p:extLst>
+  </p:cSld>
+  <p:clrMapOvr>
+    <a:masterClrMapping/>
+  </p:clrMapOvr>
+</p:sld>
+</file>
+
+<file path=ppt/slides/slide9.xml><?xml version="1.0" encoding="utf-8"?>
+<p:sld xmlns:a="http://schemas.openxmlformats.org/drawingml/2006/main" xmlns:r="http://schemas.openxmlformats.org/officeDocument/2006/relationships" xmlns:p="http://schemas.openxmlformats.org/presentationml/2006/main">
+  <p:cSld>
+    <p:spTree>
+      <p:nvGrpSpPr>
+        <p:cNvPr id="1" name=""/>
+        <p:cNvGrpSpPr/>
+        <p:nvPr/>
+      </p:nvGrpSpPr>
+      <p:grpSpPr>
+        <a:xfrm>
+          <a:off x="0" y="0"/>
+          <a:ext cx="0" cy="0"/>
+          <a:chOff x="0" y="0"/>
+          <a:chExt cx="0" cy="0"/>
+        </a:xfrm>
+      </p:grpSpPr>
+      <p:sp>
+        <p:nvSpPr>
+          <p:cNvPr id="2" name="Title 1">
+            <a:extLst>
+              <a:ext uri="{FF2B5EF4-FFF2-40B4-BE49-F238E27FC236}">
+                <a16:creationId xmlns:a16="http://schemas.microsoft.com/office/drawing/2014/main" id="{DDB2557C-9949-3B6C-7B73-1B10F2EB142A}"/>
+              </a:ext>
+            </a:extLst>
+          </p:cNvPr>
+          <p:cNvSpPr>
+            <a:spLocks noGrp="1"/>
+          </p:cNvSpPr>
+          <p:nvPr>
+            <p:ph type="title"/>
+          </p:nvPr>
+        </p:nvSpPr>
+        <p:spPr/>
+        <p:txBody>
+          <a:bodyPr>
+            <a:normAutofit/>
+          </a:bodyPr>
+          <a:lstStyle/>
+          <a:p>
+            <a:r>
+              <a:rPr lang="en-US" cap="none" dirty="0"/>
+              <a:t>Next Steps for Visualization </a:t>
+            </a:r>
+            <a:r>
+              <a:rPr lang="en-US" dirty="0"/>
+              <a:t>&amp; </a:t>
+            </a:r>
+            <a:r>
+              <a:rPr lang="en-US" cap="none" dirty="0"/>
+              <a:t>Analysis</a:t>
+            </a:r>
+          </a:p>
+        </p:txBody>
+      </p:sp>
+      <p:sp>
+        <p:nvSpPr>
+          <p:cNvPr id="3" name="Content Placeholder 2">
+            <a:extLst>
+              <a:ext uri="{FF2B5EF4-FFF2-40B4-BE49-F238E27FC236}">
+                <a16:creationId xmlns:a16="http://schemas.microsoft.com/office/drawing/2014/main" id="{C48AB4A4-A926-573B-950A-9061BE172B6A}"/>
+              </a:ext>
+            </a:extLst>
+          </p:cNvPr>
+          <p:cNvSpPr>
+            <a:spLocks noGrp="1"/>
+          </p:cNvSpPr>
+          <p:nvPr>
+            <p:ph idx="1"/>
+          </p:nvPr>
+        </p:nvSpPr>
+        <p:spPr>
+          <a:xfrm>
+            <a:off x="6095999" y="1989439"/>
+            <a:ext cx="5182227" cy="3801762"/>
+          </a:xfrm>
+        </p:spPr>
+        <p:style>
+          <a:lnRef idx="2">
+            <a:schemeClr val="dk1"/>
+          </a:lnRef>
+          <a:fillRef idx="1">
+            <a:schemeClr val="lt1"/>
+          </a:fillRef>
+          <a:effectRef idx="0">
+            <a:schemeClr val="dk1"/>
+          </a:effectRef>
+          <a:fontRef idx="minor">
+            <a:schemeClr val="dk1"/>
+          </a:fontRef>
+        </p:style>
+        <p:txBody>
+          <a:bodyPr>
+            <a:normAutofit/>
+          </a:bodyPr>
+          <a:lstStyle/>
+          <a:p>
+            <a:r>
               <a:rPr lang="en-US" dirty="0">
                 <a:solidFill>
-                  <a:srgbClr val="FF0000"/>
+                  <a:schemeClr val="tx1"/>
                 </a:solidFill>
               </a:rPr>
-              <a:t>Lyme disease was clustered in relatively cooler areas, but relatively cooler areas does not imply </a:t>
-            </a:r>
-            <a:r>
-              <a:rPr lang="en-US" dirty="0" err="1">
+              <a:t>Visualization</a:t>
+            </a:r>
+          </a:p>
+          <a:p>
+            <a:pPr lvl="1"/>
+            <a:r>
+              <a:rPr lang="en-US" dirty="0">
                 <a:solidFill>
-                  <a:srgbClr val="FF0000"/>
+                  <a:schemeClr val="tx1"/>
                 </a:solidFill>
               </a:rPr>
-              <a:t>lyme</a:t>
-            </a:r>
+              <a:t>Slider to seamlessly visualize change across years</a:t>
+            </a:r>
+          </a:p>
+          <a:p>
+            <a:pPr lvl="1"/>
             <a:r>
               <a:rPr lang="en-US" dirty="0">
                 <a:solidFill>
-                  <a:srgbClr val="FF0000"/>
+                  <a:schemeClr val="tx1"/>
                 </a:solidFill>
               </a:rPr>
-              <a:t> disease</a:t>
+              <a:t>Choropleth map for county boundaries</a:t>
             </a:r>
           </a:p>
           <a:p>
@@ -11504,77 +11851,20 @@
             <a:r>
               <a:rPr lang="en-US" dirty="0">
                 <a:solidFill>
-                  <a:srgbClr val="FF0000"/>
+                  <a:schemeClr val="tx1"/>
                 </a:solidFill>
               </a:rPr>
-              <a:t>Clusters in </a:t>
-            </a:r>
-            <a:r>
-              <a:rPr lang="en-US" dirty="0" err="1">
-                <a:solidFill>
-                  <a:srgbClr val="FF0000"/>
-                </a:solidFill>
-              </a:rPr>
-              <a:t>NorthEast</a:t>
-            </a:r>
-            <a:r>
-              <a:rPr lang="en-US" dirty="0">
-                <a:solidFill>
-                  <a:srgbClr val="FF0000"/>
-                </a:solidFill>
-              </a:rPr>
-              <a:t> and Upper Midwest</a:t>
-            </a:r>
-          </a:p>
-          <a:p>
-            <a:r>
-              <a:rPr lang="en-US" dirty="0">
-                <a:solidFill>
-                  <a:srgbClr val="FF0000"/>
-                </a:solidFill>
-              </a:rPr>
-              <a:t>West Nile virus was all over the map, literally</a:t>
-            </a:r>
-          </a:p>
-          <a:p>
-            <a:r>
-              <a:rPr lang="en-US" dirty="0">
-                <a:solidFill>
-                  <a:srgbClr val="FF0000"/>
-                </a:solidFill>
-              </a:rPr>
-              <a:t>Any statistical correlation?</a:t>
-            </a:r>
-          </a:p>
-          <a:p>
-            <a:r>
-              <a:rPr lang="en-US" dirty="0">
-                <a:solidFill>
-                  <a:srgbClr val="FF0000"/>
-                </a:solidFill>
-              </a:rPr>
-              <a:t>Did we find that population density was ultimately the greatest contributing factor?</a:t>
-            </a:r>
-          </a:p>
-          <a:p>
-            <a:pPr lvl="1"/>
-            <a:r>
-              <a:rPr lang="en-US" dirty="0">
-                <a:solidFill>
-                  <a:srgbClr val="FF0000"/>
-                </a:solidFill>
-              </a:rPr>
-              <a:t>Thoughts on inconsistencies in case reporting per county?</a:t>
-            </a:r>
-          </a:p>
-        </p:txBody>
-      </p:sp>
-      <p:sp>
-        <p:nvSpPr>
-          <p:cNvPr id="5" name="Content Placeholder 2">
+              <a:t>Regression plots to quantitatively </a:t>
+            </a:r>
+          </a:p>
+        </p:txBody>
+      </p:sp>
+      <p:sp>
+        <p:nvSpPr>
+          <p:cNvPr id="4" name="Content Placeholder 2">
             <a:extLst>
               <a:ext uri="{FF2B5EF4-FFF2-40B4-BE49-F238E27FC236}">
-                <a16:creationId xmlns:a16="http://schemas.microsoft.com/office/drawing/2014/main" id="{369419D4-C8DD-68C7-26D3-3D370B331F09}"/>
+                <a16:creationId xmlns:a16="http://schemas.microsoft.com/office/drawing/2014/main" id="{AC39EC2C-1F18-4F9F-2C7E-2EBE163DB944}"/>
               </a:ext>
             </a:extLst>
           </p:cNvPr>
@@ -11585,16 +11875,30 @@
         </p:nvSpPr>
         <p:spPr>
           <a:xfrm>
-            <a:off x="6096000" y="2367092"/>
-            <a:ext cx="5182225" cy="3424107"/>
+            <a:off x="913772" y="1989439"/>
+            <a:ext cx="5182227" cy="3801762"/>
           </a:xfrm>
           <a:prstGeom prst="rect">
             <a:avLst/>
           </a:prstGeom>
         </p:spPr>
+        <p:style>
+          <a:lnRef idx="2">
+            <a:schemeClr val="dk1"/>
+          </a:lnRef>
+          <a:fillRef idx="1">
+            <a:schemeClr val="lt1"/>
+          </a:fillRef>
+          <a:effectRef idx="0">
+            <a:schemeClr val="dk1"/>
+          </a:effectRef>
+          <a:fontRef idx="minor">
+            <a:schemeClr val="dk1"/>
+          </a:fontRef>
+        </p:style>
         <p:txBody>
           <a:bodyPr vert="horz" lIns="91440" tIns="45720" rIns="91440" bIns="45720" rtlCol="0" anchor="ctr">
-            <a:normAutofit/>
+            <a:normAutofit fontScale="85000" lnSpcReduction="20000"/>
           </a:bodyPr>
           <a:lstStyle>
             <a:lvl1pPr marL="228600" indent="-228600" algn="l" defTabSz="914400" rtl="0" eaLnBrk="1" latinLnBrk="0" hangingPunct="1">
@@ -11798,170 +12102,77 @@
           </a:lstStyle>
           <a:p>
             <a:r>
-              <a:rPr lang="en-US" dirty="0">
-                <a:solidFill>
-                  <a:srgbClr val="FF0000"/>
-                </a:solidFill>
-              </a:rPr>
+              <a:rPr lang="en-US" dirty="0"/>
               <a:t>Alternative hypotheses</a:t>
             </a:r>
           </a:p>
           <a:p>
             <a:pPr lvl="1"/>
             <a:r>
-              <a:rPr lang="en-US" dirty="0">
-                <a:solidFill>
-                  <a:srgbClr val="FF0000"/>
-                </a:solidFill>
-              </a:rPr>
+              <a:rPr lang="en-US" dirty="0"/>
               <a:t>Current predictors</a:t>
             </a:r>
           </a:p>
           <a:p>
             <a:pPr lvl="2"/>
             <a:r>
-              <a:rPr lang="en-US" dirty="0">
-                <a:solidFill>
-                  <a:srgbClr val="FF0000"/>
-                </a:solidFill>
-              </a:rPr>
+              <a:rPr lang="en-US" dirty="0"/>
               <a:t>Scale/resolution</a:t>
             </a:r>
           </a:p>
           <a:p>
+            <a:pPr lvl="3"/>
+            <a:r>
+              <a:rPr lang="en-US" dirty="0"/>
+              <a:t>3 month window versus 1 month or 12 month, etc.</a:t>
+            </a:r>
+          </a:p>
+          <a:p>
             <a:pPr lvl="2"/>
             <a:r>
-              <a:rPr lang="en-US" dirty="0">
-                <a:solidFill>
-                  <a:srgbClr val="FF0000"/>
-                </a:solidFill>
-              </a:rPr>
-              <a:t>Temporal window (assumptions about</a:t>
+              <a:rPr lang="en-US" dirty="0"/>
+              <a:t>Temporal window</a:t>
+            </a:r>
+          </a:p>
+          <a:p>
+            <a:pPr lvl="3"/>
+            <a:r>
+              <a:rPr lang="en-US" dirty="0"/>
+              <a:t>Is summer the most sensitive phase of the life cycle?</a:t>
             </a:r>
           </a:p>
           <a:p>
             <a:pPr lvl="1"/>
             <a:r>
-              <a:rPr lang="en-US" dirty="0">
-                <a:solidFill>
-                  <a:srgbClr val="FF0000"/>
-                </a:solidFill>
-              </a:rPr>
+              <a:rPr lang="en-US" dirty="0"/>
               <a:t>Other predictors</a:t>
             </a:r>
           </a:p>
           <a:p>
-            <a:endParaRPr lang="en-US" dirty="0">
-              <a:solidFill>
-                <a:srgbClr val="FF0000"/>
-              </a:solidFill>
-            </a:endParaRPr>
-          </a:p>
-        </p:txBody>
-      </p:sp>
-    </p:spTree>
-    <p:extLst>
-      <p:ext uri="{BB962C8B-B14F-4D97-AF65-F5344CB8AC3E}">
-        <p14:creationId xmlns:p14="http://schemas.microsoft.com/office/powerpoint/2010/main" val="4039070215"/>
-      </p:ext>
-    </p:extLst>
-  </p:cSld>
-  <p:clrMapOvr>
-    <a:masterClrMapping/>
-  </p:clrMapOvr>
-</p:sld>
-</file>
-
-<file path=ppt/slides/slide9.xml><?xml version="1.0" encoding="utf-8"?>
-<p:sld xmlns:a="http://schemas.openxmlformats.org/drawingml/2006/main" xmlns:r="http://schemas.openxmlformats.org/officeDocument/2006/relationships" xmlns:p="http://schemas.openxmlformats.org/presentationml/2006/main">
-  <p:cSld>
-    <p:spTree>
-      <p:nvGrpSpPr>
-        <p:cNvPr id="1" name=""/>
-        <p:cNvGrpSpPr/>
-        <p:nvPr/>
-      </p:nvGrpSpPr>
-      <p:grpSpPr>
-        <a:xfrm>
-          <a:off x="0" y="0"/>
-          <a:ext cx="0" cy="0"/>
-          <a:chOff x="0" y="0"/>
-          <a:chExt cx="0" cy="0"/>
-        </a:xfrm>
-      </p:grpSpPr>
-      <p:sp>
-        <p:nvSpPr>
-          <p:cNvPr id="2" name="Title 1">
-            <a:extLst>
-              <a:ext uri="{FF2B5EF4-FFF2-40B4-BE49-F238E27FC236}">
-                <a16:creationId xmlns:a16="http://schemas.microsoft.com/office/drawing/2014/main" id="{DDB2557C-9949-3B6C-7B73-1B10F2EB142A}"/>
-              </a:ext>
-            </a:extLst>
-          </p:cNvPr>
-          <p:cNvSpPr>
-            <a:spLocks noGrp="1"/>
-          </p:cNvSpPr>
-          <p:nvPr>
-            <p:ph type="title"/>
-          </p:nvPr>
-        </p:nvSpPr>
-        <p:spPr/>
-        <p:txBody>
-          <a:bodyPr>
-            <a:normAutofit/>
-          </a:bodyPr>
-          <a:lstStyle/>
-          <a:p>
-            <a:r>
-              <a:rPr lang="en-US" cap="none" dirty="0">
-                <a:solidFill>
-                  <a:srgbClr val="FF0000"/>
-                </a:solidFill>
-              </a:rPr>
-              <a:t>Next Steps for Analysis</a:t>
-            </a:r>
-          </a:p>
-        </p:txBody>
-      </p:sp>
-      <p:sp>
-        <p:nvSpPr>
-          <p:cNvPr id="3" name="Content Placeholder 2">
-            <a:extLst>
-              <a:ext uri="{FF2B5EF4-FFF2-40B4-BE49-F238E27FC236}">
-                <a16:creationId xmlns:a16="http://schemas.microsoft.com/office/drawing/2014/main" id="{C48AB4A4-A926-573B-950A-9061BE172B6A}"/>
-              </a:ext>
-            </a:extLst>
-          </p:cNvPr>
-          <p:cNvSpPr>
-            <a:spLocks noGrp="1"/>
-          </p:cNvSpPr>
-          <p:nvPr>
-            <p:ph idx="1"/>
-          </p:nvPr>
-        </p:nvSpPr>
-        <p:spPr>
-          <a:xfrm>
-            <a:off x="913775" y="1989439"/>
-            <a:ext cx="10364452" cy="3801762"/>
-          </a:xfrm>
-        </p:spPr>
-        <p:txBody>
-          <a:bodyPr>
-            <a:normAutofit/>
-          </a:bodyPr>
-          <a:lstStyle/>
-          <a:p>
-            <a:pPr>
-              <a:buFont typeface="Wingdings" panose="05000000000000000000" pitchFamily="2" charset="2"/>
-              <a:buChar char="§"/>
-            </a:pPr>
-            <a:r>
-              <a:rPr lang="en-US" cap="none" dirty="0">
-                <a:solidFill>
-                  <a:srgbClr val="FF0000"/>
-                </a:solidFill>
-              </a:rPr>
-              <a:t>(After reviewing data, note any potential next steps for analysis here. Assume this project was the “scoping” phase for refining the analysis.)</a:t>
+            <a:pPr lvl="2"/>
+            <a:r>
+              <a:rPr lang="en-US" dirty="0"/>
+              <a:t>Population density</a:t>
+            </a:r>
+          </a:p>
+          <a:p>
+            <a:r>
+              <a:rPr lang="en-US" dirty="0"/>
+              <a:t>Quantitative methodologies</a:t>
+            </a:r>
+          </a:p>
+          <a:p>
+            <a:pPr lvl="1"/>
+            <a:r>
+              <a:rPr lang="en-US" dirty="0"/>
+              <a:t>Generalized linear mixed model</a:t>
+            </a:r>
+          </a:p>
+          <a:p>
+            <a:pPr lvl="2"/>
+            <a:r>
+              <a:rPr lang="en-US" dirty="0"/>
+              <a:t>Account for repeated measures, overdispersion, and missing levels of categorical variables (reporting biases)</a:t>
             </a:r>
           </a:p>
         </p:txBody>

</xml_diff>